<commit_message>
finalized big overview figures for paper and analyzed correlation between GP-UCB parameter estimates and performance
</commit_message>
<xml_diff>
--- a/img/task.pptx
+++ b/img/task.pptx
@@ -2,12 +2,12 @@
 <file path=ppt/presentation.xml><?xml version="1.0" encoding="utf-8"?>
 <p:presentation xmlns:a="http://schemas.openxmlformats.org/drawingml/2006/main" xmlns:r="http://schemas.openxmlformats.org/officeDocument/2006/relationships" xmlns:p="http://schemas.openxmlformats.org/presentationml/2006/main" saveSubsetFonts="1" autoCompressPictures="0">
   <p:sldMasterIdLst>
-    <p:sldMasterId id="2147483696" r:id="rId1"/>
+    <p:sldMasterId id="2147483720" r:id="rId1"/>
   </p:sldMasterIdLst>
   <p:sldIdLst>
     <p:sldId id="256" r:id="rId2"/>
   </p:sldIdLst>
-  <p:sldSz cx="15119350" cy="4319588"/>
+  <p:sldSz cx="16200438" cy="4319588"/>
   <p:notesSz cx="6858000" cy="9144000"/>
   <p:defaultTextStyle>
     <a:defPPr>
@@ -104,15 +104,1028 @@
       </a:defRPr>
     </a:lvl9pPr>
   </p:defaultTextStyle>
+  <p:extLst>
+    <p:ext uri="{EFAFB233-063F-42B5-8137-9DF3F51BA10A}">
+      <p15:sldGuideLst xmlns:p15="http://schemas.microsoft.com/office/powerpoint/2012/main"/>
+    </p:ext>
+  </p:extLst>
 </p:presentation>
 </file>
 
 <file path=ppt/revisionInfo.xml><?xml version="1.0" encoding="utf-8"?>
 <p1510:revInfo xmlns:a="http://schemas.openxmlformats.org/drawingml/2006/main" xmlns:r="http://schemas.openxmlformats.org/officeDocument/2006/relationships" xmlns:p1510="http://schemas.microsoft.com/office/powerpoint/2015/10/main">
   <p1510:revLst>
-    <p1510:client id="{B6D57924-B848-2742-8D38-F6230294B7DC}" v="4" dt="2025-07-25T14:06:47.775"/>
+    <p1510:client id="{B6D57924-B848-2742-8D38-F6230294B7DC}" v="10" dt="2025-07-31T17:44:31.481"/>
   </p1510:revLst>
 </p1510:revInfo>
+</file>
+
+<file path=ppt/changesInfos/changesInfo1.xml><?xml version="1.0" encoding="utf-8"?>
+<pc:chgInfo xmlns:a="http://schemas.openxmlformats.org/drawingml/2006/main" xmlns:r="http://schemas.openxmlformats.org/officeDocument/2006/relationships" xmlns:ac="http://schemas.microsoft.com/office/drawing/2013/main/command" xmlns:pc="http://schemas.microsoft.com/office/powerpoint/2013/main/command">
+  <pc:docChgLst>
+    <pc:chgData name="Björn Meder HMU Potsdam" userId="d258dbf6-ab6a-4282-851d-9abdcd54331d" providerId="ADAL" clId="{B6D57924-B848-2742-8D38-F6230294B7DC}"/>
+    <pc:docChg chg="custSel addSld delSld modSld modMainMaster">
+      <pc:chgData name="Björn Meder HMU Potsdam" userId="d258dbf6-ab6a-4282-851d-9abdcd54331d" providerId="ADAL" clId="{B6D57924-B848-2742-8D38-F6230294B7DC}" dt="2025-07-31T17:45:04.732" v="54" actId="2696"/>
+      <pc:docMkLst>
+        <pc:docMk/>
+      </pc:docMkLst>
+      <pc:sldChg chg="addSp delSp modSp mod">
+        <pc:chgData name="Björn Meder HMU Potsdam" userId="d258dbf6-ab6a-4282-851d-9abdcd54331d" providerId="ADAL" clId="{B6D57924-B848-2742-8D38-F6230294B7DC}" dt="2025-07-31T12:15:23.197" v="47" actId="1038"/>
+        <pc:sldMkLst>
+          <pc:docMk/>
+          <pc:sldMk cId="1845256045" sldId="256"/>
+        </pc:sldMkLst>
+        <pc:spChg chg="add del mod">
+          <ac:chgData name="Björn Meder HMU Potsdam" userId="d258dbf6-ab6a-4282-851d-9abdcd54331d" providerId="ADAL" clId="{B6D57924-B848-2742-8D38-F6230294B7DC}" dt="2025-07-31T12:14:34.081" v="4" actId="21"/>
+          <ac:spMkLst>
+            <pc:docMk/>
+            <pc:sldMk cId="1845256045" sldId="256"/>
+            <ac:spMk id="11" creationId="{58D96654-5168-C42B-A936-CA26ABF3F4CC}"/>
+          </ac:spMkLst>
+        </pc:spChg>
+        <pc:spChg chg="add del mod">
+          <ac:chgData name="Björn Meder HMU Potsdam" userId="d258dbf6-ab6a-4282-851d-9abdcd54331d" providerId="ADAL" clId="{B6D57924-B848-2742-8D38-F6230294B7DC}" dt="2025-07-31T12:14:34.081" v="4" actId="21"/>
+          <ac:spMkLst>
+            <pc:docMk/>
+            <pc:sldMk cId="1845256045" sldId="256"/>
+            <ac:spMk id="12" creationId="{B1E92F34-CCB0-CCC9-8A33-70E3C3357846}"/>
+          </ac:spMkLst>
+        </pc:spChg>
+        <pc:spChg chg="add del mod">
+          <ac:chgData name="Björn Meder HMU Potsdam" userId="d258dbf6-ab6a-4282-851d-9abdcd54331d" providerId="ADAL" clId="{B6D57924-B848-2742-8D38-F6230294B7DC}" dt="2025-07-31T12:14:34.081" v="4" actId="21"/>
+          <ac:spMkLst>
+            <pc:docMk/>
+            <pc:sldMk cId="1845256045" sldId="256"/>
+            <ac:spMk id="13" creationId="{67129030-4285-C68C-6232-7994AA617540}"/>
+          </ac:spMkLst>
+        </pc:spChg>
+        <pc:spChg chg="add del mod">
+          <ac:chgData name="Björn Meder HMU Potsdam" userId="d258dbf6-ab6a-4282-851d-9abdcd54331d" providerId="ADAL" clId="{B6D57924-B848-2742-8D38-F6230294B7DC}" dt="2025-07-31T12:14:34.081" v="4" actId="21"/>
+          <ac:spMkLst>
+            <pc:docMk/>
+            <pc:sldMk cId="1845256045" sldId="256"/>
+            <ac:spMk id="15" creationId="{3753DC2B-444C-8588-703E-F86C7285737A}"/>
+          </ac:spMkLst>
+        </pc:spChg>
+        <pc:spChg chg="add del mod">
+          <ac:chgData name="Björn Meder HMU Potsdam" userId="d258dbf6-ab6a-4282-851d-9abdcd54331d" providerId="ADAL" clId="{B6D57924-B848-2742-8D38-F6230294B7DC}" dt="2025-07-31T12:14:34.081" v="4" actId="21"/>
+          <ac:spMkLst>
+            <pc:docMk/>
+            <pc:sldMk cId="1845256045" sldId="256"/>
+            <ac:spMk id="16" creationId="{D4BE3873-3D29-6F4F-D44A-A4C1A803F73B}"/>
+          </ac:spMkLst>
+        </pc:spChg>
+        <pc:spChg chg="add del mod">
+          <ac:chgData name="Björn Meder HMU Potsdam" userId="d258dbf6-ab6a-4282-851d-9abdcd54331d" providerId="ADAL" clId="{B6D57924-B848-2742-8D38-F6230294B7DC}" dt="2025-07-31T12:14:34.081" v="4" actId="21"/>
+          <ac:spMkLst>
+            <pc:docMk/>
+            <pc:sldMk cId="1845256045" sldId="256"/>
+            <ac:spMk id="19" creationId="{92F3250F-6D9B-99B3-BEF4-69E850C54ABB}"/>
+          </ac:spMkLst>
+        </pc:spChg>
+        <pc:spChg chg="add del mod">
+          <ac:chgData name="Björn Meder HMU Potsdam" userId="d258dbf6-ab6a-4282-851d-9abdcd54331d" providerId="ADAL" clId="{B6D57924-B848-2742-8D38-F6230294B7DC}" dt="2025-07-31T12:14:34.081" v="4" actId="21"/>
+          <ac:spMkLst>
+            <pc:docMk/>
+            <pc:sldMk cId="1845256045" sldId="256"/>
+            <ac:spMk id="21" creationId="{4B2BACCD-B155-CDA5-D6F8-7D3A767FA652}"/>
+          </ac:spMkLst>
+        </pc:spChg>
+        <pc:spChg chg="del mod">
+          <ac:chgData name="Björn Meder HMU Potsdam" userId="d258dbf6-ab6a-4282-851d-9abdcd54331d" providerId="ADAL" clId="{B6D57924-B848-2742-8D38-F6230294B7DC}" dt="2025-07-31T12:14:34.081" v="4" actId="21"/>
+          <ac:spMkLst>
+            <pc:docMk/>
+            <pc:sldMk cId="1845256045" sldId="256"/>
+            <ac:spMk id="22" creationId="{23EE6291-2FC2-0F61-C5E5-7EABCD1194B7}"/>
+          </ac:spMkLst>
+        </pc:spChg>
+        <pc:spChg chg="add del mod">
+          <ac:chgData name="Björn Meder HMU Potsdam" userId="d258dbf6-ab6a-4282-851d-9abdcd54331d" providerId="ADAL" clId="{B6D57924-B848-2742-8D38-F6230294B7DC}" dt="2025-07-31T12:14:34.081" v="4" actId="21"/>
+          <ac:spMkLst>
+            <pc:docMk/>
+            <pc:sldMk cId="1845256045" sldId="256"/>
+            <ac:spMk id="25" creationId="{72671950-BDD0-77C0-22EB-03AE98715702}"/>
+          </ac:spMkLst>
+        </pc:spChg>
+        <pc:spChg chg="add del mod">
+          <ac:chgData name="Björn Meder HMU Potsdam" userId="d258dbf6-ab6a-4282-851d-9abdcd54331d" providerId="ADAL" clId="{B6D57924-B848-2742-8D38-F6230294B7DC}" dt="2025-07-31T12:14:34.081" v="4" actId="21"/>
+          <ac:spMkLst>
+            <pc:docMk/>
+            <pc:sldMk cId="1845256045" sldId="256"/>
+            <ac:spMk id="26" creationId="{89DC1350-4356-317D-B146-2CCCC7475328}"/>
+          </ac:spMkLst>
+        </pc:spChg>
+        <pc:spChg chg="mod">
+          <ac:chgData name="Björn Meder HMU Potsdam" userId="d258dbf6-ab6a-4282-851d-9abdcd54331d" providerId="ADAL" clId="{B6D57924-B848-2742-8D38-F6230294B7DC}" dt="2025-07-31T12:14:17.713" v="1"/>
+          <ac:spMkLst>
+            <pc:docMk/>
+            <pc:sldMk cId="1845256045" sldId="256"/>
+            <ac:spMk id="28" creationId="{3BAE6AF0-EE9C-F0C4-3629-DA832C0F9DF6}"/>
+          </ac:spMkLst>
+        </pc:spChg>
+        <pc:spChg chg="add del mod">
+          <ac:chgData name="Björn Meder HMU Potsdam" userId="d258dbf6-ab6a-4282-851d-9abdcd54331d" providerId="ADAL" clId="{B6D57924-B848-2742-8D38-F6230294B7DC}" dt="2025-07-31T12:14:50.992" v="7" actId="21"/>
+          <ac:spMkLst>
+            <pc:docMk/>
+            <pc:sldMk cId="1845256045" sldId="256"/>
+            <ac:spMk id="39" creationId="{158C1796-AC56-9273-ED68-23C4C8D86DCA}"/>
+          </ac:spMkLst>
+        </pc:spChg>
+        <pc:spChg chg="add del mod">
+          <ac:chgData name="Björn Meder HMU Potsdam" userId="d258dbf6-ab6a-4282-851d-9abdcd54331d" providerId="ADAL" clId="{B6D57924-B848-2742-8D38-F6230294B7DC}" dt="2025-07-31T12:14:50.992" v="7" actId="21"/>
+          <ac:spMkLst>
+            <pc:docMk/>
+            <pc:sldMk cId="1845256045" sldId="256"/>
+            <ac:spMk id="41" creationId="{2A3E5524-93A5-20E3-5F29-B300AC04F868}"/>
+          </ac:spMkLst>
+        </pc:spChg>
+        <pc:spChg chg="add del mod">
+          <ac:chgData name="Björn Meder HMU Potsdam" userId="d258dbf6-ab6a-4282-851d-9abdcd54331d" providerId="ADAL" clId="{B6D57924-B848-2742-8D38-F6230294B7DC}" dt="2025-07-31T12:14:50.992" v="7" actId="21"/>
+          <ac:spMkLst>
+            <pc:docMk/>
+            <pc:sldMk cId="1845256045" sldId="256"/>
+            <ac:spMk id="42" creationId="{1AA82B5A-56EE-4013-023E-60AB1A47540E}"/>
+          </ac:spMkLst>
+        </pc:spChg>
+        <pc:spChg chg="add del mod">
+          <ac:chgData name="Björn Meder HMU Potsdam" userId="d258dbf6-ab6a-4282-851d-9abdcd54331d" providerId="ADAL" clId="{B6D57924-B848-2742-8D38-F6230294B7DC}" dt="2025-07-31T12:14:50.992" v="7" actId="21"/>
+          <ac:spMkLst>
+            <pc:docMk/>
+            <pc:sldMk cId="1845256045" sldId="256"/>
+            <ac:spMk id="46" creationId="{87AB22BD-A2F9-4CA2-93B0-4AD1A54D8202}"/>
+          </ac:spMkLst>
+        </pc:spChg>
+        <pc:spChg chg="add del mod">
+          <ac:chgData name="Björn Meder HMU Potsdam" userId="d258dbf6-ab6a-4282-851d-9abdcd54331d" providerId="ADAL" clId="{B6D57924-B848-2742-8D38-F6230294B7DC}" dt="2025-07-31T12:14:50.992" v="7" actId="21"/>
+          <ac:spMkLst>
+            <pc:docMk/>
+            <pc:sldMk cId="1845256045" sldId="256"/>
+            <ac:spMk id="47" creationId="{D81785AE-AC69-EFB7-2726-D914F18542AF}"/>
+          </ac:spMkLst>
+        </pc:spChg>
+        <pc:spChg chg="add del mod">
+          <ac:chgData name="Björn Meder HMU Potsdam" userId="d258dbf6-ab6a-4282-851d-9abdcd54331d" providerId="ADAL" clId="{B6D57924-B848-2742-8D38-F6230294B7DC}" dt="2025-07-31T12:14:50.992" v="7" actId="21"/>
+          <ac:spMkLst>
+            <pc:docMk/>
+            <pc:sldMk cId="1845256045" sldId="256"/>
+            <ac:spMk id="49" creationId="{0B4D4534-9B72-6345-00E8-1C364824A8D9}"/>
+          </ac:spMkLst>
+        </pc:spChg>
+        <pc:spChg chg="add del mod">
+          <ac:chgData name="Björn Meder HMU Potsdam" userId="d258dbf6-ab6a-4282-851d-9abdcd54331d" providerId="ADAL" clId="{B6D57924-B848-2742-8D38-F6230294B7DC}" dt="2025-07-31T12:14:50.992" v="7" actId="21"/>
+          <ac:spMkLst>
+            <pc:docMk/>
+            <pc:sldMk cId="1845256045" sldId="256"/>
+            <ac:spMk id="50" creationId="{FBE04B86-F0A8-366D-9E62-FC617F66FBA7}"/>
+          </ac:spMkLst>
+        </pc:spChg>
+        <pc:spChg chg="add del mod">
+          <ac:chgData name="Björn Meder HMU Potsdam" userId="d258dbf6-ab6a-4282-851d-9abdcd54331d" providerId="ADAL" clId="{B6D57924-B848-2742-8D38-F6230294B7DC}" dt="2025-07-31T12:14:50.992" v="7" actId="21"/>
+          <ac:spMkLst>
+            <pc:docMk/>
+            <pc:sldMk cId="1845256045" sldId="256"/>
+            <ac:spMk id="52" creationId="{FB191E7F-0FF5-B060-B89F-F798D3A89CEE}"/>
+          </ac:spMkLst>
+        </pc:spChg>
+        <pc:spChg chg="add del mod">
+          <ac:chgData name="Björn Meder HMU Potsdam" userId="d258dbf6-ab6a-4282-851d-9abdcd54331d" providerId="ADAL" clId="{B6D57924-B848-2742-8D38-F6230294B7DC}" dt="2025-07-31T12:14:50.992" v="7" actId="21"/>
+          <ac:spMkLst>
+            <pc:docMk/>
+            <pc:sldMk cId="1845256045" sldId="256"/>
+            <ac:spMk id="54" creationId="{804FB074-3D23-EE53-3C22-2B83714B6073}"/>
+          </ac:spMkLst>
+        </pc:spChg>
+        <pc:spChg chg="add del mod">
+          <ac:chgData name="Björn Meder HMU Potsdam" userId="d258dbf6-ab6a-4282-851d-9abdcd54331d" providerId="ADAL" clId="{B6D57924-B848-2742-8D38-F6230294B7DC}" dt="2025-07-31T12:14:50.992" v="7" actId="21"/>
+          <ac:spMkLst>
+            <pc:docMk/>
+            <pc:sldMk cId="1845256045" sldId="256"/>
+            <ac:spMk id="55" creationId="{3247DBE0-C15C-5D58-8E5F-5780552BE6CC}"/>
+          </ac:spMkLst>
+        </pc:spChg>
+        <pc:spChg chg="del">
+          <ac:chgData name="Björn Meder HMU Potsdam" userId="d258dbf6-ab6a-4282-851d-9abdcd54331d" providerId="ADAL" clId="{B6D57924-B848-2742-8D38-F6230294B7DC}" dt="2025-07-31T12:14:08.752" v="0" actId="478"/>
+          <ac:spMkLst>
+            <pc:docMk/>
+            <pc:sldMk cId="1845256045" sldId="256"/>
+            <ac:spMk id="66" creationId="{1507D06C-F529-A716-3FA2-38C641CD6299}"/>
+          </ac:spMkLst>
+        </pc:spChg>
+        <pc:spChg chg="del">
+          <ac:chgData name="Björn Meder HMU Potsdam" userId="d258dbf6-ab6a-4282-851d-9abdcd54331d" providerId="ADAL" clId="{B6D57924-B848-2742-8D38-F6230294B7DC}" dt="2025-07-31T12:14:08.752" v="0" actId="478"/>
+          <ac:spMkLst>
+            <pc:docMk/>
+            <pc:sldMk cId="1845256045" sldId="256"/>
+            <ac:spMk id="67" creationId="{419202B5-E33E-1400-9DC3-EA93BFA2D60D}"/>
+          </ac:spMkLst>
+        </pc:spChg>
+        <pc:spChg chg="del">
+          <ac:chgData name="Björn Meder HMU Potsdam" userId="d258dbf6-ab6a-4282-851d-9abdcd54331d" providerId="ADAL" clId="{B6D57924-B848-2742-8D38-F6230294B7DC}" dt="2025-07-31T12:14:08.752" v="0" actId="478"/>
+          <ac:spMkLst>
+            <pc:docMk/>
+            <pc:sldMk cId="1845256045" sldId="256"/>
+            <ac:spMk id="68" creationId="{47878F50-984D-451B-BC66-75F24C7C4510}"/>
+          </ac:spMkLst>
+        </pc:spChg>
+        <pc:spChg chg="mod">
+          <ac:chgData name="Björn Meder HMU Potsdam" userId="d258dbf6-ab6a-4282-851d-9abdcd54331d" providerId="ADAL" clId="{B6D57924-B848-2742-8D38-F6230294B7DC}" dt="2025-07-31T12:15:09.225" v="13" actId="1036"/>
+          <ac:spMkLst>
+            <pc:docMk/>
+            <pc:sldMk cId="1845256045" sldId="256"/>
+            <ac:spMk id="80" creationId="{E71E4D08-87DF-61BD-C1FF-2F48DF5FBA20}"/>
+          </ac:spMkLst>
+        </pc:spChg>
+        <pc:spChg chg="mod">
+          <ac:chgData name="Björn Meder HMU Potsdam" userId="d258dbf6-ab6a-4282-851d-9abdcd54331d" providerId="ADAL" clId="{B6D57924-B848-2742-8D38-F6230294B7DC}" dt="2025-07-31T12:15:23.197" v="47" actId="1038"/>
+          <ac:spMkLst>
+            <pc:docMk/>
+            <pc:sldMk cId="1845256045" sldId="256"/>
+            <ac:spMk id="81" creationId="{3B97A300-5E81-4CF9-CCD4-584F03355EDB}"/>
+          </ac:spMkLst>
+        </pc:spChg>
+        <pc:spChg chg="add mod">
+          <ac:chgData name="Björn Meder HMU Potsdam" userId="d258dbf6-ab6a-4282-851d-9abdcd54331d" providerId="ADAL" clId="{B6D57924-B848-2742-8D38-F6230294B7DC}" dt="2025-07-31T12:15:18.386" v="31" actId="1037"/>
+          <ac:spMkLst>
+            <pc:docMk/>
+            <pc:sldMk cId="1845256045" sldId="256"/>
+            <ac:spMk id="82" creationId="{371E1DE2-74FF-C979-AD89-03EF229E06B5}"/>
+          </ac:spMkLst>
+        </pc:spChg>
+        <pc:spChg chg="add mod">
+          <ac:chgData name="Björn Meder HMU Potsdam" userId="d258dbf6-ab6a-4282-851d-9abdcd54331d" providerId="ADAL" clId="{B6D57924-B848-2742-8D38-F6230294B7DC}" dt="2025-07-31T12:15:01.020" v="11" actId="1035"/>
+          <ac:spMkLst>
+            <pc:docMk/>
+            <pc:sldMk cId="1845256045" sldId="256"/>
+            <ac:spMk id="85" creationId="{853AB7EB-6194-7658-67E5-1A34E32737F8}"/>
+          </ac:spMkLst>
+        </pc:spChg>
+        <pc:spChg chg="add mod">
+          <ac:chgData name="Björn Meder HMU Potsdam" userId="d258dbf6-ab6a-4282-851d-9abdcd54331d" providerId="ADAL" clId="{B6D57924-B848-2742-8D38-F6230294B7DC}" dt="2025-07-31T12:15:01.020" v="11" actId="1035"/>
+          <ac:spMkLst>
+            <pc:docMk/>
+            <pc:sldMk cId="1845256045" sldId="256"/>
+            <ac:spMk id="86" creationId="{98D8540B-28A8-C964-0916-98ADBC06B2E0}"/>
+          </ac:spMkLst>
+        </pc:spChg>
+        <pc:spChg chg="mod">
+          <ac:chgData name="Björn Meder HMU Potsdam" userId="d258dbf6-ab6a-4282-851d-9abdcd54331d" providerId="ADAL" clId="{B6D57924-B848-2742-8D38-F6230294B7DC}" dt="2025-07-31T12:15:01.020" v="11" actId="1035"/>
+          <ac:spMkLst>
+            <pc:docMk/>
+            <pc:sldMk cId="1845256045" sldId="256"/>
+            <ac:spMk id="87" creationId="{DB945779-C1E9-8AC7-D3F0-FB76AB437AA0}"/>
+          </ac:spMkLst>
+        </pc:spChg>
+        <pc:spChg chg="add mod">
+          <ac:chgData name="Björn Meder HMU Potsdam" userId="d258dbf6-ab6a-4282-851d-9abdcd54331d" providerId="ADAL" clId="{B6D57924-B848-2742-8D38-F6230294B7DC}" dt="2025-07-31T12:15:01.020" v="11" actId="1035"/>
+          <ac:spMkLst>
+            <pc:docMk/>
+            <pc:sldMk cId="1845256045" sldId="256"/>
+            <ac:spMk id="88" creationId="{8B661F2B-11F7-51BE-AAC8-BBC669B48D45}"/>
+          </ac:spMkLst>
+        </pc:spChg>
+        <pc:spChg chg="add mod">
+          <ac:chgData name="Björn Meder HMU Potsdam" userId="d258dbf6-ab6a-4282-851d-9abdcd54331d" providerId="ADAL" clId="{B6D57924-B848-2742-8D38-F6230294B7DC}" dt="2025-07-31T12:15:01.020" v="11" actId="1035"/>
+          <ac:spMkLst>
+            <pc:docMk/>
+            <pc:sldMk cId="1845256045" sldId="256"/>
+            <ac:spMk id="89" creationId="{E179F596-7D73-38BB-DAF4-17F6B8510B7F}"/>
+          </ac:spMkLst>
+        </pc:spChg>
+        <pc:spChg chg="add mod">
+          <ac:chgData name="Björn Meder HMU Potsdam" userId="d258dbf6-ab6a-4282-851d-9abdcd54331d" providerId="ADAL" clId="{B6D57924-B848-2742-8D38-F6230294B7DC}" dt="2025-07-31T12:14:57.816" v="9"/>
+          <ac:spMkLst>
+            <pc:docMk/>
+            <pc:sldMk cId="1845256045" sldId="256"/>
+            <ac:spMk id="90" creationId="{D5F5B5AA-6D10-2387-9C82-493513E83EED}"/>
+          </ac:spMkLst>
+        </pc:spChg>
+        <pc:spChg chg="add mod">
+          <ac:chgData name="Björn Meder HMU Potsdam" userId="d258dbf6-ab6a-4282-851d-9abdcd54331d" providerId="ADAL" clId="{B6D57924-B848-2742-8D38-F6230294B7DC}" dt="2025-07-31T12:15:01.020" v="11" actId="1035"/>
+          <ac:spMkLst>
+            <pc:docMk/>
+            <pc:sldMk cId="1845256045" sldId="256"/>
+            <ac:spMk id="92" creationId="{CC7728F4-E58A-CD50-621E-09FFC051CADB}"/>
+          </ac:spMkLst>
+        </pc:spChg>
+        <pc:spChg chg="add mod">
+          <ac:chgData name="Björn Meder HMU Potsdam" userId="d258dbf6-ab6a-4282-851d-9abdcd54331d" providerId="ADAL" clId="{B6D57924-B848-2742-8D38-F6230294B7DC}" dt="2025-07-31T12:14:57.816" v="9"/>
+          <ac:spMkLst>
+            <pc:docMk/>
+            <pc:sldMk cId="1845256045" sldId="256"/>
+            <ac:spMk id="95" creationId="{1A1CA980-DEBE-7ED3-FCBB-F27C08FFC466}"/>
+          </ac:spMkLst>
+        </pc:spChg>
+        <pc:spChg chg="mod">
+          <ac:chgData name="Björn Meder HMU Potsdam" userId="d258dbf6-ab6a-4282-851d-9abdcd54331d" providerId="ADAL" clId="{B6D57924-B848-2742-8D38-F6230294B7DC}" dt="2025-07-31T12:15:01.020" v="11" actId="1035"/>
+          <ac:spMkLst>
+            <pc:docMk/>
+            <pc:sldMk cId="1845256045" sldId="256"/>
+            <ac:spMk id="96" creationId="{BC70F5D4-92D3-9A8C-3B4A-63DA43F4707A}"/>
+          </ac:spMkLst>
+        </pc:spChg>
+        <pc:spChg chg="mod">
+          <ac:chgData name="Björn Meder HMU Potsdam" userId="d258dbf6-ab6a-4282-851d-9abdcd54331d" providerId="ADAL" clId="{B6D57924-B848-2742-8D38-F6230294B7DC}" dt="2025-07-31T12:14:57.816" v="9"/>
+          <ac:spMkLst>
+            <pc:docMk/>
+            <pc:sldMk cId="1845256045" sldId="256"/>
+            <ac:spMk id="98" creationId="{5A057943-34A0-3508-F911-C78D2758DCDF}"/>
+          </ac:spMkLst>
+        </pc:spChg>
+        <pc:spChg chg="add mod">
+          <ac:chgData name="Björn Meder HMU Potsdam" userId="d258dbf6-ab6a-4282-851d-9abdcd54331d" providerId="ADAL" clId="{B6D57924-B848-2742-8D38-F6230294B7DC}" dt="2025-07-31T12:14:57.816" v="9"/>
+          <ac:spMkLst>
+            <pc:docMk/>
+            <pc:sldMk cId="1845256045" sldId="256"/>
+            <ac:spMk id="100" creationId="{69C215B1-3CF1-6167-D884-7C75549F646D}"/>
+          </ac:spMkLst>
+        </pc:spChg>
+        <pc:grpChg chg="del">
+          <ac:chgData name="Björn Meder HMU Potsdam" userId="d258dbf6-ab6a-4282-851d-9abdcd54331d" providerId="ADAL" clId="{B6D57924-B848-2742-8D38-F6230294B7DC}" dt="2025-07-31T12:14:08.752" v="0" actId="478"/>
+          <ac:grpSpMkLst>
+            <pc:docMk/>
+            <pc:sldMk cId="1845256045" sldId="256"/>
+            <ac:grpSpMk id="58" creationId="{AAEA2726-7F98-5339-2BA6-DF72C4BFC99E}"/>
+          </ac:grpSpMkLst>
+        </pc:grpChg>
+        <pc:grpChg chg="del">
+          <ac:chgData name="Björn Meder HMU Potsdam" userId="d258dbf6-ab6a-4282-851d-9abdcd54331d" providerId="ADAL" clId="{B6D57924-B848-2742-8D38-F6230294B7DC}" dt="2025-07-31T12:14:08.752" v="0" actId="478"/>
+          <ac:grpSpMkLst>
+            <pc:docMk/>
+            <pc:sldMk cId="1845256045" sldId="256"/>
+            <ac:grpSpMk id="63" creationId="{0AAB4D51-8856-A9D9-DF54-C0C9DD73BADB}"/>
+          </ac:grpSpMkLst>
+        </pc:grpChg>
+        <pc:picChg chg="del">
+          <ac:chgData name="Björn Meder HMU Potsdam" userId="d258dbf6-ab6a-4282-851d-9abdcd54331d" providerId="ADAL" clId="{B6D57924-B848-2742-8D38-F6230294B7DC}" dt="2025-07-31T12:14:08.752" v="0" actId="478"/>
+          <ac:picMkLst>
+            <pc:docMk/>
+            <pc:sldMk cId="1845256045" sldId="256"/>
+            <ac:picMk id="69" creationId="{2CCF4D79-03EE-E87E-26B8-7A995F0E3197}"/>
+          </ac:picMkLst>
+        </pc:picChg>
+      </pc:sldChg>
+      <pc:sldChg chg="addSp delSp modSp new del mod">
+        <pc:chgData name="Björn Meder HMU Potsdam" userId="d258dbf6-ab6a-4282-851d-9abdcd54331d" providerId="ADAL" clId="{B6D57924-B848-2742-8D38-F6230294B7DC}" dt="2025-07-31T17:45:04.732" v="54" actId="2696"/>
+        <pc:sldMkLst>
+          <pc:docMk/>
+          <pc:sldMk cId="1595734359" sldId="257"/>
+        </pc:sldMkLst>
+        <pc:spChg chg="del">
+          <ac:chgData name="Björn Meder HMU Potsdam" userId="d258dbf6-ab6a-4282-851d-9abdcd54331d" providerId="ADAL" clId="{B6D57924-B848-2742-8D38-F6230294B7DC}" dt="2025-07-31T17:43:59.651" v="49" actId="478"/>
+          <ac:spMkLst>
+            <pc:docMk/>
+            <pc:sldMk cId="1595734359" sldId="257"/>
+            <ac:spMk id="2" creationId="{A02BE137-75A4-2BAA-48DF-F5EFA5AC6917}"/>
+          </ac:spMkLst>
+        </pc:spChg>
+        <pc:spChg chg="del">
+          <ac:chgData name="Björn Meder HMU Potsdam" userId="d258dbf6-ab6a-4282-851d-9abdcd54331d" providerId="ADAL" clId="{B6D57924-B848-2742-8D38-F6230294B7DC}" dt="2025-07-31T17:43:59.651" v="49" actId="478"/>
+          <ac:spMkLst>
+            <pc:docMk/>
+            <pc:sldMk cId="1595734359" sldId="257"/>
+            <ac:spMk id="3" creationId="{6B7F1242-8F63-5AAB-9625-ECEC2B28FD96}"/>
+          </ac:spMkLst>
+        </pc:spChg>
+        <pc:spChg chg="del mod topLvl">
+          <ac:chgData name="Björn Meder HMU Potsdam" userId="d258dbf6-ab6a-4282-851d-9abdcd54331d" providerId="ADAL" clId="{B6D57924-B848-2742-8D38-F6230294B7DC}" dt="2025-07-31T17:44:52.236" v="53" actId="21"/>
+          <ac:spMkLst>
+            <pc:docMk/>
+            <pc:sldMk cId="1595734359" sldId="257"/>
+            <ac:spMk id="6" creationId="{F9B676ED-B4F1-36EB-D34A-A5340AB63164}"/>
+          </ac:spMkLst>
+        </pc:spChg>
+        <pc:spChg chg="del mod topLvl">
+          <ac:chgData name="Björn Meder HMU Potsdam" userId="d258dbf6-ab6a-4282-851d-9abdcd54331d" providerId="ADAL" clId="{B6D57924-B848-2742-8D38-F6230294B7DC}" dt="2025-07-31T17:44:52.236" v="53" actId="21"/>
+          <ac:spMkLst>
+            <pc:docMk/>
+            <pc:sldMk cId="1595734359" sldId="257"/>
+            <ac:spMk id="7" creationId="{DA20CEA6-5C95-3DD6-90F1-FAF6DDB509AA}"/>
+          </ac:spMkLst>
+        </pc:spChg>
+        <pc:spChg chg="del mod topLvl">
+          <ac:chgData name="Björn Meder HMU Potsdam" userId="d258dbf6-ab6a-4282-851d-9abdcd54331d" providerId="ADAL" clId="{B6D57924-B848-2742-8D38-F6230294B7DC}" dt="2025-07-31T17:44:52.236" v="53" actId="21"/>
+          <ac:spMkLst>
+            <pc:docMk/>
+            <pc:sldMk cId="1595734359" sldId="257"/>
+            <ac:spMk id="9" creationId="{7FDD09CE-C53C-6701-FC5F-D8FC51BAD06B}"/>
+          </ac:spMkLst>
+        </pc:spChg>
+        <pc:spChg chg="del mod topLvl">
+          <ac:chgData name="Björn Meder HMU Potsdam" userId="d258dbf6-ab6a-4282-851d-9abdcd54331d" providerId="ADAL" clId="{B6D57924-B848-2742-8D38-F6230294B7DC}" dt="2025-07-31T17:44:52.236" v="53" actId="21"/>
+          <ac:spMkLst>
+            <pc:docMk/>
+            <pc:sldMk cId="1595734359" sldId="257"/>
+            <ac:spMk id="10" creationId="{FB946922-B2D6-AAEF-121C-D352106CA485}"/>
+          </ac:spMkLst>
+        </pc:spChg>
+        <pc:spChg chg="del mod topLvl">
+          <ac:chgData name="Björn Meder HMU Potsdam" userId="d258dbf6-ab6a-4282-851d-9abdcd54331d" providerId="ADAL" clId="{B6D57924-B848-2742-8D38-F6230294B7DC}" dt="2025-07-31T17:44:52.236" v="53" actId="21"/>
+          <ac:spMkLst>
+            <pc:docMk/>
+            <pc:sldMk cId="1595734359" sldId="257"/>
+            <ac:spMk id="11" creationId="{D736C8E4-36D7-A947-B2EF-CB64CADE065D}"/>
+          </ac:spMkLst>
+        </pc:spChg>
+        <pc:spChg chg="del mod topLvl">
+          <ac:chgData name="Björn Meder HMU Potsdam" userId="d258dbf6-ab6a-4282-851d-9abdcd54331d" providerId="ADAL" clId="{B6D57924-B848-2742-8D38-F6230294B7DC}" dt="2025-07-31T17:44:52.236" v="53" actId="21"/>
+          <ac:spMkLst>
+            <pc:docMk/>
+            <pc:sldMk cId="1595734359" sldId="257"/>
+            <ac:spMk id="12" creationId="{8C06664A-E40B-EAD3-45F7-0EF38E8F1813}"/>
+          </ac:spMkLst>
+        </pc:spChg>
+        <pc:spChg chg="del mod topLvl">
+          <ac:chgData name="Björn Meder HMU Potsdam" userId="d258dbf6-ab6a-4282-851d-9abdcd54331d" providerId="ADAL" clId="{B6D57924-B848-2742-8D38-F6230294B7DC}" dt="2025-07-31T17:44:52.236" v="53" actId="21"/>
+          <ac:spMkLst>
+            <pc:docMk/>
+            <pc:sldMk cId="1595734359" sldId="257"/>
+            <ac:spMk id="13" creationId="{A41EF103-C1B2-C040-775A-B3EEB0DE2D22}"/>
+          </ac:spMkLst>
+        </pc:spChg>
+        <pc:spChg chg="del mod topLvl">
+          <ac:chgData name="Björn Meder HMU Potsdam" userId="d258dbf6-ab6a-4282-851d-9abdcd54331d" providerId="ADAL" clId="{B6D57924-B848-2742-8D38-F6230294B7DC}" dt="2025-07-31T17:44:52.236" v="53" actId="21"/>
+          <ac:spMkLst>
+            <pc:docMk/>
+            <pc:sldMk cId="1595734359" sldId="257"/>
+            <ac:spMk id="14" creationId="{CBEE0EBB-3CBC-CE08-079F-F4D32D535D0B}"/>
+          </ac:spMkLst>
+        </pc:spChg>
+        <pc:grpChg chg="add del mod">
+          <ac:chgData name="Björn Meder HMU Potsdam" userId="d258dbf6-ab6a-4282-851d-9abdcd54331d" providerId="ADAL" clId="{B6D57924-B848-2742-8D38-F6230294B7DC}" dt="2025-07-31T17:44:39.275" v="51" actId="165"/>
+          <ac:grpSpMkLst>
+            <pc:docMk/>
+            <pc:sldMk cId="1595734359" sldId="257"/>
+            <ac:grpSpMk id="4" creationId="{700E52F1-5FA6-882D-C6FF-1DA8EC81D714}"/>
+          </ac:grpSpMkLst>
+        </pc:grpChg>
+        <pc:grpChg chg="del topLvl">
+          <ac:chgData name="Björn Meder HMU Potsdam" userId="d258dbf6-ab6a-4282-851d-9abdcd54331d" providerId="ADAL" clId="{B6D57924-B848-2742-8D38-F6230294B7DC}" dt="2025-07-31T17:44:41.087" v="52" actId="165"/>
+          <ac:grpSpMkLst>
+            <pc:docMk/>
+            <pc:sldMk cId="1595734359" sldId="257"/>
+            <ac:grpSpMk id="5" creationId="{61EC9D8F-5A80-F3C0-F644-004ED33C5C33}"/>
+          </ac:grpSpMkLst>
+        </pc:grpChg>
+        <pc:picChg chg="del mod topLvl">
+          <ac:chgData name="Björn Meder HMU Potsdam" userId="d258dbf6-ab6a-4282-851d-9abdcd54331d" providerId="ADAL" clId="{B6D57924-B848-2742-8D38-F6230294B7DC}" dt="2025-07-31T17:44:52.236" v="53" actId="21"/>
+          <ac:picMkLst>
+            <pc:docMk/>
+            <pc:sldMk cId="1595734359" sldId="257"/>
+            <ac:picMk id="8" creationId="{817A741A-0A4C-2861-3B78-F1B336283F52}"/>
+          </ac:picMkLst>
+        </pc:picChg>
+      </pc:sldChg>
+      <pc:sldMasterChg chg="modSp modSldLayout">
+        <pc:chgData name="Björn Meder HMU Potsdam" userId="d258dbf6-ab6a-4282-851d-9abdcd54331d" providerId="ADAL" clId="{B6D57924-B848-2742-8D38-F6230294B7DC}" dt="2025-07-31T12:14:45.714" v="5"/>
+        <pc:sldMasterMkLst>
+          <pc:docMk/>
+          <pc:sldMasterMk cId="2618204342" sldId="2147483696"/>
+        </pc:sldMasterMkLst>
+        <pc:spChg chg="mod">
+          <ac:chgData name="Björn Meder HMU Potsdam" userId="d258dbf6-ab6a-4282-851d-9abdcd54331d" providerId="ADAL" clId="{B6D57924-B848-2742-8D38-F6230294B7DC}" dt="2025-07-31T12:14:45.714" v="5"/>
+          <ac:spMkLst>
+            <pc:docMk/>
+            <pc:sldMasterMk cId="2618204342" sldId="2147483696"/>
+            <ac:spMk id="2" creationId="{00000000-0000-0000-0000-000000000000}"/>
+          </ac:spMkLst>
+        </pc:spChg>
+        <pc:spChg chg="mod">
+          <ac:chgData name="Björn Meder HMU Potsdam" userId="d258dbf6-ab6a-4282-851d-9abdcd54331d" providerId="ADAL" clId="{B6D57924-B848-2742-8D38-F6230294B7DC}" dt="2025-07-31T12:14:45.714" v="5"/>
+          <ac:spMkLst>
+            <pc:docMk/>
+            <pc:sldMasterMk cId="2618204342" sldId="2147483696"/>
+            <ac:spMk id="3" creationId="{00000000-0000-0000-0000-000000000000}"/>
+          </ac:spMkLst>
+        </pc:spChg>
+        <pc:spChg chg="mod">
+          <ac:chgData name="Björn Meder HMU Potsdam" userId="d258dbf6-ab6a-4282-851d-9abdcd54331d" providerId="ADAL" clId="{B6D57924-B848-2742-8D38-F6230294B7DC}" dt="2025-07-31T12:14:45.714" v="5"/>
+          <ac:spMkLst>
+            <pc:docMk/>
+            <pc:sldMasterMk cId="2618204342" sldId="2147483696"/>
+            <ac:spMk id="4" creationId="{00000000-0000-0000-0000-000000000000}"/>
+          </ac:spMkLst>
+        </pc:spChg>
+        <pc:spChg chg="mod">
+          <ac:chgData name="Björn Meder HMU Potsdam" userId="d258dbf6-ab6a-4282-851d-9abdcd54331d" providerId="ADAL" clId="{B6D57924-B848-2742-8D38-F6230294B7DC}" dt="2025-07-31T12:14:45.714" v="5"/>
+          <ac:spMkLst>
+            <pc:docMk/>
+            <pc:sldMasterMk cId="2618204342" sldId="2147483696"/>
+            <ac:spMk id="5" creationId="{00000000-0000-0000-0000-000000000000}"/>
+          </ac:spMkLst>
+        </pc:spChg>
+        <pc:spChg chg="mod">
+          <ac:chgData name="Björn Meder HMU Potsdam" userId="d258dbf6-ab6a-4282-851d-9abdcd54331d" providerId="ADAL" clId="{B6D57924-B848-2742-8D38-F6230294B7DC}" dt="2025-07-31T12:14:45.714" v="5"/>
+          <ac:spMkLst>
+            <pc:docMk/>
+            <pc:sldMasterMk cId="2618204342" sldId="2147483696"/>
+            <ac:spMk id="6" creationId="{00000000-0000-0000-0000-000000000000}"/>
+          </ac:spMkLst>
+        </pc:spChg>
+        <pc:sldLayoutChg chg="modSp">
+          <pc:chgData name="Björn Meder HMU Potsdam" userId="d258dbf6-ab6a-4282-851d-9abdcd54331d" providerId="ADAL" clId="{B6D57924-B848-2742-8D38-F6230294B7DC}" dt="2025-07-31T12:14:45.714" v="5"/>
+          <pc:sldLayoutMkLst>
+            <pc:docMk/>
+            <pc:sldMasterMk cId="2618204342" sldId="2147483696"/>
+            <pc:sldLayoutMk cId="4028182537" sldId="2147483697"/>
+          </pc:sldLayoutMkLst>
+          <pc:spChg chg="mod">
+            <ac:chgData name="Björn Meder HMU Potsdam" userId="d258dbf6-ab6a-4282-851d-9abdcd54331d" providerId="ADAL" clId="{B6D57924-B848-2742-8D38-F6230294B7DC}" dt="2025-07-31T12:14:45.714" v="5"/>
+            <ac:spMkLst>
+              <pc:docMk/>
+              <pc:sldMasterMk cId="2618204342" sldId="2147483696"/>
+              <pc:sldLayoutMk cId="4028182537" sldId="2147483697"/>
+              <ac:spMk id="2" creationId="{00000000-0000-0000-0000-000000000000}"/>
+            </ac:spMkLst>
+          </pc:spChg>
+          <pc:spChg chg="mod">
+            <ac:chgData name="Björn Meder HMU Potsdam" userId="d258dbf6-ab6a-4282-851d-9abdcd54331d" providerId="ADAL" clId="{B6D57924-B848-2742-8D38-F6230294B7DC}" dt="2025-07-31T12:14:45.714" v="5"/>
+            <ac:spMkLst>
+              <pc:docMk/>
+              <pc:sldMasterMk cId="2618204342" sldId="2147483696"/>
+              <pc:sldLayoutMk cId="4028182537" sldId="2147483697"/>
+              <ac:spMk id="3" creationId="{00000000-0000-0000-0000-000000000000}"/>
+            </ac:spMkLst>
+          </pc:spChg>
+        </pc:sldLayoutChg>
+        <pc:sldLayoutChg chg="modSp">
+          <pc:chgData name="Björn Meder HMU Potsdam" userId="d258dbf6-ab6a-4282-851d-9abdcd54331d" providerId="ADAL" clId="{B6D57924-B848-2742-8D38-F6230294B7DC}" dt="2025-07-31T12:14:45.714" v="5"/>
+          <pc:sldLayoutMkLst>
+            <pc:docMk/>
+            <pc:sldMasterMk cId="2618204342" sldId="2147483696"/>
+            <pc:sldLayoutMk cId="94315151" sldId="2147483699"/>
+          </pc:sldLayoutMkLst>
+          <pc:spChg chg="mod">
+            <ac:chgData name="Björn Meder HMU Potsdam" userId="d258dbf6-ab6a-4282-851d-9abdcd54331d" providerId="ADAL" clId="{B6D57924-B848-2742-8D38-F6230294B7DC}" dt="2025-07-31T12:14:45.714" v="5"/>
+            <ac:spMkLst>
+              <pc:docMk/>
+              <pc:sldMasterMk cId="2618204342" sldId="2147483696"/>
+              <pc:sldLayoutMk cId="94315151" sldId="2147483699"/>
+              <ac:spMk id="2" creationId="{00000000-0000-0000-0000-000000000000}"/>
+            </ac:spMkLst>
+          </pc:spChg>
+          <pc:spChg chg="mod">
+            <ac:chgData name="Björn Meder HMU Potsdam" userId="d258dbf6-ab6a-4282-851d-9abdcd54331d" providerId="ADAL" clId="{B6D57924-B848-2742-8D38-F6230294B7DC}" dt="2025-07-31T12:14:45.714" v="5"/>
+            <ac:spMkLst>
+              <pc:docMk/>
+              <pc:sldMasterMk cId="2618204342" sldId="2147483696"/>
+              <pc:sldLayoutMk cId="94315151" sldId="2147483699"/>
+              <ac:spMk id="3" creationId="{00000000-0000-0000-0000-000000000000}"/>
+            </ac:spMkLst>
+          </pc:spChg>
+        </pc:sldLayoutChg>
+        <pc:sldLayoutChg chg="modSp">
+          <pc:chgData name="Björn Meder HMU Potsdam" userId="d258dbf6-ab6a-4282-851d-9abdcd54331d" providerId="ADAL" clId="{B6D57924-B848-2742-8D38-F6230294B7DC}" dt="2025-07-31T12:14:45.714" v="5"/>
+          <pc:sldLayoutMkLst>
+            <pc:docMk/>
+            <pc:sldMasterMk cId="2618204342" sldId="2147483696"/>
+            <pc:sldLayoutMk cId="603476742" sldId="2147483700"/>
+          </pc:sldLayoutMkLst>
+          <pc:spChg chg="mod">
+            <ac:chgData name="Björn Meder HMU Potsdam" userId="d258dbf6-ab6a-4282-851d-9abdcd54331d" providerId="ADAL" clId="{B6D57924-B848-2742-8D38-F6230294B7DC}" dt="2025-07-31T12:14:45.714" v="5"/>
+            <ac:spMkLst>
+              <pc:docMk/>
+              <pc:sldMasterMk cId="2618204342" sldId="2147483696"/>
+              <pc:sldLayoutMk cId="603476742" sldId="2147483700"/>
+              <ac:spMk id="3" creationId="{00000000-0000-0000-0000-000000000000}"/>
+            </ac:spMkLst>
+          </pc:spChg>
+          <pc:spChg chg="mod">
+            <ac:chgData name="Björn Meder HMU Potsdam" userId="d258dbf6-ab6a-4282-851d-9abdcd54331d" providerId="ADAL" clId="{B6D57924-B848-2742-8D38-F6230294B7DC}" dt="2025-07-31T12:14:45.714" v="5"/>
+            <ac:spMkLst>
+              <pc:docMk/>
+              <pc:sldMasterMk cId="2618204342" sldId="2147483696"/>
+              <pc:sldLayoutMk cId="603476742" sldId="2147483700"/>
+              <ac:spMk id="4" creationId="{00000000-0000-0000-0000-000000000000}"/>
+            </ac:spMkLst>
+          </pc:spChg>
+        </pc:sldLayoutChg>
+        <pc:sldLayoutChg chg="modSp">
+          <pc:chgData name="Björn Meder HMU Potsdam" userId="d258dbf6-ab6a-4282-851d-9abdcd54331d" providerId="ADAL" clId="{B6D57924-B848-2742-8D38-F6230294B7DC}" dt="2025-07-31T12:14:45.714" v="5"/>
+          <pc:sldLayoutMkLst>
+            <pc:docMk/>
+            <pc:sldMasterMk cId="2618204342" sldId="2147483696"/>
+            <pc:sldLayoutMk cId="745039881" sldId="2147483701"/>
+          </pc:sldLayoutMkLst>
+          <pc:spChg chg="mod">
+            <ac:chgData name="Björn Meder HMU Potsdam" userId="d258dbf6-ab6a-4282-851d-9abdcd54331d" providerId="ADAL" clId="{B6D57924-B848-2742-8D38-F6230294B7DC}" dt="2025-07-31T12:14:45.714" v="5"/>
+            <ac:spMkLst>
+              <pc:docMk/>
+              <pc:sldMasterMk cId="2618204342" sldId="2147483696"/>
+              <pc:sldLayoutMk cId="745039881" sldId="2147483701"/>
+              <ac:spMk id="2" creationId="{00000000-0000-0000-0000-000000000000}"/>
+            </ac:spMkLst>
+          </pc:spChg>
+          <pc:spChg chg="mod">
+            <ac:chgData name="Björn Meder HMU Potsdam" userId="d258dbf6-ab6a-4282-851d-9abdcd54331d" providerId="ADAL" clId="{B6D57924-B848-2742-8D38-F6230294B7DC}" dt="2025-07-31T12:14:45.714" v="5"/>
+            <ac:spMkLst>
+              <pc:docMk/>
+              <pc:sldMasterMk cId="2618204342" sldId="2147483696"/>
+              <pc:sldLayoutMk cId="745039881" sldId="2147483701"/>
+              <ac:spMk id="3" creationId="{00000000-0000-0000-0000-000000000000}"/>
+            </ac:spMkLst>
+          </pc:spChg>
+          <pc:spChg chg="mod">
+            <ac:chgData name="Björn Meder HMU Potsdam" userId="d258dbf6-ab6a-4282-851d-9abdcd54331d" providerId="ADAL" clId="{B6D57924-B848-2742-8D38-F6230294B7DC}" dt="2025-07-31T12:14:45.714" v="5"/>
+            <ac:spMkLst>
+              <pc:docMk/>
+              <pc:sldMasterMk cId="2618204342" sldId="2147483696"/>
+              <pc:sldLayoutMk cId="745039881" sldId="2147483701"/>
+              <ac:spMk id="4" creationId="{00000000-0000-0000-0000-000000000000}"/>
+            </ac:spMkLst>
+          </pc:spChg>
+          <pc:spChg chg="mod">
+            <ac:chgData name="Björn Meder HMU Potsdam" userId="d258dbf6-ab6a-4282-851d-9abdcd54331d" providerId="ADAL" clId="{B6D57924-B848-2742-8D38-F6230294B7DC}" dt="2025-07-31T12:14:45.714" v="5"/>
+            <ac:spMkLst>
+              <pc:docMk/>
+              <pc:sldMasterMk cId="2618204342" sldId="2147483696"/>
+              <pc:sldLayoutMk cId="745039881" sldId="2147483701"/>
+              <ac:spMk id="5" creationId="{00000000-0000-0000-0000-000000000000}"/>
+            </ac:spMkLst>
+          </pc:spChg>
+          <pc:spChg chg="mod">
+            <ac:chgData name="Björn Meder HMU Potsdam" userId="d258dbf6-ab6a-4282-851d-9abdcd54331d" providerId="ADAL" clId="{B6D57924-B848-2742-8D38-F6230294B7DC}" dt="2025-07-31T12:14:45.714" v="5"/>
+            <ac:spMkLst>
+              <pc:docMk/>
+              <pc:sldMasterMk cId="2618204342" sldId="2147483696"/>
+              <pc:sldLayoutMk cId="745039881" sldId="2147483701"/>
+              <ac:spMk id="6" creationId="{00000000-0000-0000-0000-000000000000}"/>
+            </ac:spMkLst>
+          </pc:spChg>
+        </pc:sldLayoutChg>
+        <pc:sldLayoutChg chg="modSp">
+          <pc:chgData name="Björn Meder HMU Potsdam" userId="d258dbf6-ab6a-4282-851d-9abdcd54331d" providerId="ADAL" clId="{B6D57924-B848-2742-8D38-F6230294B7DC}" dt="2025-07-31T12:14:45.714" v="5"/>
+          <pc:sldLayoutMkLst>
+            <pc:docMk/>
+            <pc:sldMasterMk cId="2618204342" sldId="2147483696"/>
+            <pc:sldLayoutMk cId="1001682325" sldId="2147483704"/>
+          </pc:sldLayoutMkLst>
+          <pc:spChg chg="mod">
+            <ac:chgData name="Björn Meder HMU Potsdam" userId="d258dbf6-ab6a-4282-851d-9abdcd54331d" providerId="ADAL" clId="{B6D57924-B848-2742-8D38-F6230294B7DC}" dt="2025-07-31T12:14:45.714" v="5"/>
+            <ac:spMkLst>
+              <pc:docMk/>
+              <pc:sldMasterMk cId="2618204342" sldId="2147483696"/>
+              <pc:sldLayoutMk cId="1001682325" sldId="2147483704"/>
+              <ac:spMk id="2" creationId="{00000000-0000-0000-0000-000000000000}"/>
+            </ac:spMkLst>
+          </pc:spChg>
+          <pc:spChg chg="mod">
+            <ac:chgData name="Björn Meder HMU Potsdam" userId="d258dbf6-ab6a-4282-851d-9abdcd54331d" providerId="ADAL" clId="{B6D57924-B848-2742-8D38-F6230294B7DC}" dt="2025-07-31T12:14:45.714" v="5"/>
+            <ac:spMkLst>
+              <pc:docMk/>
+              <pc:sldMasterMk cId="2618204342" sldId="2147483696"/>
+              <pc:sldLayoutMk cId="1001682325" sldId="2147483704"/>
+              <ac:spMk id="3" creationId="{00000000-0000-0000-0000-000000000000}"/>
+            </ac:spMkLst>
+          </pc:spChg>
+          <pc:spChg chg="mod">
+            <ac:chgData name="Björn Meder HMU Potsdam" userId="d258dbf6-ab6a-4282-851d-9abdcd54331d" providerId="ADAL" clId="{B6D57924-B848-2742-8D38-F6230294B7DC}" dt="2025-07-31T12:14:45.714" v="5"/>
+            <ac:spMkLst>
+              <pc:docMk/>
+              <pc:sldMasterMk cId="2618204342" sldId="2147483696"/>
+              <pc:sldLayoutMk cId="1001682325" sldId="2147483704"/>
+              <ac:spMk id="4" creationId="{00000000-0000-0000-0000-000000000000}"/>
+            </ac:spMkLst>
+          </pc:spChg>
+        </pc:sldLayoutChg>
+        <pc:sldLayoutChg chg="modSp">
+          <pc:chgData name="Björn Meder HMU Potsdam" userId="d258dbf6-ab6a-4282-851d-9abdcd54331d" providerId="ADAL" clId="{B6D57924-B848-2742-8D38-F6230294B7DC}" dt="2025-07-31T12:14:45.714" v="5"/>
+          <pc:sldLayoutMkLst>
+            <pc:docMk/>
+            <pc:sldMasterMk cId="2618204342" sldId="2147483696"/>
+            <pc:sldLayoutMk cId="2365256577" sldId="2147483705"/>
+          </pc:sldLayoutMkLst>
+          <pc:spChg chg="mod">
+            <ac:chgData name="Björn Meder HMU Potsdam" userId="d258dbf6-ab6a-4282-851d-9abdcd54331d" providerId="ADAL" clId="{B6D57924-B848-2742-8D38-F6230294B7DC}" dt="2025-07-31T12:14:45.714" v="5"/>
+            <ac:spMkLst>
+              <pc:docMk/>
+              <pc:sldMasterMk cId="2618204342" sldId="2147483696"/>
+              <pc:sldLayoutMk cId="2365256577" sldId="2147483705"/>
+              <ac:spMk id="2" creationId="{00000000-0000-0000-0000-000000000000}"/>
+            </ac:spMkLst>
+          </pc:spChg>
+          <pc:spChg chg="mod">
+            <ac:chgData name="Björn Meder HMU Potsdam" userId="d258dbf6-ab6a-4282-851d-9abdcd54331d" providerId="ADAL" clId="{B6D57924-B848-2742-8D38-F6230294B7DC}" dt="2025-07-31T12:14:45.714" v="5"/>
+            <ac:spMkLst>
+              <pc:docMk/>
+              <pc:sldMasterMk cId="2618204342" sldId="2147483696"/>
+              <pc:sldLayoutMk cId="2365256577" sldId="2147483705"/>
+              <ac:spMk id="3" creationId="{00000000-0000-0000-0000-000000000000}"/>
+            </ac:spMkLst>
+          </pc:spChg>
+          <pc:spChg chg="mod">
+            <ac:chgData name="Björn Meder HMU Potsdam" userId="d258dbf6-ab6a-4282-851d-9abdcd54331d" providerId="ADAL" clId="{B6D57924-B848-2742-8D38-F6230294B7DC}" dt="2025-07-31T12:14:45.714" v="5"/>
+            <ac:spMkLst>
+              <pc:docMk/>
+              <pc:sldMasterMk cId="2618204342" sldId="2147483696"/>
+              <pc:sldLayoutMk cId="2365256577" sldId="2147483705"/>
+              <ac:spMk id="4" creationId="{00000000-0000-0000-0000-000000000000}"/>
+            </ac:spMkLst>
+          </pc:spChg>
+        </pc:sldLayoutChg>
+        <pc:sldLayoutChg chg="modSp">
+          <pc:chgData name="Björn Meder HMU Potsdam" userId="d258dbf6-ab6a-4282-851d-9abdcd54331d" providerId="ADAL" clId="{B6D57924-B848-2742-8D38-F6230294B7DC}" dt="2025-07-31T12:14:45.714" v="5"/>
+          <pc:sldLayoutMkLst>
+            <pc:docMk/>
+            <pc:sldMasterMk cId="2618204342" sldId="2147483696"/>
+            <pc:sldLayoutMk cId="3918179759" sldId="2147483707"/>
+          </pc:sldLayoutMkLst>
+          <pc:spChg chg="mod">
+            <ac:chgData name="Björn Meder HMU Potsdam" userId="d258dbf6-ab6a-4282-851d-9abdcd54331d" providerId="ADAL" clId="{B6D57924-B848-2742-8D38-F6230294B7DC}" dt="2025-07-31T12:14:45.714" v="5"/>
+            <ac:spMkLst>
+              <pc:docMk/>
+              <pc:sldMasterMk cId="2618204342" sldId="2147483696"/>
+              <pc:sldLayoutMk cId="3918179759" sldId="2147483707"/>
+              <ac:spMk id="2" creationId="{00000000-0000-0000-0000-000000000000}"/>
+            </ac:spMkLst>
+          </pc:spChg>
+          <pc:spChg chg="mod">
+            <ac:chgData name="Björn Meder HMU Potsdam" userId="d258dbf6-ab6a-4282-851d-9abdcd54331d" providerId="ADAL" clId="{B6D57924-B848-2742-8D38-F6230294B7DC}" dt="2025-07-31T12:14:45.714" v="5"/>
+            <ac:spMkLst>
+              <pc:docMk/>
+              <pc:sldMasterMk cId="2618204342" sldId="2147483696"/>
+              <pc:sldLayoutMk cId="3918179759" sldId="2147483707"/>
+              <ac:spMk id="3" creationId="{00000000-0000-0000-0000-000000000000}"/>
+            </ac:spMkLst>
+          </pc:spChg>
+        </pc:sldLayoutChg>
+      </pc:sldMasterChg>
+      <pc:sldMasterChg chg="modSp modSldLayout">
+        <pc:chgData name="Björn Meder HMU Potsdam" userId="d258dbf6-ab6a-4282-851d-9abdcd54331d" providerId="ADAL" clId="{B6D57924-B848-2742-8D38-F6230294B7DC}" dt="2025-07-31T12:14:56.840" v="8"/>
+        <pc:sldMasterMkLst>
+          <pc:docMk/>
+          <pc:sldMasterMk cId="4117015308" sldId="2147483708"/>
+        </pc:sldMasterMkLst>
+        <pc:spChg chg="mod">
+          <ac:chgData name="Björn Meder HMU Potsdam" userId="d258dbf6-ab6a-4282-851d-9abdcd54331d" providerId="ADAL" clId="{B6D57924-B848-2742-8D38-F6230294B7DC}" dt="2025-07-31T12:14:56.840" v="8"/>
+          <ac:spMkLst>
+            <pc:docMk/>
+            <pc:sldMasterMk cId="4117015308" sldId="2147483708"/>
+            <ac:spMk id="2" creationId="{00000000-0000-0000-0000-000000000000}"/>
+          </ac:spMkLst>
+        </pc:spChg>
+        <pc:spChg chg="mod">
+          <ac:chgData name="Björn Meder HMU Potsdam" userId="d258dbf6-ab6a-4282-851d-9abdcd54331d" providerId="ADAL" clId="{B6D57924-B848-2742-8D38-F6230294B7DC}" dt="2025-07-31T12:14:56.840" v="8"/>
+          <ac:spMkLst>
+            <pc:docMk/>
+            <pc:sldMasterMk cId="4117015308" sldId="2147483708"/>
+            <ac:spMk id="3" creationId="{00000000-0000-0000-0000-000000000000}"/>
+          </ac:spMkLst>
+        </pc:spChg>
+        <pc:spChg chg="mod">
+          <ac:chgData name="Björn Meder HMU Potsdam" userId="d258dbf6-ab6a-4282-851d-9abdcd54331d" providerId="ADAL" clId="{B6D57924-B848-2742-8D38-F6230294B7DC}" dt="2025-07-31T12:14:56.840" v="8"/>
+          <ac:spMkLst>
+            <pc:docMk/>
+            <pc:sldMasterMk cId="4117015308" sldId="2147483708"/>
+            <ac:spMk id="4" creationId="{00000000-0000-0000-0000-000000000000}"/>
+          </ac:spMkLst>
+        </pc:spChg>
+        <pc:spChg chg="mod">
+          <ac:chgData name="Björn Meder HMU Potsdam" userId="d258dbf6-ab6a-4282-851d-9abdcd54331d" providerId="ADAL" clId="{B6D57924-B848-2742-8D38-F6230294B7DC}" dt="2025-07-31T12:14:56.840" v="8"/>
+          <ac:spMkLst>
+            <pc:docMk/>
+            <pc:sldMasterMk cId="4117015308" sldId="2147483708"/>
+            <ac:spMk id="5" creationId="{00000000-0000-0000-0000-000000000000}"/>
+          </ac:spMkLst>
+        </pc:spChg>
+        <pc:spChg chg="mod">
+          <ac:chgData name="Björn Meder HMU Potsdam" userId="d258dbf6-ab6a-4282-851d-9abdcd54331d" providerId="ADAL" clId="{B6D57924-B848-2742-8D38-F6230294B7DC}" dt="2025-07-31T12:14:56.840" v="8"/>
+          <ac:spMkLst>
+            <pc:docMk/>
+            <pc:sldMasterMk cId="4117015308" sldId="2147483708"/>
+            <ac:spMk id="6" creationId="{00000000-0000-0000-0000-000000000000}"/>
+          </ac:spMkLst>
+        </pc:spChg>
+        <pc:sldLayoutChg chg="modSp">
+          <pc:chgData name="Björn Meder HMU Potsdam" userId="d258dbf6-ab6a-4282-851d-9abdcd54331d" providerId="ADAL" clId="{B6D57924-B848-2742-8D38-F6230294B7DC}" dt="2025-07-31T12:14:56.840" v="8"/>
+          <pc:sldLayoutMkLst>
+            <pc:docMk/>
+            <pc:sldMasterMk cId="4117015308" sldId="2147483708"/>
+            <pc:sldLayoutMk cId="1280892548" sldId="2147483709"/>
+          </pc:sldLayoutMkLst>
+          <pc:spChg chg="mod">
+            <ac:chgData name="Björn Meder HMU Potsdam" userId="d258dbf6-ab6a-4282-851d-9abdcd54331d" providerId="ADAL" clId="{B6D57924-B848-2742-8D38-F6230294B7DC}" dt="2025-07-31T12:14:56.840" v="8"/>
+            <ac:spMkLst>
+              <pc:docMk/>
+              <pc:sldMasterMk cId="4117015308" sldId="2147483708"/>
+              <pc:sldLayoutMk cId="1280892548" sldId="2147483709"/>
+              <ac:spMk id="2" creationId="{00000000-0000-0000-0000-000000000000}"/>
+            </ac:spMkLst>
+          </pc:spChg>
+          <pc:spChg chg="mod">
+            <ac:chgData name="Björn Meder HMU Potsdam" userId="d258dbf6-ab6a-4282-851d-9abdcd54331d" providerId="ADAL" clId="{B6D57924-B848-2742-8D38-F6230294B7DC}" dt="2025-07-31T12:14:56.840" v="8"/>
+            <ac:spMkLst>
+              <pc:docMk/>
+              <pc:sldMasterMk cId="4117015308" sldId="2147483708"/>
+              <pc:sldLayoutMk cId="1280892548" sldId="2147483709"/>
+              <ac:spMk id="3" creationId="{00000000-0000-0000-0000-000000000000}"/>
+            </ac:spMkLst>
+          </pc:spChg>
+        </pc:sldLayoutChg>
+        <pc:sldLayoutChg chg="modSp">
+          <pc:chgData name="Björn Meder HMU Potsdam" userId="d258dbf6-ab6a-4282-851d-9abdcd54331d" providerId="ADAL" clId="{B6D57924-B848-2742-8D38-F6230294B7DC}" dt="2025-07-31T12:14:56.840" v="8"/>
+          <pc:sldLayoutMkLst>
+            <pc:docMk/>
+            <pc:sldMasterMk cId="4117015308" sldId="2147483708"/>
+            <pc:sldLayoutMk cId="1884543042" sldId="2147483711"/>
+          </pc:sldLayoutMkLst>
+          <pc:spChg chg="mod">
+            <ac:chgData name="Björn Meder HMU Potsdam" userId="d258dbf6-ab6a-4282-851d-9abdcd54331d" providerId="ADAL" clId="{B6D57924-B848-2742-8D38-F6230294B7DC}" dt="2025-07-31T12:14:56.840" v="8"/>
+            <ac:spMkLst>
+              <pc:docMk/>
+              <pc:sldMasterMk cId="4117015308" sldId="2147483708"/>
+              <pc:sldLayoutMk cId="1884543042" sldId="2147483711"/>
+              <ac:spMk id="2" creationId="{00000000-0000-0000-0000-000000000000}"/>
+            </ac:spMkLst>
+          </pc:spChg>
+          <pc:spChg chg="mod">
+            <ac:chgData name="Björn Meder HMU Potsdam" userId="d258dbf6-ab6a-4282-851d-9abdcd54331d" providerId="ADAL" clId="{B6D57924-B848-2742-8D38-F6230294B7DC}" dt="2025-07-31T12:14:56.840" v="8"/>
+            <ac:spMkLst>
+              <pc:docMk/>
+              <pc:sldMasterMk cId="4117015308" sldId="2147483708"/>
+              <pc:sldLayoutMk cId="1884543042" sldId="2147483711"/>
+              <ac:spMk id="3" creationId="{00000000-0000-0000-0000-000000000000}"/>
+            </ac:spMkLst>
+          </pc:spChg>
+        </pc:sldLayoutChg>
+        <pc:sldLayoutChg chg="modSp">
+          <pc:chgData name="Björn Meder HMU Potsdam" userId="d258dbf6-ab6a-4282-851d-9abdcd54331d" providerId="ADAL" clId="{B6D57924-B848-2742-8D38-F6230294B7DC}" dt="2025-07-31T12:14:56.840" v="8"/>
+          <pc:sldLayoutMkLst>
+            <pc:docMk/>
+            <pc:sldMasterMk cId="4117015308" sldId="2147483708"/>
+            <pc:sldLayoutMk cId="2899403362" sldId="2147483712"/>
+          </pc:sldLayoutMkLst>
+          <pc:spChg chg="mod">
+            <ac:chgData name="Björn Meder HMU Potsdam" userId="d258dbf6-ab6a-4282-851d-9abdcd54331d" providerId="ADAL" clId="{B6D57924-B848-2742-8D38-F6230294B7DC}" dt="2025-07-31T12:14:56.840" v="8"/>
+            <ac:spMkLst>
+              <pc:docMk/>
+              <pc:sldMasterMk cId="4117015308" sldId="2147483708"/>
+              <pc:sldLayoutMk cId="2899403362" sldId="2147483712"/>
+              <ac:spMk id="3" creationId="{00000000-0000-0000-0000-000000000000}"/>
+            </ac:spMkLst>
+          </pc:spChg>
+          <pc:spChg chg="mod">
+            <ac:chgData name="Björn Meder HMU Potsdam" userId="d258dbf6-ab6a-4282-851d-9abdcd54331d" providerId="ADAL" clId="{B6D57924-B848-2742-8D38-F6230294B7DC}" dt="2025-07-31T12:14:56.840" v="8"/>
+            <ac:spMkLst>
+              <pc:docMk/>
+              <pc:sldMasterMk cId="4117015308" sldId="2147483708"/>
+              <pc:sldLayoutMk cId="2899403362" sldId="2147483712"/>
+              <ac:spMk id="4" creationId="{00000000-0000-0000-0000-000000000000}"/>
+            </ac:spMkLst>
+          </pc:spChg>
+        </pc:sldLayoutChg>
+        <pc:sldLayoutChg chg="modSp">
+          <pc:chgData name="Björn Meder HMU Potsdam" userId="d258dbf6-ab6a-4282-851d-9abdcd54331d" providerId="ADAL" clId="{B6D57924-B848-2742-8D38-F6230294B7DC}" dt="2025-07-31T12:14:56.840" v="8"/>
+          <pc:sldLayoutMkLst>
+            <pc:docMk/>
+            <pc:sldMasterMk cId="4117015308" sldId="2147483708"/>
+            <pc:sldLayoutMk cId="3191287041" sldId="2147483713"/>
+          </pc:sldLayoutMkLst>
+          <pc:spChg chg="mod">
+            <ac:chgData name="Björn Meder HMU Potsdam" userId="d258dbf6-ab6a-4282-851d-9abdcd54331d" providerId="ADAL" clId="{B6D57924-B848-2742-8D38-F6230294B7DC}" dt="2025-07-31T12:14:56.840" v="8"/>
+            <ac:spMkLst>
+              <pc:docMk/>
+              <pc:sldMasterMk cId="4117015308" sldId="2147483708"/>
+              <pc:sldLayoutMk cId="3191287041" sldId="2147483713"/>
+              <ac:spMk id="2" creationId="{00000000-0000-0000-0000-000000000000}"/>
+            </ac:spMkLst>
+          </pc:spChg>
+          <pc:spChg chg="mod">
+            <ac:chgData name="Björn Meder HMU Potsdam" userId="d258dbf6-ab6a-4282-851d-9abdcd54331d" providerId="ADAL" clId="{B6D57924-B848-2742-8D38-F6230294B7DC}" dt="2025-07-31T12:14:56.840" v="8"/>
+            <ac:spMkLst>
+              <pc:docMk/>
+              <pc:sldMasterMk cId="4117015308" sldId="2147483708"/>
+              <pc:sldLayoutMk cId="3191287041" sldId="2147483713"/>
+              <ac:spMk id="3" creationId="{00000000-0000-0000-0000-000000000000}"/>
+            </ac:spMkLst>
+          </pc:spChg>
+          <pc:spChg chg="mod">
+            <ac:chgData name="Björn Meder HMU Potsdam" userId="d258dbf6-ab6a-4282-851d-9abdcd54331d" providerId="ADAL" clId="{B6D57924-B848-2742-8D38-F6230294B7DC}" dt="2025-07-31T12:14:56.840" v="8"/>
+            <ac:spMkLst>
+              <pc:docMk/>
+              <pc:sldMasterMk cId="4117015308" sldId="2147483708"/>
+              <pc:sldLayoutMk cId="3191287041" sldId="2147483713"/>
+              <ac:spMk id="4" creationId="{00000000-0000-0000-0000-000000000000}"/>
+            </ac:spMkLst>
+          </pc:spChg>
+          <pc:spChg chg="mod">
+            <ac:chgData name="Björn Meder HMU Potsdam" userId="d258dbf6-ab6a-4282-851d-9abdcd54331d" providerId="ADAL" clId="{B6D57924-B848-2742-8D38-F6230294B7DC}" dt="2025-07-31T12:14:56.840" v="8"/>
+            <ac:spMkLst>
+              <pc:docMk/>
+              <pc:sldMasterMk cId="4117015308" sldId="2147483708"/>
+              <pc:sldLayoutMk cId="3191287041" sldId="2147483713"/>
+              <ac:spMk id="5" creationId="{00000000-0000-0000-0000-000000000000}"/>
+            </ac:spMkLst>
+          </pc:spChg>
+          <pc:spChg chg="mod">
+            <ac:chgData name="Björn Meder HMU Potsdam" userId="d258dbf6-ab6a-4282-851d-9abdcd54331d" providerId="ADAL" clId="{B6D57924-B848-2742-8D38-F6230294B7DC}" dt="2025-07-31T12:14:56.840" v="8"/>
+            <ac:spMkLst>
+              <pc:docMk/>
+              <pc:sldMasterMk cId="4117015308" sldId="2147483708"/>
+              <pc:sldLayoutMk cId="3191287041" sldId="2147483713"/>
+              <ac:spMk id="6" creationId="{00000000-0000-0000-0000-000000000000}"/>
+            </ac:spMkLst>
+          </pc:spChg>
+        </pc:sldLayoutChg>
+        <pc:sldLayoutChg chg="modSp">
+          <pc:chgData name="Björn Meder HMU Potsdam" userId="d258dbf6-ab6a-4282-851d-9abdcd54331d" providerId="ADAL" clId="{B6D57924-B848-2742-8D38-F6230294B7DC}" dt="2025-07-31T12:14:56.840" v="8"/>
+          <pc:sldLayoutMkLst>
+            <pc:docMk/>
+            <pc:sldMasterMk cId="4117015308" sldId="2147483708"/>
+            <pc:sldLayoutMk cId="2492687080" sldId="2147483716"/>
+          </pc:sldLayoutMkLst>
+          <pc:spChg chg="mod">
+            <ac:chgData name="Björn Meder HMU Potsdam" userId="d258dbf6-ab6a-4282-851d-9abdcd54331d" providerId="ADAL" clId="{B6D57924-B848-2742-8D38-F6230294B7DC}" dt="2025-07-31T12:14:56.840" v="8"/>
+            <ac:spMkLst>
+              <pc:docMk/>
+              <pc:sldMasterMk cId="4117015308" sldId="2147483708"/>
+              <pc:sldLayoutMk cId="2492687080" sldId="2147483716"/>
+              <ac:spMk id="2" creationId="{00000000-0000-0000-0000-000000000000}"/>
+            </ac:spMkLst>
+          </pc:spChg>
+          <pc:spChg chg="mod">
+            <ac:chgData name="Björn Meder HMU Potsdam" userId="d258dbf6-ab6a-4282-851d-9abdcd54331d" providerId="ADAL" clId="{B6D57924-B848-2742-8D38-F6230294B7DC}" dt="2025-07-31T12:14:56.840" v="8"/>
+            <ac:spMkLst>
+              <pc:docMk/>
+              <pc:sldMasterMk cId="4117015308" sldId="2147483708"/>
+              <pc:sldLayoutMk cId="2492687080" sldId="2147483716"/>
+              <ac:spMk id="3" creationId="{00000000-0000-0000-0000-000000000000}"/>
+            </ac:spMkLst>
+          </pc:spChg>
+          <pc:spChg chg="mod">
+            <ac:chgData name="Björn Meder HMU Potsdam" userId="d258dbf6-ab6a-4282-851d-9abdcd54331d" providerId="ADAL" clId="{B6D57924-B848-2742-8D38-F6230294B7DC}" dt="2025-07-31T12:14:56.840" v="8"/>
+            <ac:spMkLst>
+              <pc:docMk/>
+              <pc:sldMasterMk cId="4117015308" sldId="2147483708"/>
+              <pc:sldLayoutMk cId="2492687080" sldId="2147483716"/>
+              <ac:spMk id="4" creationId="{00000000-0000-0000-0000-000000000000}"/>
+            </ac:spMkLst>
+          </pc:spChg>
+        </pc:sldLayoutChg>
+        <pc:sldLayoutChg chg="modSp">
+          <pc:chgData name="Björn Meder HMU Potsdam" userId="d258dbf6-ab6a-4282-851d-9abdcd54331d" providerId="ADAL" clId="{B6D57924-B848-2742-8D38-F6230294B7DC}" dt="2025-07-31T12:14:56.840" v="8"/>
+          <pc:sldLayoutMkLst>
+            <pc:docMk/>
+            <pc:sldMasterMk cId="4117015308" sldId="2147483708"/>
+            <pc:sldLayoutMk cId="319162707" sldId="2147483717"/>
+          </pc:sldLayoutMkLst>
+          <pc:spChg chg="mod">
+            <ac:chgData name="Björn Meder HMU Potsdam" userId="d258dbf6-ab6a-4282-851d-9abdcd54331d" providerId="ADAL" clId="{B6D57924-B848-2742-8D38-F6230294B7DC}" dt="2025-07-31T12:14:56.840" v="8"/>
+            <ac:spMkLst>
+              <pc:docMk/>
+              <pc:sldMasterMk cId="4117015308" sldId="2147483708"/>
+              <pc:sldLayoutMk cId="319162707" sldId="2147483717"/>
+              <ac:spMk id="2" creationId="{00000000-0000-0000-0000-000000000000}"/>
+            </ac:spMkLst>
+          </pc:spChg>
+          <pc:spChg chg="mod">
+            <ac:chgData name="Björn Meder HMU Potsdam" userId="d258dbf6-ab6a-4282-851d-9abdcd54331d" providerId="ADAL" clId="{B6D57924-B848-2742-8D38-F6230294B7DC}" dt="2025-07-31T12:14:56.840" v="8"/>
+            <ac:spMkLst>
+              <pc:docMk/>
+              <pc:sldMasterMk cId="4117015308" sldId="2147483708"/>
+              <pc:sldLayoutMk cId="319162707" sldId="2147483717"/>
+              <ac:spMk id="3" creationId="{00000000-0000-0000-0000-000000000000}"/>
+            </ac:spMkLst>
+          </pc:spChg>
+          <pc:spChg chg="mod">
+            <ac:chgData name="Björn Meder HMU Potsdam" userId="d258dbf6-ab6a-4282-851d-9abdcd54331d" providerId="ADAL" clId="{B6D57924-B848-2742-8D38-F6230294B7DC}" dt="2025-07-31T12:14:56.840" v="8"/>
+            <ac:spMkLst>
+              <pc:docMk/>
+              <pc:sldMasterMk cId="4117015308" sldId="2147483708"/>
+              <pc:sldLayoutMk cId="319162707" sldId="2147483717"/>
+              <ac:spMk id="4" creationId="{00000000-0000-0000-0000-000000000000}"/>
+            </ac:spMkLst>
+          </pc:spChg>
+        </pc:sldLayoutChg>
+        <pc:sldLayoutChg chg="modSp">
+          <pc:chgData name="Björn Meder HMU Potsdam" userId="d258dbf6-ab6a-4282-851d-9abdcd54331d" providerId="ADAL" clId="{B6D57924-B848-2742-8D38-F6230294B7DC}" dt="2025-07-31T12:14:56.840" v="8"/>
+          <pc:sldLayoutMkLst>
+            <pc:docMk/>
+            <pc:sldMasterMk cId="4117015308" sldId="2147483708"/>
+            <pc:sldLayoutMk cId="3894819517" sldId="2147483719"/>
+          </pc:sldLayoutMkLst>
+          <pc:spChg chg="mod">
+            <ac:chgData name="Björn Meder HMU Potsdam" userId="d258dbf6-ab6a-4282-851d-9abdcd54331d" providerId="ADAL" clId="{B6D57924-B848-2742-8D38-F6230294B7DC}" dt="2025-07-31T12:14:56.840" v="8"/>
+            <ac:spMkLst>
+              <pc:docMk/>
+              <pc:sldMasterMk cId="4117015308" sldId="2147483708"/>
+              <pc:sldLayoutMk cId="3894819517" sldId="2147483719"/>
+              <ac:spMk id="2" creationId="{00000000-0000-0000-0000-000000000000}"/>
+            </ac:spMkLst>
+          </pc:spChg>
+          <pc:spChg chg="mod">
+            <ac:chgData name="Björn Meder HMU Potsdam" userId="d258dbf6-ab6a-4282-851d-9abdcd54331d" providerId="ADAL" clId="{B6D57924-B848-2742-8D38-F6230294B7DC}" dt="2025-07-31T12:14:56.840" v="8"/>
+            <ac:spMkLst>
+              <pc:docMk/>
+              <pc:sldMasterMk cId="4117015308" sldId="2147483708"/>
+              <pc:sldLayoutMk cId="3894819517" sldId="2147483719"/>
+              <ac:spMk id="3" creationId="{00000000-0000-0000-0000-000000000000}"/>
+            </ac:spMkLst>
+          </pc:spChg>
+        </pc:sldLayoutChg>
+      </pc:sldMasterChg>
+    </pc:docChg>
+  </pc:docChgLst>
+</pc:chgInfo>
 </file>
 
 <file path=ppt/slideLayouts/slideLayout1.xml><?xml version="1.0" encoding="utf-8"?>
@@ -144,8 +1157,8 @@
         </p:nvSpPr>
         <p:spPr>
           <a:xfrm>
-            <a:off x="1889919" y="706933"/>
-            <a:ext cx="11339513" cy="1503857"/>
+            <a:off x="2025055" y="706933"/>
+            <a:ext cx="12150329" cy="1503857"/>
           </a:xfrm>
         </p:spPr>
         <p:txBody>
@@ -176,8 +1189,8 @@
         </p:nvSpPr>
         <p:spPr>
           <a:xfrm>
-            <a:off x="1889919" y="2268784"/>
-            <a:ext cx="11339513" cy="1042900"/>
+            <a:off x="2025055" y="2268784"/>
+            <a:ext cx="12150329" cy="1042900"/>
           </a:xfrm>
         </p:spPr>
         <p:txBody>
@@ -246,7 +1259,7 @@
           <a:p>
             <a:fld id="{0A85FBF7-6189-C04A-8896-44241FF05286}" type="datetimeFigureOut">
               <a:rPr lang="en-US" smtClean="0"/>
-              <a:t>7/25/25</a:t>
+              <a:t>7/31/25</a:t>
             </a:fld>
             <a:endParaRPr lang="en-US"/>
           </a:p>
@@ -297,7 +1310,7 @@
     </p:spTree>
     <p:extLst>
       <p:ext uri="{BB962C8B-B14F-4D97-AF65-F5344CB8AC3E}">
-        <p14:creationId xmlns:p14="http://schemas.microsoft.com/office/powerpoint/2010/main" val="4028182537"/>
+        <p14:creationId xmlns:p14="http://schemas.microsoft.com/office/powerpoint/2010/main" val="1050654664"/>
       </p:ext>
     </p:extLst>
   </p:cSld>
@@ -416,7 +1429,7 @@
           <a:p>
             <a:fld id="{0A85FBF7-6189-C04A-8896-44241FF05286}" type="datetimeFigureOut">
               <a:rPr lang="en-US" smtClean="0"/>
-              <a:t>7/25/25</a:t>
+              <a:t>7/31/25</a:t>
             </a:fld>
             <a:endParaRPr lang="en-US"/>
           </a:p>
@@ -467,7 +1480,7 @@
     </p:spTree>
     <p:extLst>
       <p:ext uri="{BB962C8B-B14F-4D97-AF65-F5344CB8AC3E}">
-        <p14:creationId xmlns:p14="http://schemas.microsoft.com/office/powerpoint/2010/main" val="935497148"/>
+        <p14:creationId xmlns:p14="http://schemas.microsoft.com/office/powerpoint/2010/main" val="1636142878"/>
       </p:ext>
     </p:extLst>
   </p:cSld>
@@ -506,8 +1519,8 @@
         </p:nvSpPr>
         <p:spPr>
           <a:xfrm>
-            <a:off x="10819785" y="229978"/>
-            <a:ext cx="3260110" cy="3660651"/>
+            <a:off x="11593439" y="229978"/>
+            <a:ext cx="3493219" cy="3660651"/>
           </a:xfrm>
         </p:spPr>
         <p:txBody>
@@ -534,8 +1547,8 @@
         </p:nvSpPr>
         <p:spPr>
           <a:xfrm>
-            <a:off x="1039455" y="229978"/>
-            <a:ext cx="9591338" cy="3660651"/>
+            <a:off x="1113780" y="229978"/>
+            <a:ext cx="10277153" cy="3660651"/>
           </a:xfrm>
         </p:spPr>
         <p:txBody>
@@ -596,7 +1609,7 @@
           <a:p>
             <a:fld id="{0A85FBF7-6189-C04A-8896-44241FF05286}" type="datetimeFigureOut">
               <a:rPr lang="en-US" smtClean="0"/>
-              <a:t>7/25/25</a:t>
+              <a:t>7/31/25</a:t>
             </a:fld>
             <a:endParaRPr lang="en-US"/>
           </a:p>
@@ -647,7 +1660,7 @@
     </p:spTree>
     <p:extLst>
       <p:ext uri="{BB962C8B-B14F-4D97-AF65-F5344CB8AC3E}">
-        <p14:creationId xmlns:p14="http://schemas.microsoft.com/office/powerpoint/2010/main" val="3918179759"/>
+        <p14:creationId xmlns:p14="http://schemas.microsoft.com/office/powerpoint/2010/main" val="2955267420"/>
       </p:ext>
     </p:extLst>
   </p:cSld>
@@ -766,7 +1779,7 @@
           <a:p>
             <a:fld id="{0A85FBF7-6189-C04A-8896-44241FF05286}" type="datetimeFigureOut">
               <a:rPr lang="en-US" smtClean="0"/>
-              <a:t>7/25/25</a:t>
+              <a:t>7/31/25</a:t>
             </a:fld>
             <a:endParaRPr lang="en-US"/>
           </a:p>
@@ -817,7 +1830,7 @@
     </p:spTree>
     <p:extLst>
       <p:ext uri="{BB962C8B-B14F-4D97-AF65-F5344CB8AC3E}">
-        <p14:creationId xmlns:p14="http://schemas.microsoft.com/office/powerpoint/2010/main" val="4068026903"/>
+        <p14:creationId xmlns:p14="http://schemas.microsoft.com/office/powerpoint/2010/main" val="2932151373"/>
       </p:ext>
     </p:extLst>
   </p:cSld>
@@ -856,8 +1869,8 @@
         </p:nvSpPr>
         <p:spPr>
           <a:xfrm>
-            <a:off x="1031581" y="1076898"/>
-            <a:ext cx="13040439" cy="1796828"/>
+            <a:off x="1105342" y="1076898"/>
+            <a:ext cx="13972878" cy="1796828"/>
           </a:xfrm>
         </p:spPr>
         <p:txBody>
@@ -888,8 +1901,8 @@
         </p:nvSpPr>
         <p:spPr>
           <a:xfrm>
-            <a:off x="1031581" y="2890725"/>
-            <a:ext cx="13040439" cy="944910"/>
+            <a:off x="1105342" y="2890725"/>
+            <a:ext cx="13972878" cy="944910"/>
           </a:xfrm>
         </p:spPr>
         <p:txBody>
@@ -1012,7 +2025,7 @@
           <a:p>
             <a:fld id="{0A85FBF7-6189-C04A-8896-44241FF05286}" type="datetimeFigureOut">
               <a:rPr lang="en-US" smtClean="0"/>
-              <a:t>7/25/25</a:t>
+              <a:t>7/31/25</a:t>
             </a:fld>
             <a:endParaRPr lang="en-US"/>
           </a:p>
@@ -1063,7 +2076,7 @@
     </p:spTree>
     <p:extLst>
       <p:ext uri="{BB962C8B-B14F-4D97-AF65-F5344CB8AC3E}">
-        <p14:creationId xmlns:p14="http://schemas.microsoft.com/office/powerpoint/2010/main" val="94315151"/>
+        <p14:creationId xmlns:p14="http://schemas.microsoft.com/office/powerpoint/2010/main" val="204727200"/>
       </p:ext>
     </p:extLst>
   </p:cSld>
@@ -1125,8 +2138,8 @@
         </p:nvSpPr>
         <p:spPr>
           <a:xfrm>
-            <a:off x="1039455" y="1149890"/>
-            <a:ext cx="6425724" cy="2740739"/>
+            <a:off x="1113780" y="1149890"/>
+            <a:ext cx="6885186" cy="2740739"/>
           </a:xfrm>
         </p:spPr>
         <p:txBody>
@@ -1182,8 +2195,8 @@
         </p:nvSpPr>
         <p:spPr>
           <a:xfrm>
-            <a:off x="7654171" y="1149890"/>
-            <a:ext cx="6425724" cy="2740739"/>
+            <a:off x="8201472" y="1149890"/>
+            <a:ext cx="6885186" cy="2740739"/>
           </a:xfrm>
         </p:spPr>
         <p:txBody>
@@ -1244,7 +2257,7 @@
           <a:p>
             <a:fld id="{0A85FBF7-6189-C04A-8896-44241FF05286}" type="datetimeFigureOut">
               <a:rPr lang="en-US" smtClean="0"/>
-              <a:t>7/25/25</a:t>
+              <a:t>7/31/25</a:t>
             </a:fld>
             <a:endParaRPr lang="en-US"/>
           </a:p>
@@ -1295,7 +2308,7 @@
     </p:spTree>
     <p:extLst>
       <p:ext uri="{BB962C8B-B14F-4D97-AF65-F5344CB8AC3E}">
-        <p14:creationId xmlns:p14="http://schemas.microsoft.com/office/powerpoint/2010/main" val="603476742"/>
+        <p14:creationId xmlns:p14="http://schemas.microsoft.com/office/powerpoint/2010/main" val="3883978424"/>
       </p:ext>
     </p:extLst>
   </p:cSld>
@@ -1334,8 +2347,8 @@
         </p:nvSpPr>
         <p:spPr>
           <a:xfrm>
-            <a:off x="1041425" y="229978"/>
-            <a:ext cx="13040439" cy="834921"/>
+            <a:off x="1115890" y="229978"/>
+            <a:ext cx="13972878" cy="834921"/>
           </a:xfrm>
         </p:spPr>
         <p:txBody>
@@ -1362,8 +2375,8 @@
         </p:nvSpPr>
         <p:spPr>
           <a:xfrm>
-            <a:off x="1041425" y="1058899"/>
-            <a:ext cx="6396193" cy="518950"/>
+            <a:off x="1115891" y="1058899"/>
+            <a:ext cx="6853544" cy="518950"/>
           </a:xfrm>
         </p:spPr>
         <p:txBody>
@@ -1427,8 +2440,8 @@
         </p:nvSpPr>
         <p:spPr>
           <a:xfrm>
-            <a:off x="1041425" y="1577849"/>
-            <a:ext cx="6396193" cy="2320779"/>
+            <a:off x="1115891" y="1577849"/>
+            <a:ext cx="6853544" cy="2320779"/>
           </a:xfrm>
         </p:spPr>
         <p:txBody>
@@ -1484,8 +2497,8 @@
         </p:nvSpPr>
         <p:spPr>
           <a:xfrm>
-            <a:off x="7654171" y="1058899"/>
-            <a:ext cx="6427693" cy="518950"/>
+            <a:off x="8201472" y="1058899"/>
+            <a:ext cx="6887296" cy="518950"/>
           </a:xfrm>
         </p:spPr>
         <p:txBody>
@@ -1549,8 +2562,8 @@
         </p:nvSpPr>
         <p:spPr>
           <a:xfrm>
-            <a:off x="7654171" y="1577849"/>
-            <a:ext cx="6427693" cy="2320779"/>
+            <a:off x="8201472" y="1577849"/>
+            <a:ext cx="6887296" cy="2320779"/>
           </a:xfrm>
         </p:spPr>
         <p:txBody>
@@ -1611,7 +2624,7 @@
           <a:p>
             <a:fld id="{0A85FBF7-6189-C04A-8896-44241FF05286}" type="datetimeFigureOut">
               <a:rPr lang="en-US" smtClean="0"/>
-              <a:t>7/25/25</a:t>
+              <a:t>7/31/25</a:t>
             </a:fld>
             <a:endParaRPr lang="en-US"/>
           </a:p>
@@ -1662,7 +2675,7 @@
     </p:spTree>
     <p:extLst>
       <p:ext uri="{BB962C8B-B14F-4D97-AF65-F5344CB8AC3E}">
-        <p14:creationId xmlns:p14="http://schemas.microsoft.com/office/powerpoint/2010/main" val="745039881"/>
+        <p14:creationId xmlns:p14="http://schemas.microsoft.com/office/powerpoint/2010/main" val="1360372541"/>
       </p:ext>
     </p:extLst>
   </p:cSld>
@@ -1729,7 +2742,7 @@
           <a:p>
             <a:fld id="{0A85FBF7-6189-C04A-8896-44241FF05286}" type="datetimeFigureOut">
               <a:rPr lang="en-US" smtClean="0"/>
-              <a:t>7/25/25</a:t>
+              <a:t>7/31/25</a:t>
             </a:fld>
             <a:endParaRPr lang="en-US"/>
           </a:p>
@@ -1780,7 +2793,7 @@
     </p:spTree>
     <p:extLst>
       <p:ext uri="{BB962C8B-B14F-4D97-AF65-F5344CB8AC3E}">
-        <p14:creationId xmlns:p14="http://schemas.microsoft.com/office/powerpoint/2010/main" val="1363991591"/>
+        <p14:creationId xmlns:p14="http://schemas.microsoft.com/office/powerpoint/2010/main" val="2355312707"/>
       </p:ext>
     </p:extLst>
   </p:cSld>
@@ -1824,7 +2837,7 @@
           <a:p>
             <a:fld id="{0A85FBF7-6189-C04A-8896-44241FF05286}" type="datetimeFigureOut">
               <a:rPr lang="en-US" smtClean="0"/>
-              <a:t>7/25/25</a:t>
+              <a:t>7/31/25</a:t>
             </a:fld>
             <a:endParaRPr lang="en-US"/>
           </a:p>
@@ -1875,7 +2888,7 @@
     </p:spTree>
     <p:extLst>
       <p:ext uri="{BB962C8B-B14F-4D97-AF65-F5344CB8AC3E}">
-        <p14:creationId xmlns:p14="http://schemas.microsoft.com/office/powerpoint/2010/main" val="721827635"/>
+        <p14:creationId xmlns:p14="http://schemas.microsoft.com/office/powerpoint/2010/main" val="1273673777"/>
       </p:ext>
     </p:extLst>
   </p:cSld>
@@ -1914,8 +2927,8 @@
         </p:nvSpPr>
         <p:spPr>
           <a:xfrm>
-            <a:off x="1041425" y="287972"/>
-            <a:ext cx="4876383" cy="1007904"/>
+            <a:off x="1115891" y="287972"/>
+            <a:ext cx="5225062" cy="1007904"/>
           </a:xfrm>
         </p:spPr>
         <p:txBody>
@@ -1946,8 +2959,8 @@
         </p:nvSpPr>
         <p:spPr>
           <a:xfrm>
-            <a:off x="6427693" y="621941"/>
-            <a:ext cx="7654171" cy="3069707"/>
+            <a:off x="6887296" y="621941"/>
+            <a:ext cx="8201472" cy="3069707"/>
           </a:xfrm>
         </p:spPr>
         <p:txBody>
@@ -2031,8 +3044,8 @@
         </p:nvSpPr>
         <p:spPr>
           <a:xfrm>
-            <a:off x="1041425" y="1295877"/>
-            <a:ext cx="4876383" cy="2400771"/>
+            <a:off x="1115891" y="1295877"/>
+            <a:ext cx="5225062" cy="2400771"/>
           </a:xfrm>
         </p:spPr>
         <p:txBody>
@@ -2101,7 +3114,7 @@
           <a:p>
             <a:fld id="{0A85FBF7-6189-C04A-8896-44241FF05286}" type="datetimeFigureOut">
               <a:rPr lang="en-US" smtClean="0"/>
-              <a:t>7/25/25</a:t>
+              <a:t>7/31/25</a:t>
             </a:fld>
             <a:endParaRPr lang="en-US"/>
           </a:p>
@@ -2152,7 +3165,7 @@
     </p:spTree>
     <p:extLst>
       <p:ext uri="{BB962C8B-B14F-4D97-AF65-F5344CB8AC3E}">
-        <p14:creationId xmlns:p14="http://schemas.microsoft.com/office/powerpoint/2010/main" val="1001682325"/>
+        <p14:creationId xmlns:p14="http://schemas.microsoft.com/office/powerpoint/2010/main" val="3923583607"/>
       </p:ext>
     </p:extLst>
   </p:cSld>
@@ -2191,8 +3204,8 @@
         </p:nvSpPr>
         <p:spPr>
           <a:xfrm>
-            <a:off x="1041425" y="287972"/>
-            <a:ext cx="4876383" cy="1007904"/>
+            <a:off x="1115891" y="287972"/>
+            <a:ext cx="5225062" cy="1007904"/>
           </a:xfrm>
         </p:spPr>
         <p:txBody>
@@ -2223,8 +3236,8 @@
         </p:nvSpPr>
         <p:spPr>
           <a:xfrm>
-            <a:off x="6427693" y="621941"/>
-            <a:ext cx="7654171" cy="3069707"/>
+            <a:off x="6887296" y="621941"/>
+            <a:ext cx="8201472" cy="3069707"/>
           </a:xfrm>
         </p:spPr>
         <p:txBody>
@@ -2288,8 +3301,8 @@
         </p:nvSpPr>
         <p:spPr>
           <a:xfrm>
-            <a:off x="1041425" y="1295877"/>
-            <a:ext cx="4876383" cy="2400771"/>
+            <a:off x="1115891" y="1295877"/>
+            <a:ext cx="5225062" cy="2400771"/>
           </a:xfrm>
         </p:spPr>
         <p:txBody>
@@ -2358,7 +3371,7 @@
           <a:p>
             <a:fld id="{0A85FBF7-6189-C04A-8896-44241FF05286}" type="datetimeFigureOut">
               <a:rPr lang="en-US" smtClean="0"/>
-              <a:t>7/25/25</a:t>
+              <a:t>7/31/25</a:t>
             </a:fld>
             <a:endParaRPr lang="en-US"/>
           </a:p>
@@ -2409,7 +3422,7 @@
     </p:spTree>
     <p:extLst>
       <p:ext uri="{BB962C8B-B14F-4D97-AF65-F5344CB8AC3E}">
-        <p14:creationId xmlns:p14="http://schemas.microsoft.com/office/powerpoint/2010/main" val="2365256577"/>
+        <p14:creationId xmlns:p14="http://schemas.microsoft.com/office/powerpoint/2010/main" val="2327092376"/>
       </p:ext>
     </p:extLst>
   </p:cSld>
@@ -2453,8 +3466,8 @@
         </p:nvSpPr>
         <p:spPr>
           <a:xfrm>
-            <a:off x="1039456" y="229978"/>
-            <a:ext cx="13040439" cy="834921"/>
+            <a:off x="1113780" y="229978"/>
+            <a:ext cx="13972878" cy="834921"/>
           </a:xfrm>
           <a:prstGeom prst="rect">
             <a:avLst/>
@@ -2486,8 +3499,8 @@
         </p:nvSpPr>
         <p:spPr>
           <a:xfrm>
-            <a:off x="1039456" y="1149890"/>
-            <a:ext cx="13040439" cy="2740739"/>
+            <a:off x="1113780" y="1149890"/>
+            <a:ext cx="13972878" cy="2740739"/>
           </a:xfrm>
           <a:prstGeom prst="rect">
             <a:avLst/>
@@ -2548,8 +3561,8 @@
         </p:nvSpPr>
         <p:spPr>
           <a:xfrm>
-            <a:off x="1039455" y="4003618"/>
-            <a:ext cx="3401854" cy="229978"/>
+            <a:off x="1113780" y="4003618"/>
+            <a:ext cx="3645099" cy="229978"/>
           </a:xfrm>
           <a:prstGeom prst="rect">
             <a:avLst/>
@@ -2571,7 +3584,7 @@
           <a:p>
             <a:fld id="{0A85FBF7-6189-C04A-8896-44241FF05286}" type="datetimeFigureOut">
               <a:rPr lang="en-US" smtClean="0"/>
-              <a:t>7/25/25</a:t>
+              <a:t>7/31/25</a:t>
             </a:fld>
             <a:endParaRPr lang="en-US"/>
           </a:p>
@@ -2589,8 +3602,8 @@
         </p:nvSpPr>
         <p:spPr>
           <a:xfrm>
-            <a:off x="5008285" y="4003618"/>
-            <a:ext cx="5102781" cy="229978"/>
+            <a:off x="5366395" y="4003618"/>
+            <a:ext cx="5467648" cy="229978"/>
           </a:xfrm>
           <a:prstGeom prst="rect">
             <a:avLst/>
@@ -2626,8 +3639,8 @@
         </p:nvSpPr>
         <p:spPr>
           <a:xfrm>
-            <a:off x="10678041" y="4003618"/>
-            <a:ext cx="3401854" cy="229978"/>
+            <a:off x="11441559" y="4003618"/>
+            <a:ext cx="3645099" cy="229978"/>
           </a:xfrm>
           <a:prstGeom prst="rect">
             <a:avLst/>
@@ -2658,23 +3671,23 @@
     </p:spTree>
     <p:extLst>
       <p:ext uri="{BB962C8B-B14F-4D97-AF65-F5344CB8AC3E}">
-        <p14:creationId xmlns:p14="http://schemas.microsoft.com/office/powerpoint/2010/main" val="2618204342"/>
+        <p14:creationId xmlns:p14="http://schemas.microsoft.com/office/powerpoint/2010/main" val="4181768090"/>
       </p:ext>
     </p:extLst>
   </p:cSld>
   <p:clrMap bg1="lt1" tx1="dk1" bg2="lt2" tx2="dk2" accent1="accent1" accent2="accent2" accent3="accent3" accent4="accent4" accent5="accent5" accent6="accent6" hlink="hlink" folHlink="folHlink"/>
   <p:sldLayoutIdLst>
-    <p:sldLayoutId id="2147483697" r:id="rId1"/>
-    <p:sldLayoutId id="2147483698" r:id="rId2"/>
-    <p:sldLayoutId id="2147483699" r:id="rId3"/>
-    <p:sldLayoutId id="2147483700" r:id="rId4"/>
-    <p:sldLayoutId id="2147483701" r:id="rId5"/>
-    <p:sldLayoutId id="2147483702" r:id="rId6"/>
-    <p:sldLayoutId id="2147483703" r:id="rId7"/>
-    <p:sldLayoutId id="2147483704" r:id="rId8"/>
-    <p:sldLayoutId id="2147483705" r:id="rId9"/>
-    <p:sldLayoutId id="2147483706" r:id="rId10"/>
-    <p:sldLayoutId id="2147483707" r:id="rId11"/>
+    <p:sldLayoutId id="2147483721" r:id="rId1"/>
+    <p:sldLayoutId id="2147483722" r:id="rId2"/>
+    <p:sldLayoutId id="2147483723" r:id="rId3"/>
+    <p:sldLayoutId id="2147483724" r:id="rId4"/>
+    <p:sldLayoutId id="2147483725" r:id="rId5"/>
+    <p:sldLayoutId id="2147483726" r:id="rId6"/>
+    <p:sldLayoutId id="2147483727" r:id="rId7"/>
+    <p:sldLayoutId id="2147483728" r:id="rId8"/>
+    <p:sldLayoutId id="2147483729" r:id="rId9"/>
+    <p:sldLayoutId id="2147483730" r:id="rId10"/>
+    <p:sldLayoutId id="2147483731" r:id="rId11"/>
   </p:sldLayoutIdLst>
   <p:txStyles>
     <p:titleStyle>
@@ -2978,10 +3991,10 @@
       </p:grpSpPr>
       <p:grpSp>
         <p:nvGrpSpPr>
-          <p:cNvPr id="58" name="Group 57">
+          <p:cNvPr id="72" name="Group 71">
             <a:extLst>
               <a:ext uri="{FF2B5EF4-FFF2-40B4-BE49-F238E27FC236}">
-                <a16:creationId xmlns:a16="http://schemas.microsoft.com/office/drawing/2014/main" id="{AAEA2726-7F98-5339-2BA6-DF72C4BFC99E}"/>
+                <a16:creationId xmlns:a16="http://schemas.microsoft.com/office/drawing/2014/main" id="{8C5A062D-DCEF-9B03-BB80-80805C9B5A1A}"/>
               </a:ext>
             </a:extLst>
           </p:cNvPr>
@@ -2992,7 +4005,7 @@
         </p:nvGrpSpPr>
         <p:grpSpPr>
           <a:xfrm>
-            <a:off x="11173777" y="627626"/>
+            <a:off x="12305948" y="647296"/>
             <a:ext cx="3686651" cy="3464787"/>
             <a:chOff x="12921456" y="19185731"/>
             <a:chExt cx="7395448" cy="6950372"/>
@@ -3000,10 +4013,10 @@
         </p:grpSpPr>
         <p:pic>
           <p:nvPicPr>
-            <p:cNvPr id="59" name="Picture 58">
+            <p:cNvPr id="73" name="Picture 72">
               <a:extLst>
                 <a:ext uri="{FF2B5EF4-FFF2-40B4-BE49-F238E27FC236}">
-                  <a16:creationId xmlns:a16="http://schemas.microsoft.com/office/drawing/2014/main" id="{86465171-18EC-4025-88E7-2B9EBF3D6D6A}"/>
+                  <a16:creationId xmlns:a16="http://schemas.microsoft.com/office/drawing/2014/main" id="{4D833517-E369-DC4E-36B8-412528AFB6AC}"/>
                 </a:ext>
               </a:extLst>
             </p:cNvPr>
@@ -3030,10 +4043,10 @@
         </p:pic>
         <p:pic>
           <p:nvPicPr>
-            <p:cNvPr id="60" name="Picture 59">
+            <p:cNvPr id="74" name="Picture 73">
               <a:extLst>
                 <a:ext uri="{FF2B5EF4-FFF2-40B4-BE49-F238E27FC236}">
-                  <a16:creationId xmlns:a16="http://schemas.microsoft.com/office/drawing/2014/main" id="{3DBE54EE-B891-5F8F-8F43-140A57F4B106}"/>
+                  <a16:creationId xmlns:a16="http://schemas.microsoft.com/office/drawing/2014/main" id="{3C7E44D5-EF63-5F2B-8524-635565F7A02E}"/>
                 </a:ext>
               </a:extLst>
             </p:cNvPr>
@@ -3060,10 +4073,10 @@
         </p:pic>
         <p:pic>
           <p:nvPicPr>
-            <p:cNvPr id="61" name="Picture 60">
+            <p:cNvPr id="75" name="Picture 74">
               <a:extLst>
                 <a:ext uri="{FF2B5EF4-FFF2-40B4-BE49-F238E27FC236}">
-                  <a16:creationId xmlns:a16="http://schemas.microsoft.com/office/drawing/2014/main" id="{E6F00B0B-E240-1F0C-6D52-5656FD86B58E}"/>
+                  <a16:creationId xmlns:a16="http://schemas.microsoft.com/office/drawing/2014/main" id="{F1327967-F772-544C-68D0-48B785722FC7}"/>
                 </a:ext>
               </a:extLst>
             </p:cNvPr>
@@ -3090,10 +4103,10 @@
         </p:pic>
         <p:pic>
           <p:nvPicPr>
-            <p:cNvPr id="62" name="Picture 61">
+            <p:cNvPr id="76" name="Picture 75">
               <a:extLst>
                 <a:ext uri="{FF2B5EF4-FFF2-40B4-BE49-F238E27FC236}">
-                  <a16:creationId xmlns:a16="http://schemas.microsoft.com/office/drawing/2014/main" id="{F46F529E-34A6-B789-AB51-F571106EC21D}"/>
+                  <a16:creationId xmlns:a16="http://schemas.microsoft.com/office/drawing/2014/main" id="{EBC2816A-6DEB-6258-6E29-8E52FFF31D60}"/>
                 </a:ext>
               </a:extLst>
             </p:cNvPr>
@@ -3122,10 +4135,10 @@
       </p:grpSp>
       <p:grpSp>
         <p:nvGrpSpPr>
-          <p:cNvPr id="63" name="Group 62">
+          <p:cNvPr id="77" name="Group 76">
             <a:extLst>
               <a:ext uri="{FF2B5EF4-FFF2-40B4-BE49-F238E27FC236}">
-                <a16:creationId xmlns:a16="http://schemas.microsoft.com/office/drawing/2014/main" id="{0AAB4D51-8856-A9D9-DF54-C0C9DD73BADB}"/>
+                <a16:creationId xmlns:a16="http://schemas.microsoft.com/office/drawing/2014/main" id="{CAC4BBE2-0F68-D05C-5DA1-BF71C5CC5F0B}"/>
               </a:ext>
             </a:extLst>
           </p:cNvPr>
@@ -3136,18 +4149,18 @@
         </p:nvGrpSpPr>
         <p:grpSpPr>
           <a:xfrm>
-            <a:off x="135466" y="372430"/>
-            <a:ext cx="5731216" cy="3609612"/>
+            <a:off x="0" y="439773"/>
+            <a:ext cx="6058691" cy="3815861"/>
             <a:chOff x="231563" y="2575404"/>
             <a:chExt cx="4962849" cy="3125682"/>
           </a:xfrm>
         </p:grpSpPr>
         <p:pic>
           <p:nvPicPr>
-            <p:cNvPr id="64" name="Picture 63">
+            <p:cNvPr id="78" name="Picture 77">
               <a:extLst>
                 <a:ext uri="{FF2B5EF4-FFF2-40B4-BE49-F238E27FC236}">
-                  <a16:creationId xmlns:a16="http://schemas.microsoft.com/office/drawing/2014/main" id="{671E9904-D274-27A3-0C2A-82D837EF23A4}"/>
+                  <a16:creationId xmlns:a16="http://schemas.microsoft.com/office/drawing/2014/main" id="{8BDFA837-32AC-4361-D200-E5293BB27F26}"/>
                 </a:ext>
               </a:extLst>
             </p:cNvPr>
@@ -3175,10 +4188,10 @@
         </p:pic>
         <p:pic>
           <p:nvPicPr>
-            <p:cNvPr id="65" name="Image" descr="Image">
+            <p:cNvPr id="79" name="Image" descr="Image">
               <a:extLst>
                 <a:ext uri="{FF2B5EF4-FFF2-40B4-BE49-F238E27FC236}">
-                  <a16:creationId xmlns:a16="http://schemas.microsoft.com/office/drawing/2014/main" id="{068117E3-0536-BAF7-CB32-D47F23179B92}"/>
+                  <a16:creationId xmlns:a16="http://schemas.microsoft.com/office/drawing/2014/main" id="{2CE87A36-6892-A49A-9610-B6CBDCA826E5}"/>
                 </a:ext>
               </a:extLst>
             </p:cNvPr>
@@ -3211,10 +4224,10 @@
       </p:grpSp>
       <p:sp>
         <p:nvSpPr>
-          <p:cNvPr id="66" name="TextBox 65">
+          <p:cNvPr id="80" name="TextBox 79">
             <a:extLst>
               <a:ext uri="{FF2B5EF4-FFF2-40B4-BE49-F238E27FC236}">
-                <a16:creationId xmlns:a16="http://schemas.microsoft.com/office/drawing/2014/main" id="{1507D06C-F529-A716-3FA2-38C641CD6299}"/>
+                <a16:creationId xmlns:a16="http://schemas.microsoft.com/office/drawing/2014/main" id="{E71E4D08-87DF-61BD-C1FF-2F48DF5FBA20}"/>
               </a:ext>
             </a:extLst>
           </p:cNvPr>
@@ -3223,7 +4236,7 @@
         </p:nvSpPr>
         <p:spPr>
           <a:xfrm>
-            <a:off x="2259954" y="12605"/>
+            <a:off x="2508719" y="-8041"/>
             <a:ext cx="857799" cy="492443"/>
           </a:xfrm>
           <a:prstGeom prst="rect">
@@ -3240,8 +4253,8 @@
             <a:pPr algn="l"/>
             <a:r>
               <a:rPr lang="en-US" sz="2600" dirty="0">
-                <a:latin typeface="Helvetica Neue" panose="02000503000000020004" pitchFamily="2" charset="0"/>
-                <a:ea typeface="Helvetica Neue" panose="02000503000000020004" pitchFamily="2" charset="0"/>
+                <a:latin typeface="Helvetica Neue Light" panose="02000403000000020004" pitchFamily="2" charset="0"/>
+                <a:ea typeface="Helvetica Neue Light" panose="02000403000000020004" pitchFamily="2" charset="0"/>
                 <a:cs typeface="Helvetica Neue" panose="02000503000000020004" pitchFamily="2" charset="0"/>
               </a:rPr>
               <a:t>Task</a:t>
@@ -3251,10 +4264,10 @@
       </p:sp>
       <p:sp>
         <p:nvSpPr>
-          <p:cNvPr id="67" name="TextBox 66">
+          <p:cNvPr id="81" name="TextBox 80">
             <a:extLst>
               <a:ext uri="{FF2B5EF4-FFF2-40B4-BE49-F238E27FC236}">
-                <a16:creationId xmlns:a16="http://schemas.microsoft.com/office/drawing/2014/main" id="{419202B5-E33E-1400-9DC3-EA93BFA2D60D}"/>
+                <a16:creationId xmlns:a16="http://schemas.microsoft.com/office/drawing/2014/main" id="{3B97A300-5E81-4CF9-CCD4-584F03355EDB}"/>
               </a:ext>
             </a:extLst>
           </p:cNvPr>
@@ -3263,8 +4276,8 @@
         </p:nvSpPr>
         <p:spPr>
           <a:xfrm>
-            <a:off x="11675485" y="21742"/>
-            <a:ext cx="2217658" cy="492443"/>
+            <a:off x="13017630" y="-8041"/>
+            <a:ext cx="2131096" cy="492443"/>
           </a:xfrm>
           <a:prstGeom prst="rect">
             <a:avLst/>
@@ -3280,8 +4293,8 @@
             <a:pPr algn="l"/>
             <a:r>
               <a:rPr lang="en-US" sz="2600" dirty="0">
-                <a:latin typeface="Helvetica Neue" panose="02000503000000020004" pitchFamily="2" charset="0"/>
-                <a:ea typeface="Helvetica Neue" panose="02000503000000020004" pitchFamily="2" charset="0"/>
+                <a:latin typeface="Helvetica Neue Light" panose="02000403000000020004" pitchFamily="2" charset="0"/>
+                <a:ea typeface="Helvetica Neue Light" panose="02000403000000020004" pitchFamily="2" charset="0"/>
                 <a:cs typeface="Helvetica Neue" panose="02000503000000020004" pitchFamily="2" charset="0"/>
               </a:rPr>
               <a:t>Environments</a:t>
@@ -3291,10 +4304,10 @@
       </p:sp>
       <p:sp>
         <p:nvSpPr>
-          <p:cNvPr id="68" name="TextBox 67">
+          <p:cNvPr id="82" name="TextBox 81">
             <a:extLst>
               <a:ext uri="{FF2B5EF4-FFF2-40B4-BE49-F238E27FC236}">
-                <a16:creationId xmlns:a16="http://schemas.microsoft.com/office/drawing/2014/main" id="{47878F50-984D-451B-BC66-75F24C7C4510}"/>
+                <a16:creationId xmlns:a16="http://schemas.microsoft.com/office/drawing/2014/main" id="{371E1DE2-74FF-C979-AD89-03EF229E06B5}"/>
               </a:ext>
             </a:extLst>
           </p:cNvPr>
@@ -3303,7 +4316,7 @@
         </p:nvSpPr>
         <p:spPr>
           <a:xfrm>
-            <a:off x="7340304" y="21742"/>
+            <a:off x="8018304" y="-8041"/>
             <a:ext cx="1722716" cy="492443"/>
           </a:xfrm>
           <a:prstGeom prst="rect">
@@ -3320,8 +4333,8 @@
             <a:pPr algn="l"/>
             <a:r>
               <a:rPr lang="en-US" sz="2600" dirty="0">
-                <a:latin typeface="Helvetica Neue" panose="02000503000000020004" pitchFamily="2" charset="0"/>
-                <a:ea typeface="Helvetica Neue" panose="02000503000000020004" pitchFamily="2" charset="0"/>
+                <a:latin typeface="Helvetica Neue Light" panose="02000403000000020004" pitchFamily="2" charset="0"/>
+                <a:ea typeface="Helvetica Neue Light" panose="02000403000000020004" pitchFamily="2" charset="0"/>
                 <a:cs typeface="Helvetica Neue" panose="02000503000000020004" pitchFamily="2" charset="0"/>
               </a:rPr>
               <a:t>Procedure</a:t>
@@ -3329,12 +4342,63 @@
           </a:p>
         </p:txBody>
       </p:sp>
+      <p:sp>
+        <p:nvSpPr>
+          <p:cNvPr id="83" name="Rectangle 82">
+            <a:extLst>
+              <a:ext uri="{FF2B5EF4-FFF2-40B4-BE49-F238E27FC236}">
+                <a16:creationId xmlns:a16="http://schemas.microsoft.com/office/drawing/2014/main" id="{06EC10D9-3FDA-5494-AF01-A99DDF2E3259}"/>
+              </a:ext>
+            </a:extLst>
+          </p:cNvPr>
+          <p:cNvSpPr>
+            <a:spLocks noChangeAspect="1"/>
+          </p:cNvSpPr>
+          <p:nvPr/>
+        </p:nvSpPr>
+        <p:spPr>
+          <a:xfrm>
+            <a:off x="7469743" y="628800"/>
+            <a:ext cx="1224000" cy="1224000"/>
+          </a:xfrm>
+          <a:prstGeom prst="rect">
+            <a:avLst/>
+          </a:prstGeom>
+          <a:solidFill>
+            <a:schemeClr val="bg1"/>
+          </a:solidFill>
+        </p:spPr>
+        <p:style>
+          <a:lnRef idx="2">
+            <a:schemeClr val="accent1">
+              <a:shade val="15000"/>
+            </a:schemeClr>
+          </a:lnRef>
+          <a:fillRef idx="1">
+            <a:schemeClr val="accent1"/>
+          </a:fillRef>
+          <a:effectRef idx="0">
+            <a:schemeClr val="accent1"/>
+          </a:effectRef>
+          <a:fontRef idx="minor">
+            <a:schemeClr val="lt1"/>
+          </a:fontRef>
+        </p:style>
+        <p:txBody>
+          <a:bodyPr rtlCol="0" anchor="ctr"/>
+          <a:lstStyle/>
+          <a:p>
+            <a:pPr algn="ctr"/>
+            <a:endParaRPr lang="en-US" dirty="0"/>
+          </a:p>
+        </p:txBody>
+      </p:sp>
       <p:pic>
         <p:nvPicPr>
-          <p:cNvPr id="69" name="Picture 68">
+          <p:cNvPr id="84" name="Image" descr="Image">
             <a:extLst>
               <a:ext uri="{FF2B5EF4-FFF2-40B4-BE49-F238E27FC236}">
-                <a16:creationId xmlns:a16="http://schemas.microsoft.com/office/drawing/2014/main" id="{2CCF4D79-03EE-E87E-26B8-7A995F0E3197}"/>
+                <a16:creationId xmlns:a16="http://schemas.microsoft.com/office/drawing/2014/main" id="{D54F3F58-9C01-0F1D-7030-ED4CB285CAF4}"/>
               </a:ext>
             </a:extLst>
           </p:cNvPr>
@@ -3344,22 +4408,742 @@
           <p:nvPr/>
         </p:nvPicPr>
         <p:blipFill>
-          <a:blip r:embed="rId8"/>
-          <a:srcRect t="5701"/>
+          <a:blip r:embed="rId7"/>
+          <a:srcRect l="1194" t="1330" r="32651" b="1508"/>
           <a:stretch>
             <a:fillRect/>
           </a:stretch>
         </p:blipFill>
         <p:spPr>
           <a:xfrm>
-            <a:off x="5866683" y="569175"/>
-            <a:ext cx="4798388" cy="3464786"/>
+            <a:off x="7490577" y="655443"/>
+            <a:ext cx="1188000" cy="1188000"/>
           </a:xfrm>
           <a:prstGeom prst="rect">
             <a:avLst/>
           </a:prstGeom>
+          <a:ln w="12700" cap="flat">
+            <a:noFill/>
+            <a:miter lim="400000"/>
+          </a:ln>
+          <a:effectLst/>
         </p:spPr>
       </p:pic>
+      <p:sp>
+        <p:nvSpPr>
+          <p:cNvPr id="85" name="Rectangle 84">
+            <a:extLst>
+              <a:ext uri="{FF2B5EF4-FFF2-40B4-BE49-F238E27FC236}">
+                <a16:creationId xmlns:a16="http://schemas.microsoft.com/office/drawing/2014/main" id="{853AB7EB-6194-7658-67E5-1A34E32737F8}"/>
+              </a:ext>
+            </a:extLst>
+          </p:cNvPr>
+          <p:cNvSpPr>
+            <a:spLocks noChangeAspect="1"/>
+          </p:cNvSpPr>
+          <p:nvPr/>
+        </p:nvSpPr>
+        <p:spPr>
+          <a:xfrm>
+            <a:off x="7929446" y="1019166"/>
+            <a:ext cx="1224000" cy="1224000"/>
+          </a:xfrm>
+          <a:prstGeom prst="rect">
+            <a:avLst/>
+          </a:prstGeom>
+          <a:solidFill>
+            <a:schemeClr val="bg1"/>
+          </a:solidFill>
+        </p:spPr>
+        <p:style>
+          <a:lnRef idx="2">
+            <a:schemeClr val="accent1">
+              <a:shade val="15000"/>
+            </a:schemeClr>
+          </a:lnRef>
+          <a:fillRef idx="1">
+            <a:schemeClr val="accent1"/>
+          </a:fillRef>
+          <a:effectRef idx="0">
+            <a:schemeClr val="accent1"/>
+          </a:effectRef>
+          <a:fontRef idx="minor">
+            <a:schemeClr val="lt1"/>
+          </a:fontRef>
+        </p:style>
+        <p:txBody>
+          <a:bodyPr rtlCol="0" anchor="ctr"/>
+          <a:lstStyle/>
+          <a:p>
+            <a:pPr algn="ctr"/>
+            <a:endParaRPr lang="en-US" dirty="0"/>
+          </a:p>
+        </p:txBody>
+      </p:sp>
+      <p:sp>
+        <p:nvSpPr>
+          <p:cNvPr id="86" name="Rectangle 85">
+            <a:extLst>
+              <a:ext uri="{FF2B5EF4-FFF2-40B4-BE49-F238E27FC236}">
+                <a16:creationId xmlns:a16="http://schemas.microsoft.com/office/drawing/2014/main" id="{98D8540B-28A8-C964-0916-98ADBC06B2E0}"/>
+              </a:ext>
+            </a:extLst>
+          </p:cNvPr>
+          <p:cNvSpPr>
+            <a:spLocks noChangeAspect="1"/>
+          </p:cNvSpPr>
+          <p:nvPr/>
+        </p:nvSpPr>
+        <p:spPr>
+          <a:xfrm>
+            <a:off x="8202941" y="1296288"/>
+            <a:ext cx="1224000" cy="1224000"/>
+          </a:xfrm>
+          <a:prstGeom prst="rect">
+            <a:avLst/>
+          </a:prstGeom>
+          <a:solidFill>
+            <a:schemeClr val="bg1"/>
+          </a:solidFill>
+        </p:spPr>
+        <p:style>
+          <a:lnRef idx="2">
+            <a:schemeClr val="accent1">
+              <a:shade val="15000"/>
+            </a:schemeClr>
+          </a:lnRef>
+          <a:fillRef idx="1">
+            <a:schemeClr val="accent1"/>
+          </a:fillRef>
+          <a:effectRef idx="0">
+            <a:schemeClr val="accent1"/>
+          </a:effectRef>
+          <a:fontRef idx="minor">
+            <a:schemeClr val="lt1"/>
+          </a:fontRef>
+        </p:style>
+        <p:txBody>
+          <a:bodyPr rtlCol="0" anchor="ctr"/>
+          <a:lstStyle/>
+          <a:p>
+            <a:pPr algn="ctr"/>
+            <a:endParaRPr lang="en-US" dirty="0"/>
+          </a:p>
+        </p:txBody>
+      </p:sp>
+      <p:sp>
+        <p:nvSpPr>
+          <p:cNvPr id="87" name="Rectangle 86">
+            <a:extLst>
+              <a:ext uri="{FF2B5EF4-FFF2-40B4-BE49-F238E27FC236}">
+                <a16:creationId xmlns:a16="http://schemas.microsoft.com/office/drawing/2014/main" id="{DB945779-C1E9-8AC7-D3F0-FB76AB437AA0}"/>
+              </a:ext>
+            </a:extLst>
+          </p:cNvPr>
+          <p:cNvSpPr>
+            <a:spLocks noChangeAspect="1"/>
+          </p:cNvSpPr>
+          <p:nvPr/>
+        </p:nvSpPr>
+        <p:spPr>
+          <a:xfrm>
+            <a:off x="8476436" y="1573410"/>
+            <a:ext cx="1224000" cy="1224000"/>
+          </a:xfrm>
+          <a:prstGeom prst="rect">
+            <a:avLst/>
+          </a:prstGeom>
+          <a:solidFill>
+            <a:schemeClr val="bg1"/>
+          </a:solidFill>
+        </p:spPr>
+        <p:style>
+          <a:lnRef idx="2">
+            <a:schemeClr val="accent1">
+              <a:shade val="15000"/>
+            </a:schemeClr>
+          </a:lnRef>
+          <a:fillRef idx="1">
+            <a:schemeClr val="accent1"/>
+          </a:fillRef>
+          <a:effectRef idx="0">
+            <a:schemeClr val="accent1"/>
+          </a:effectRef>
+          <a:fontRef idx="minor">
+            <a:schemeClr val="lt1"/>
+          </a:fontRef>
+        </p:style>
+        <p:txBody>
+          <a:bodyPr rtlCol="0" anchor="ctr"/>
+          <a:lstStyle/>
+          <a:p>
+            <a:pPr algn="ctr"/>
+            <a:endParaRPr lang="en-US" dirty="0"/>
+          </a:p>
+        </p:txBody>
+      </p:sp>
+      <p:sp>
+        <p:nvSpPr>
+          <p:cNvPr id="88" name="Rectangle 87">
+            <a:extLst>
+              <a:ext uri="{FF2B5EF4-FFF2-40B4-BE49-F238E27FC236}">
+                <a16:creationId xmlns:a16="http://schemas.microsoft.com/office/drawing/2014/main" id="{8B661F2B-11F7-51BE-AAC8-BBC669B48D45}"/>
+              </a:ext>
+            </a:extLst>
+          </p:cNvPr>
+          <p:cNvSpPr>
+            <a:spLocks noChangeAspect="1"/>
+          </p:cNvSpPr>
+          <p:nvPr/>
+        </p:nvSpPr>
+        <p:spPr>
+          <a:xfrm>
+            <a:off x="8749931" y="1850532"/>
+            <a:ext cx="1224000" cy="1224000"/>
+          </a:xfrm>
+          <a:prstGeom prst="rect">
+            <a:avLst/>
+          </a:prstGeom>
+          <a:solidFill>
+            <a:schemeClr val="bg1"/>
+          </a:solidFill>
+        </p:spPr>
+        <p:style>
+          <a:lnRef idx="2">
+            <a:schemeClr val="accent1">
+              <a:shade val="15000"/>
+            </a:schemeClr>
+          </a:lnRef>
+          <a:fillRef idx="1">
+            <a:schemeClr val="accent1"/>
+          </a:fillRef>
+          <a:effectRef idx="0">
+            <a:schemeClr val="accent1"/>
+          </a:effectRef>
+          <a:fontRef idx="minor">
+            <a:schemeClr val="lt1"/>
+          </a:fontRef>
+        </p:style>
+        <p:txBody>
+          <a:bodyPr rtlCol="0" anchor="ctr"/>
+          <a:lstStyle/>
+          <a:p>
+            <a:pPr algn="ctr"/>
+            <a:endParaRPr lang="en-US" dirty="0"/>
+          </a:p>
+        </p:txBody>
+      </p:sp>
+      <p:sp>
+        <p:nvSpPr>
+          <p:cNvPr id="89" name="Rectangle 88">
+            <a:extLst>
+              <a:ext uri="{FF2B5EF4-FFF2-40B4-BE49-F238E27FC236}">
+                <a16:creationId xmlns:a16="http://schemas.microsoft.com/office/drawing/2014/main" id="{E179F596-7D73-38BB-DAF4-17F6B8510B7F}"/>
+              </a:ext>
+            </a:extLst>
+          </p:cNvPr>
+          <p:cNvSpPr>
+            <a:spLocks noChangeAspect="1"/>
+          </p:cNvSpPr>
+          <p:nvPr/>
+        </p:nvSpPr>
+        <p:spPr>
+          <a:xfrm>
+            <a:off x="9023426" y="2127654"/>
+            <a:ext cx="1224000" cy="1224000"/>
+          </a:xfrm>
+          <a:prstGeom prst="rect">
+            <a:avLst/>
+          </a:prstGeom>
+          <a:solidFill>
+            <a:schemeClr val="bg1"/>
+          </a:solidFill>
+        </p:spPr>
+        <p:style>
+          <a:lnRef idx="2">
+            <a:schemeClr val="accent1">
+              <a:shade val="15000"/>
+            </a:schemeClr>
+          </a:lnRef>
+          <a:fillRef idx="1">
+            <a:schemeClr val="accent1"/>
+          </a:fillRef>
+          <a:effectRef idx="0">
+            <a:schemeClr val="accent1"/>
+          </a:effectRef>
+          <a:fontRef idx="minor">
+            <a:schemeClr val="lt1"/>
+          </a:fontRef>
+        </p:style>
+        <p:txBody>
+          <a:bodyPr rtlCol="0" anchor="ctr"/>
+          <a:lstStyle/>
+          <a:p>
+            <a:pPr algn="ctr"/>
+            <a:endParaRPr lang="en-US" dirty="0"/>
+          </a:p>
+        </p:txBody>
+      </p:sp>
+      <p:sp>
+        <p:nvSpPr>
+          <p:cNvPr id="90" name="Rectangle 89">
+            <a:extLst>
+              <a:ext uri="{FF2B5EF4-FFF2-40B4-BE49-F238E27FC236}">
+                <a16:creationId xmlns:a16="http://schemas.microsoft.com/office/drawing/2014/main" id="{D5F5B5AA-6D10-2387-9C82-493513E83EED}"/>
+              </a:ext>
+            </a:extLst>
+          </p:cNvPr>
+          <p:cNvSpPr>
+            <a:spLocks noChangeAspect="1"/>
+          </p:cNvSpPr>
+          <p:nvPr/>
+        </p:nvSpPr>
+        <p:spPr>
+          <a:xfrm>
+            <a:off x="9296921" y="2404776"/>
+            <a:ext cx="1224000" cy="1224000"/>
+          </a:xfrm>
+          <a:prstGeom prst="rect">
+            <a:avLst/>
+          </a:prstGeom>
+          <a:solidFill>
+            <a:schemeClr val="bg1"/>
+          </a:solidFill>
+        </p:spPr>
+        <p:style>
+          <a:lnRef idx="2">
+            <a:schemeClr val="accent1">
+              <a:shade val="15000"/>
+            </a:schemeClr>
+          </a:lnRef>
+          <a:fillRef idx="1">
+            <a:schemeClr val="accent1"/>
+          </a:fillRef>
+          <a:effectRef idx="0">
+            <a:schemeClr val="accent1"/>
+          </a:effectRef>
+          <a:fontRef idx="minor">
+            <a:schemeClr val="lt1"/>
+          </a:fontRef>
+        </p:style>
+        <p:txBody>
+          <a:bodyPr rtlCol="0" anchor="ctr"/>
+          <a:lstStyle/>
+          <a:p>
+            <a:pPr algn="ctr"/>
+            <a:endParaRPr lang="en-US" dirty="0"/>
+          </a:p>
+        </p:txBody>
+      </p:sp>
+      <p:sp>
+        <p:nvSpPr>
+          <p:cNvPr id="91" name="Rectangle 90">
+            <a:extLst>
+              <a:ext uri="{FF2B5EF4-FFF2-40B4-BE49-F238E27FC236}">
+                <a16:creationId xmlns:a16="http://schemas.microsoft.com/office/drawing/2014/main" id="{B4FD96ED-76EC-6CBD-6AEE-BD6AE0DC6BF6}"/>
+              </a:ext>
+            </a:extLst>
+          </p:cNvPr>
+          <p:cNvSpPr>
+            <a:spLocks noChangeAspect="1"/>
+          </p:cNvSpPr>
+          <p:nvPr/>
+        </p:nvSpPr>
+        <p:spPr>
+          <a:xfrm>
+            <a:off x="9570416" y="2681898"/>
+            <a:ext cx="1224000" cy="1224000"/>
+          </a:xfrm>
+          <a:prstGeom prst="rect">
+            <a:avLst/>
+          </a:prstGeom>
+          <a:solidFill>
+            <a:schemeClr val="bg1"/>
+          </a:solidFill>
+        </p:spPr>
+        <p:style>
+          <a:lnRef idx="2">
+            <a:schemeClr val="accent1">
+              <a:shade val="15000"/>
+            </a:schemeClr>
+          </a:lnRef>
+          <a:fillRef idx="1">
+            <a:schemeClr val="accent1"/>
+          </a:fillRef>
+          <a:effectRef idx="0">
+            <a:schemeClr val="accent1"/>
+          </a:effectRef>
+          <a:fontRef idx="minor">
+            <a:schemeClr val="lt1"/>
+          </a:fontRef>
+        </p:style>
+        <p:txBody>
+          <a:bodyPr rtlCol="0" anchor="ctr"/>
+          <a:lstStyle/>
+          <a:p>
+            <a:pPr algn="ctr"/>
+            <a:endParaRPr lang="en-US" dirty="0"/>
+          </a:p>
+        </p:txBody>
+      </p:sp>
+      <p:sp>
+        <p:nvSpPr>
+          <p:cNvPr id="92" name="TextBox 91">
+            <a:extLst>
+              <a:ext uri="{FF2B5EF4-FFF2-40B4-BE49-F238E27FC236}">
+                <a16:creationId xmlns:a16="http://schemas.microsoft.com/office/drawing/2014/main" id="{CC7728F4-E58A-CD50-621E-09FFC051CADB}"/>
+              </a:ext>
+            </a:extLst>
+          </p:cNvPr>
+          <p:cNvSpPr txBox="1"/>
+          <p:nvPr/>
+        </p:nvSpPr>
+        <p:spPr>
+          <a:xfrm>
+            <a:off x="6423782" y="713773"/>
+            <a:ext cx="891206" cy="646331"/>
+          </a:xfrm>
+          <a:prstGeom prst="rect">
+            <a:avLst/>
+          </a:prstGeom>
+          <a:noFill/>
+        </p:spPr>
+        <p:txBody>
+          <a:bodyPr wrap="none" rtlCol="0">
+            <a:spAutoFit/>
+          </a:bodyPr>
+          <a:lstStyle/>
+          <a:p>
+            <a:pPr algn="l"/>
+            <a:r>
+              <a:rPr lang="en-US" dirty="0">
+                <a:latin typeface="Helvetica Neue Light" panose="02000403000000020004" pitchFamily="2" charset="0"/>
+                <a:ea typeface="Helvetica Neue Light" panose="02000403000000020004" pitchFamily="2" charset="0"/>
+                <a:cs typeface="Helvetica Neue" panose="02000503000000020004" pitchFamily="2" charset="0"/>
+              </a:rPr>
+              <a:t>Tutorial</a:t>
+            </a:r>
+          </a:p>
+          <a:p>
+            <a:pPr algn="l"/>
+            <a:r>
+              <a:rPr lang="en-US" dirty="0">
+                <a:latin typeface="Helvetica Neue Light" panose="02000403000000020004" pitchFamily="2" charset="0"/>
+                <a:ea typeface="Helvetica Neue Light" panose="02000403000000020004" pitchFamily="2" charset="0"/>
+                <a:cs typeface="Helvetica Neue" panose="02000503000000020004" pitchFamily="2" charset="0"/>
+              </a:rPr>
+              <a:t>round</a:t>
+            </a:r>
+          </a:p>
+        </p:txBody>
+      </p:sp>
+      <p:sp>
+        <p:nvSpPr>
+          <p:cNvPr id="93" name="TextBox 92">
+            <a:extLst>
+              <a:ext uri="{FF2B5EF4-FFF2-40B4-BE49-F238E27FC236}">
+                <a16:creationId xmlns:a16="http://schemas.microsoft.com/office/drawing/2014/main" id="{9EFF42B0-6E1A-59A4-F304-07DD33A0826D}"/>
+              </a:ext>
+            </a:extLst>
+          </p:cNvPr>
+          <p:cNvSpPr txBox="1"/>
+          <p:nvPr/>
+        </p:nvSpPr>
+        <p:spPr>
+          <a:xfrm>
+            <a:off x="6423782" y="1772136"/>
+            <a:ext cx="1147464" cy="646331"/>
+          </a:xfrm>
+          <a:prstGeom prst="rect">
+            <a:avLst/>
+          </a:prstGeom>
+          <a:noFill/>
+        </p:spPr>
+        <p:txBody>
+          <a:bodyPr wrap="square" rtlCol="0">
+            <a:spAutoFit/>
+          </a:bodyPr>
+          <a:lstStyle/>
+          <a:p>
+            <a:pPr algn="l"/>
+            <a:r>
+              <a:rPr lang="en-US" dirty="0">
+                <a:latin typeface="Helvetica Neue Light" panose="02000403000000020004" pitchFamily="2" charset="0"/>
+                <a:ea typeface="Helvetica Neue Light" panose="02000403000000020004" pitchFamily="2" charset="0"/>
+                <a:cs typeface="Helvetica Neue" panose="02000503000000020004" pitchFamily="2" charset="0"/>
+              </a:rPr>
+              <a:t>8 rounds of search</a:t>
+            </a:r>
+          </a:p>
+        </p:txBody>
+      </p:sp>
+      <p:cxnSp>
+        <p:nvCxnSpPr>
+          <p:cNvPr id="94" name="Straight Arrow Connector 93">
+            <a:extLst>
+              <a:ext uri="{FF2B5EF4-FFF2-40B4-BE49-F238E27FC236}">
+                <a16:creationId xmlns:a16="http://schemas.microsoft.com/office/drawing/2014/main" id="{8BCC495B-58E8-195F-A905-EBADDEEAC1CE}"/>
+              </a:ext>
+            </a:extLst>
+          </p:cNvPr>
+          <p:cNvCxnSpPr>
+            <a:cxnSpLocks/>
+          </p:cNvCxnSpPr>
+          <p:nvPr/>
+        </p:nvCxnSpPr>
+        <p:spPr>
+          <a:xfrm>
+            <a:off x="9557902" y="628800"/>
+            <a:ext cx="2416777" cy="2777280"/>
+          </a:xfrm>
+          <a:prstGeom prst="straightConnector1">
+            <a:avLst/>
+          </a:prstGeom>
+          <a:ln w="34925">
+            <a:solidFill>
+              <a:schemeClr val="tx1"/>
+            </a:solidFill>
+            <a:tailEnd type="triangle" w="lg" len="lg"/>
+          </a:ln>
+        </p:spPr>
+        <p:style>
+          <a:lnRef idx="2">
+            <a:schemeClr val="accent1"/>
+          </a:lnRef>
+          <a:fillRef idx="0">
+            <a:schemeClr val="accent1"/>
+          </a:fillRef>
+          <a:effectRef idx="1">
+            <a:schemeClr val="accent1"/>
+          </a:effectRef>
+          <a:fontRef idx="minor">
+            <a:schemeClr val="tx1"/>
+          </a:fontRef>
+        </p:style>
+      </p:cxnSp>
+      <p:sp>
+        <p:nvSpPr>
+          <p:cNvPr id="95" name="TextBox 94">
+            <a:extLst>
+              <a:ext uri="{FF2B5EF4-FFF2-40B4-BE49-F238E27FC236}">
+                <a16:creationId xmlns:a16="http://schemas.microsoft.com/office/drawing/2014/main" id="{1A1CA980-DEBE-7ED3-FCBB-F27C08FFC466}"/>
+              </a:ext>
+            </a:extLst>
+          </p:cNvPr>
+          <p:cNvSpPr txBox="1"/>
+          <p:nvPr/>
+        </p:nvSpPr>
+        <p:spPr>
+          <a:xfrm rot="2940000">
+            <a:off x="10253457" y="1580231"/>
+            <a:ext cx="1310029" cy="400110"/>
+          </a:xfrm>
+          <a:prstGeom prst="rect">
+            <a:avLst/>
+          </a:prstGeom>
+          <a:noFill/>
+        </p:spPr>
+        <p:txBody>
+          <a:bodyPr wrap="square" rtlCol="0">
+            <a:spAutoFit/>
+          </a:bodyPr>
+          <a:lstStyle/>
+          <a:p>
+            <a:pPr algn="ctr"/>
+            <a:r>
+              <a:rPr lang="en-US" sz="2000" dirty="0">
+                <a:latin typeface="Helvetica Neue Light" panose="02000403000000020004" pitchFamily="2" charset="0"/>
+                <a:ea typeface="Helvetica Neue Light" panose="02000403000000020004" pitchFamily="2" charset="0"/>
+                <a:cs typeface="Helvetica Neue" panose="02000503000000020004" pitchFamily="2" charset="0"/>
+              </a:rPr>
+              <a:t>Time</a:t>
+            </a:r>
+          </a:p>
+        </p:txBody>
+      </p:sp>
+      <p:sp>
+        <p:nvSpPr>
+          <p:cNvPr id="96" name="TextBox 95">
+            <a:extLst>
+              <a:ext uri="{FF2B5EF4-FFF2-40B4-BE49-F238E27FC236}">
+                <a16:creationId xmlns:a16="http://schemas.microsoft.com/office/drawing/2014/main" id="{BC70F5D4-92D3-9A8C-3B4A-63DA43F4707A}"/>
+              </a:ext>
+            </a:extLst>
+          </p:cNvPr>
+          <p:cNvSpPr txBox="1"/>
+          <p:nvPr/>
+        </p:nvSpPr>
+        <p:spPr>
+          <a:xfrm>
+            <a:off x="6423782" y="2600339"/>
+            <a:ext cx="1764776" cy="646331"/>
+          </a:xfrm>
+          <a:prstGeom prst="rect">
+            <a:avLst/>
+          </a:prstGeom>
+          <a:noFill/>
+        </p:spPr>
+        <p:txBody>
+          <a:bodyPr wrap="square" rtlCol="0">
+            <a:spAutoFit/>
+          </a:bodyPr>
+          <a:lstStyle/>
+          <a:p>
+            <a:pPr algn="l"/>
+            <a:r>
+              <a:rPr lang="en-US" dirty="0">
+                <a:latin typeface="Helvetica Neue Light" panose="02000403000000020004" pitchFamily="2" charset="0"/>
+                <a:ea typeface="Helvetica Neue Light" panose="02000403000000020004" pitchFamily="2" charset="0"/>
+                <a:cs typeface="Helvetica Neue" panose="02000503000000020004" pitchFamily="2" charset="0"/>
+              </a:rPr>
+              <a:t>25 clicks in each round</a:t>
+            </a:r>
+          </a:p>
+        </p:txBody>
+      </p:sp>
+      <p:grpSp>
+        <p:nvGrpSpPr>
+          <p:cNvPr id="97" name="Group 96">
+            <a:extLst>
+              <a:ext uri="{FF2B5EF4-FFF2-40B4-BE49-F238E27FC236}">
+                <a16:creationId xmlns:a16="http://schemas.microsoft.com/office/drawing/2014/main" id="{4886B0F8-113B-E041-926B-ECBDC1D45231}"/>
+              </a:ext>
+            </a:extLst>
+          </p:cNvPr>
+          <p:cNvGrpSpPr/>
+          <p:nvPr/>
+        </p:nvGrpSpPr>
+        <p:grpSpPr>
+          <a:xfrm>
+            <a:off x="9941459" y="3031634"/>
+            <a:ext cx="1224000" cy="1224000"/>
+            <a:chOff x="15216601" y="25659727"/>
+            <a:chExt cx="1224000" cy="1224000"/>
+          </a:xfrm>
+        </p:grpSpPr>
+        <p:sp>
+          <p:nvSpPr>
+            <p:cNvPr id="98" name="Rectangle 97">
+              <a:extLst>
+                <a:ext uri="{FF2B5EF4-FFF2-40B4-BE49-F238E27FC236}">
+                  <a16:creationId xmlns:a16="http://schemas.microsoft.com/office/drawing/2014/main" id="{5A057943-34A0-3508-F911-C78D2758DCDF}"/>
+                </a:ext>
+              </a:extLst>
+            </p:cNvPr>
+            <p:cNvSpPr>
+              <a:spLocks noChangeAspect="1"/>
+            </p:cNvSpPr>
+            <p:nvPr/>
+          </p:nvSpPr>
+          <p:spPr>
+            <a:xfrm>
+              <a:off x="15216601" y="25659727"/>
+              <a:ext cx="1224000" cy="1224000"/>
+            </a:xfrm>
+            <a:prstGeom prst="rect">
+              <a:avLst/>
+            </a:prstGeom>
+            <a:solidFill>
+              <a:schemeClr val="bg1"/>
+            </a:solidFill>
+          </p:spPr>
+          <p:style>
+            <a:lnRef idx="2">
+              <a:schemeClr val="accent1">
+                <a:shade val="15000"/>
+              </a:schemeClr>
+            </a:lnRef>
+            <a:fillRef idx="1">
+              <a:schemeClr val="accent1"/>
+            </a:fillRef>
+            <a:effectRef idx="0">
+              <a:schemeClr val="accent1"/>
+            </a:effectRef>
+            <a:fontRef idx="minor">
+              <a:schemeClr val="lt1"/>
+            </a:fontRef>
+          </p:style>
+          <p:txBody>
+            <a:bodyPr rtlCol="0" anchor="ctr"/>
+            <a:lstStyle/>
+            <a:p>
+              <a:pPr algn="ctr"/>
+              <a:endParaRPr lang="en-US" dirty="0"/>
+            </a:p>
+          </p:txBody>
+        </p:sp>
+        <p:pic>
+          <p:nvPicPr>
+            <p:cNvPr id="99" name="Picture 98">
+              <a:extLst>
+                <a:ext uri="{FF2B5EF4-FFF2-40B4-BE49-F238E27FC236}">
+                  <a16:creationId xmlns:a16="http://schemas.microsoft.com/office/drawing/2014/main" id="{9D13B8D9-D39C-D4ED-A13A-AE7884DA015F}"/>
+                </a:ext>
+              </a:extLst>
+            </p:cNvPr>
+            <p:cNvPicPr>
+              <a:picLocks noChangeAspect="1"/>
+            </p:cNvPicPr>
+            <p:nvPr/>
+          </p:nvPicPr>
+          <p:blipFill>
+            <a:blip r:embed="rId8"/>
+            <a:srcRect l="738"/>
+            <a:stretch>
+              <a:fillRect/>
+            </a:stretch>
+          </p:blipFill>
+          <p:spPr>
+            <a:xfrm>
+              <a:off x="15241862" y="25687196"/>
+              <a:ext cx="1188000" cy="1188000"/>
+            </a:xfrm>
+            <a:prstGeom prst="rect">
+              <a:avLst/>
+            </a:prstGeom>
+          </p:spPr>
+        </p:pic>
+      </p:grpSp>
+      <p:sp>
+        <p:nvSpPr>
+          <p:cNvPr id="100" name="TextBox 99">
+            <a:extLst>
+              <a:ext uri="{FF2B5EF4-FFF2-40B4-BE49-F238E27FC236}">
+                <a16:creationId xmlns:a16="http://schemas.microsoft.com/office/drawing/2014/main" id="{69C215B1-3CF1-6167-D884-7C75549F646D}"/>
+              </a:ext>
+            </a:extLst>
+          </p:cNvPr>
+          <p:cNvSpPr txBox="1"/>
+          <p:nvPr/>
+        </p:nvSpPr>
+        <p:spPr>
+          <a:xfrm>
+            <a:off x="6423782" y="3351654"/>
+            <a:ext cx="1995684" cy="923330"/>
+          </a:xfrm>
+          <a:prstGeom prst="rect">
+            <a:avLst/>
+          </a:prstGeom>
+          <a:noFill/>
+        </p:spPr>
+        <p:txBody>
+          <a:bodyPr wrap="square" rtlCol="0">
+            <a:spAutoFit/>
+          </a:bodyPr>
+          <a:lstStyle/>
+          <a:p>
+            <a:pPr algn="l"/>
+            <a:r>
+              <a:rPr lang="en-US" dirty="0">
+                <a:latin typeface="Helvetica Neue Light" panose="02000403000000020004" pitchFamily="2" charset="0"/>
+                <a:ea typeface="Helvetica Neue Light" panose="02000403000000020004" pitchFamily="2" charset="0"/>
+                <a:cs typeface="Helvetica Neue" panose="02000503000000020004" pitchFamily="2" charset="0"/>
+              </a:rPr>
+              <a:t>”Bonus round” with reward predictions</a:t>
+            </a:r>
+          </a:p>
+        </p:txBody>
+      </p:sp>
     </p:spTree>
     <p:extLst>
       <p:ext uri="{BB962C8B-B14F-4D97-AF65-F5344CB8AC3E}">

</xml_diff>

<commit_message>
implemented simulation for consecutive distances of random learner and updated plots and overview figure
</commit_message>
<xml_diff>
--- a/img/task.pptx
+++ b/img/task.pptx
@@ -5,7 +5,8 @@
     <p:sldMasterId id="2147483720" r:id="rId1"/>
   </p:sldMasterIdLst>
   <p:sldIdLst>
-    <p:sldId id="256" r:id="rId2"/>
+    <p:sldId id="257" r:id="rId2"/>
+    <p:sldId id="256" r:id="rId3"/>
   </p:sldIdLst>
   <p:sldSz cx="16200438" cy="4319588"/>
   <p:notesSz cx="6858000" cy="9144000"/>
@@ -115,13 +116,405 @@
 <file path=ppt/revisionInfo.xml><?xml version="1.0" encoding="utf-8"?>
 <p1510:revInfo xmlns:a="http://schemas.openxmlformats.org/drawingml/2006/main" xmlns:r="http://schemas.openxmlformats.org/officeDocument/2006/relationships" xmlns:p1510="http://schemas.microsoft.com/office/powerpoint/2015/10/main">
   <p1510:revLst>
-    <p1510:client id="{B6D57924-B848-2742-8D38-F6230294B7DC}" v="10" dt="2025-07-31T17:44:31.481"/>
+    <p1510:client id="{B6D57924-B848-2742-8D38-F6230294B7DC}" v="29" dt="2025-08-16T07:14:44.337"/>
   </p1510:revLst>
 </p1510:revInfo>
 </file>
 
 <file path=ppt/changesInfos/changesInfo1.xml><?xml version="1.0" encoding="utf-8"?>
 <pc:chgInfo xmlns:a="http://schemas.openxmlformats.org/drawingml/2006/main" xmlns:r="http://schemas.openxmlformats.org/officeDocument/2006/relationships" xmlns:ac="http://schemas.microsoft.com/office/drawing/2013/main/command" xmlns:pc="http://schemas.microsoft.com/office/powerpoint/2013/main/command">
+  <pc:docChgLst>
+    <pc:chgData name="Björn Meder HMU Potsdam" userId="d258dbf6-ab6a-4282-851d-9abdcd54331d" providerId="ADAL" clId="{4DFD6B1A-A511-587B-86A6-0ACC1CABEBE3}"/>
+    <pc:docChg chg="undo custSel addSld modSld sldOrd">
+      <pc:chgData name="Björn Meder HMU Potsdam" userId="d258dbf6-ab6a-4282-851d-9abdcd54331d" providerId="ADAL" clId="{4DFD6B1A-A511-587B-86A6-0ACC1CABEBE3}" dt="2025-08-16T07:15:11.444" v="216" actId="20578"/>
+      <pc:docMkLst>
+        <pc:docMk/>
+      </pc:docMkLst>
+      <pc:sldChg chg="addSp delSp modSp add mod ord">
+        <pc:chgData name="Björn Meder HMU Potsdam" userId="d258dbf6-ab6a-4282-851d-9abdcd54331d" providerId="ADAL" clId="{4DFD6B1A-A511-587B-86A6-0ACC1CABEBE3}" dt="2025-08-16T07:15:11.444" v="216" actId="20578"/>
+        <pc:sldMkLst>
+          <pc:docMk/>
+          <pc:sldMk cId="34156375" sldId="257"/>
+        </pc:sldMkLst>
+        <pc:spChg chg="add mod">
+          <ac:chgData name="Björn Meder HMU Potsdam" userId="d258dbf6-ab6a-4282-851d-9abdcd54331d" providerId="ADAL" clId="{4DFD6B1A-A511-587B-86A6-0ACC1CABEBE3}" dt="2025-08-16T07:06:49.193" v="75" actId="1037"/>
+          <ac:spMkLst>
+            <pc:docMk/>
+            <pc:sldMk cId="34156375" sldId="257"/>
+            <ac:spMk id="38" creationId="{448CD114-3C19-C02E-BA6B-DD5CD0D288FC}"/>
+          </ac:spMkLst>
+        </pc:spChg>
+        <pc:spChg chg="add mod">
+          <ac:chgData name="Björn Meder HMU Potsdam" userId="d258dbf6-ab6a-4282-851d-9abdcd54331d" providerId="ADAL" clId="{4DFD6B1A-A511-587B-86A6-0ACC1CABEBE3}" dt="2025-08-16T07:12:54.556" v="202" actId="1036"/>
+          <ac:spMkLst>
+            <pc:docMk/>
+            <pc:sldMk cId="34156375" sldId="257"/>
+            <ac:spMk id="39" creationId="{70AEBB63-8371-464C-88DF-09CD8F6461BB}"/>
+          </ac:spMkLst>
+        </pc:spChg>
+        <pc:spChg chg="add mod">
+          <ac:chgData name="Björn Meder HMU Potsdam" userId="d258dbf6-ab6a-4282-851d-9abdcd54331d" providerId="ADAL" clId="{4DFD6B1A-A511-587B-86A6-0ACC1CABEBE3}" dt="2025-08-16T07:12:54.556" v="202" actId="1036"/>
+          <ac:spMkLst>
+            <pc:docMk/>
+            <pc:sldMk cId="34156375" sldId="257"/>
+            <ac:spMk id="40" creationId="{A9ADF8AA-678C-83A0-EAC3-BD2B4D45577A}"/>
+          </ac:spMkLst>
+        </pc:spChg>
+        <pc:spChg chg="add mod">
+          <ac:chgData name="Björn Meder HMU Potsdam" userId="d258dbf6-ab6a-4282-851d-9abdcd54331d" providerId="ADAL" clId="{4DFD6B1A-A511-587B-86A6-0ACC1CABEBE3}" dt="2025-08-16T07:12:50.373" v="200" actId="554"/>
+          <ac:spMkLst>
+            <pc:docMk/>
+            <pc:sldMk cId="34156375" sldId="257"/>
+            <ac:spMk id="41" creationId="{61D13226-896A-A190-5957-A0CBFA31C357}"/>
+          </ac:spMkLst>
+        </pc:spChg>
+        <pc:spChg chg="add mod">
+          <ac:chgData name="Björn Meder HMU Potsdam" userId="d258dbf6-ab6a-4282-851d-9abdcd54331d" providerId="ADAL" clId="{4DFD6B1A-A511-587B-86A6-0ACC1CABEBE3}" dt="2025-08-16T07:12:50.373" v="200" actId="554"/>
+          <ac:spMkLst>
+            <pc:docMk/>
+            <pc:sldMk cId="34156375" sldId="257"/>
+            <ac:spMk id="42" creationId="{760CF696-3888-E86C-81FD-F695DFE89A32}"/>
+          </ac:spMkLst>
+        </pc:spChg>
+        <pc:spChg chg="add mod">
+          <ac:chgData name="Björn Meder HMU Potsdam" userId="d258dbf6-ab6a-4282-851d-9abdcd54331d" providerId="ADAL" clId="{4DFD6B1A-A511-587B-86A6-0ACC1CABEBE3}" dt="2025-08-16T07:12:47.099" v="199" actId="554"/>
+          <ac:spMkLst>
+            <pc:docMk/>
+            <pc:sldMk cId="34156375" sldId="257"/>
+            <ac:spMk id="43" creationId="{DDA2092D-2AD1-1ABE-62A0-837A0E74BDFA}"/>
+          </ac:spMkLst>
+        </pc:spChg>
+        <pc:spChg chg="add mod">
+          <ac:chgData name="Björn Meder HMU Potsdam" userId="d258dbf6-ab6a-4282-851d-9abdcd54331d" providerId="ADAL" clId="{4DFD6B1A-A511-587B-86A6-0ACC1CABEBE3}" dt="2025-08-16T07:12:47.099" v="199" actId="554"/>
+          <ac:spMkLst>
+            <pc:docMk/>
+            <pc:sldMk cId="34156375" sldId="257"/>
+            <ac:spMk id="44" creationId="{F323E07B-5A06-F267-8220-0390F1D57091}"/>
+          </ac:spMkLst>
+        </pc:spChg>
+        <pc:spChg chg="add mod">
+          <ac:chgData name="Björn Meder HMU Potsdam" userId="d258dbf6-ab6a-4282-851d-9abdcd54331d" providerId="ADAL" clId="{4DFD6B1A-A511-587B-86A6-0ACC1CABEBE3}" dt="2025-08-16T07:12:40.493" v="198" actId="1036"/>
+          <ac:spMkLst>
+            <pc:docMk/>
+            <pc:sldMk cId="34156375" sldId="257"/>
+            <ac:spMk id="45" creationId="{98F2BC21-1865-99FF-0648-5627C4C27389}"/>
+          </ac:spMkLst>
+        </pc:spChg>
+        <pc:spChg chg="add mod">
+          <ac:chgData name="Björn Meder HMU Potsdam" userId="d258dbf6-ab6a-4282-851d-9abdcd54331d" providerId="ADAL" clId="{4DFD6B1A-A511-587B-86A6-0ACC1CABEBE3}" dt="2025-08-16T07:12:40.493" v="198" actId="1036"/>
+          <ac:spMkLst>
+            <pc:docMk/>
+            <pc:sldMk cId="34156375" sldId="257"/>
+            <ac:spMk id="46" creationId="{9F58EAA9-DAFB-098A-5368-C11F71E605C2}"/>
+          </ac:spMkLst>
+        </pc:spChg>
+        <pc:spChg chg="add mod">
+          <ac:chgData name="Björn Meder HMU Potsdam" userId="d258dbf6-ab6a-4282-851d-9abdcd54331d" providerId="ADAL" clId="{4DFD6B1A-A511-587B-86A6-0ACC1CABEBE3}" dt="2025-08-16T07:12:40.493" v="198" actId="1036"/>
+          <ac:spMkLst>
+            <pc:docMk/>
+            <pc:sldMk cId="34156375" sldId="257"/>
+            <ac:spMk id="47" creationId="{7C3862DE-1F5F-3CB4-07A4-A2A0AC47CD6A}"/>
+          </ac:spMkLst>
+        </pc:spChg>
+        <pc:spChg chg="add mod">
+          <ac:chgData name="Björn Meder HMU Potsdam" userId="d258dbf6-ab6a-4282-851d-9abdcd54331d" providerId="ADAL" clId="{4DFD6B1A-A511-587B-86A6-0ACC1CABEBE3}" dt="2025-08-16T07:12:40.493" v="198" actId="1036"/>
+          <ac:spMkLst>
+            <pc:docMk/>
+            <pc:sldMk cId="34156375" sldId="257"/>
+            <ac:spMk id="48" creationId="{CF59F1C9-120F-B885-8620-D6B2621134D8}"/>
+          </ac:spMkLst>
+        </pc:spChg>
+        <pc:spChg chg="add mod">
+          <ac:chgData name="Björn Meder HMU Potsdam" userId="d258dbf6-ab6a-4282-851d-9abdcd54331d" providerId="ADAL" clId="{4DFD6B1A-A511-587B-86A6-0ACC1CABEBE3}" dt="2025-08-16T07:14:05.420" v="211" actId="554"/>
+          <ac:spMkLst>
+            <pc:docMk/>
+            <pc:sldMk cId="34156375" sldId="257"/>
+            <ac:spMk id="49" creationId="{9B8966E5-28BF-258F-CA2E-93BA17BD83D8}"/>
+          </ac:spMkLst>
+        </pc:spChg>
+        <pc:spChg chg="add mod">
+          <ac:chgData name="Björn Meder HMU Potsdam" userId="d258dbf6-ab6a-4282-851d-9abdcd54331d" providerId="ADAL" clId="{4DFD6B1A-A511-587B-86A6-0ACC1CABEBE3}" dt="2025-08-16T07:14:05.420" v="211" actId="554"/>
+          <ac:spMkLst>
+            <pc:docMk/>
+            <pc:sldMk cId="34156375" sldId="257"/>
+            <ac:spMk id="50" creationId="{76AA6E67-C047-6B9E-034C-90BA401825AA}"/>
+          </ac:spMkLst>
+        </pc:spChg>
+        <pc:spChg chg="add mod">
+          <ac:chgData name="Björn Meder HMU Potsdam" userId="d258dbf6-ab6a-4282-851d-9abdcd54331d" providerId="ADAL" clId="{4DFD6B1A-A511-587B-86A6-0ACC1CABEBE3}" dt="2025-08-16T07:14:05.420" v="211" actId="554"/>
+          <ac:spMkLst>
+            <pc:docMk/>
+            <pc:sldMk cId="34156375" sldId="257"/>
+            <ac:spMk id="51" creationId="{B14A9CC0-2D13-27CF-CD9C-437FE6EBD294}"/>
+          </ac:spMkLst>
+        </pc:spChg>
+        <pc:spChg chg="add del mod">
+          <ac:chgData name="Björn Meder HMU Potsdam" userId="d258dbf6-ab6a-4282-851d-9abdcd54331d" providerId="ADAL" clId="{4DFD6B1A-A511-587B-86A6-0ACC1CABEBE3}" dt="2025-08-16T07:12:22.808" v="194" actId="478"/>
+          <ac:spMkLst>
+            <pc:docMk/>
+            <pc:sldMk cId="34156375" sldId="257"/>
+            <ac:spMk id="52" creationId="{83BCC762-8285-486F-F443-042FD02328D2}"/>
+          </ac:spMkLst>
+        </pc:spChg>
+        <pc:spChg chg="mod">
+          <ac:chgData name="Björn Meder HMU Potsdam" userId="d258dbf6-ab6a-4282-851d-9abdcd54331d" providerId="ADAL" clId="{4DFD6B1A-A511-587B-86A6-0ACC1CABEBE3}" dt="2025-08-16T07:13:47.028" v="208" actId="1076"/>
+          <ac:spMkLst>
+            <pc:docMk/>
+            <pc:sldMk cId="34156375" sldId="257"/>
+            <ac:spMk id="80" creationId="{66D5D2D8-0186-ECD1-9EC5-73B8BEE98C7E}"/>
+          </ac:spMkLst>
+        </pc:spChg>
+        <pc:spChg chg="mod">
+          <ac:chgData name="Björn Meder HMU Potsdam" userId="d258dbf6-ab6a-4282-851d-9abdcd54331d" providerId="ADAL" clId="{4DFD6B1A-A511-587B-86A6-0ACC1CABEBE3}" dt="2025-08-16T07:05:10.755" v="50" actId="1038"/>
+          <ac:spMkLst>
+            <pc:docMk/>
+            <pc:sldMk cId="34156375" sldId="257"/>
+            <ac:spMk id="81" creationId="{C125EBF5-6832-456B-2CDF-E8692B33E80F}"/>
+          </ac:spMkLst>
+        </pc:spChg>
+        <pc:grpChg chg="add del mod">
+          <ac:chgData name="Björn Meder HMU Potsdam" userId="d258dbf6-ab6a-4282-851d-9abdcd54331d" providerId="ADAL" clId="{4DFD6B1A-A511-587B-86A6-0ACC1CABEBE3}" dt="2025-08-16T07:14:29.486" v="212" actId="165"/>
+          <ac:grpSpMkLst>
+            <pc:docMk/>
+            <pc:sldMk cId="34156375" sldId="257"/>
+            <ac:grpSpMk id="28" creationId="{30B61C34-48F1-BA45-0C5D-BEAE6DF3C699}"/>
+          </ac:grpSpMkLst>
+        </pc:grpChg>
+        <pc:grpChg chg="del">
+          <ac:chgData name="Björn Meder HMU Potsdam" userId="d258dbf6-ab6a-4282-851d-9abdcd54331d" providerId="ADAL" clId="{4DFD6B1A-A511-587B-86A6-0ACC1CABEBE3}" dt="2025-08-16T07:01:38.643" v="2" actId="165"/>
+          <ac:grpSpMkLst>
+            <pc:docMk/>
+            <pc:sldMk cId="34156375" sldId="257"/>
+            <ac:grpSpMk id="72" creationId="{D168537E-8382-C385-5E43-2D6B609951EF}"/>
+          </ac:grpSpMkLst>
+        </pc:grpChg>
+        <pc:grpChg chg="mod">
+          <ac:chgData name="Björn Meder HMU Potsdam" userId="d258dbf6-ab6a-4282-851d-9abdcd54331d" providerId="ADAL" clId="{4DFD6B1A-A511-587B-86A6-0ACC1CABEBE3}" dt="2025-08-16T07:10:25.549" v="158" actId="1076"/>
+          <ac:grpSpMkLst>
+            <pc:docMk/>
+            <pc:sldMk cId="34156375" sldId="257"/>
+            <ac:grpSpMk id="77" creationId="{36459198-76B8-D3CA-9FCE-F5629DE94F10}"/>
+          </ac:grpSpMkLst>
+        </pc:grpChg>
+        <pc:picChg chg="add mod">
+          <ac:chgData name="Björn Meder HMU Potsdam" userId="d258dbf6-ab6a-4282-851d-9abdcd54331d" providerId="ADAL" clId="{4DFD6B1A-A511-587B-86A6-0ACC1CABEBE3}" dt="2025-08-16T07:02:22.350" v="11"/>
+          <ac:picMkLst>
+            <pc:docMk/>
+            <pc:sldMk cId="34156375" sldId="257"/>
+            <ac:picMk id="3" creationId="{87262A04-D6B2-B62C-4AB9-EF3381096A5F}"/>
+          </ac:picMkLst>
+        </pc:picChg>
+        <pc:picChg chg="add mod">
+          <ac:chgData name="Björn Meder HMU Potsdam" userId="d258dbf6-ab6a-4282-851d-9abdcd54331d" providerId="ADAL" clId="{4DFD6B1A-A511-587B-86A6-0ACC1CABEBE3}" dt="2025-08-16T07:02:22.350" v="11"/>
+          <ac:picMkLst>
+            <pc:docMk/>
+            <pc:sldMk cId="34156375" sldId="257"/>
+            <ac:picMk id="5" creationId="{25651A63-BD5B-5180-4D6C-4EA673E007A3}"/>
+          </ac:picMkLst>
+        </pc:picChg>
+        <pc:picChg chg="add mod">
+          <ac:chgData name="Björn Meder HMU Potsdam" userId="d258dbf6-ab6a-4282-851d-9abdcd54331d" providerId="ADAL" clId="{4DFD6B1A-A511-587B-86A6-0ACC1CABEBE3}" dt="2025-08-16T07:02:22.350" v="11"/>
+          <ac:picMkLst>
+            <pc:docMk/>
+            <pc:sldMk cId="34156375" sldId="257"/>
+            <ac:picMk id="7" creationId="{84557F7C-25ED-3BC0-924E-223E2103ECA2}"/>
+          </ac:picMkLst>
+        </pc:picChg>
+        <pc:picChg chg="add mod">
+          <ac:chgData name="Björn Meder HMU Potsdam" userId="d258dbf6-ab6a-4282-851d-9abdcd54331d" providerId="ADAL" clId="{4DFD6B1A-A511-587B-86A6-0ACC1CABEBE3}" dt="2025-08-16T07:02:22.350" v="11"/>
+          <ac:picMkLst>
+            <pc:docMk/>
+            <pc:sldMk cId="34156375" sldId="257"/>
+            <ac:picMk id="9" creationId="{60F49C8D-94D5-8E24-471F-1B1F4E4EFA6E}"/>
+          </ac:picMkLst>
+        </pc:picChg>
+        <pc:picChg chg="add mod">
+          <ac:chgData name="Björn Meder HMU Potsdam" userId="d258dbf6-ab6a-4282-851d-9abdcd54331d" providerId="ADAL" clId="{4DFD6B1A-A511-587B-86A6-0ACC1CABEBE3}" dt="2025-08-16T07:02:22.350" v="11"/>
+          <ac:picMkLst>
+            <pc:docMk/>
+            <pc:sldMk cId="34156375" sldId="257"/>
+            <ac:picMk id="11" creationId="{D9501E04-E906-806B-912F-F7F535D78242}"/>
+          </ac:picMkLst>
+        </pc:picChg>
+        <pc:picChg chg="add mod">
+          <ac:chgData name="Björn Meder HMU Potsdam" userId="d258dbf6-ab6a-4282-851d-9abdcd54331d" providerId="ADAL" clId="{4DFD6B1A-A511-587B-86A6-0ACC1CABEBE3}" dt="2025-08-16T07:02:22.350" v="11"/>
+          <ac:picMkLst>
+            <pc:docMk/>
+            <pc:sldMk cId="34156375" sldId="257"/>
+            <ac:picMk id="13" creationId="{EA91C52E-F644-4778-E980-60E549173D18}"/>
+          </ac:picMkLst>
+        </pc:picChg>
+        <pc:picChg chg="add mod">
+          <ac:chgData name="Björn Meder HMU Potsdam" userId="d258dbf6-ab6a-4282-851d-9abdcd54331d" providerId="ADAL" clId="{4DFD6B1A-A511-587B-86A6-0ACC1CABEBE3}" dt="2025-08-16T07:02:22.350" v="11"/>
+          <ac:picMkLst>
+            <pc:docMk/>
+            <pc:sldMk cId="34156375" sldId="257"/>
+            <ac:picMk id="15" creationId="{0B0EF168-731B-B569-A6B7-AD2D631876C4}"/>
+          </ac:picMkLst>
+        </pc:picChg>
+        <pc:picChg chg="add mod">
+          <ac:chgData name="Björn Meder HMU Potsdam" userId="d258dbf6-ab6a-4282-851d-9abdcd54331d" providerId="ADAL" clId="{4DFD6B1A-A511-587B-86A6-0ACC1CABEBE3}" dt="2025-08-16T07:02:22.350" v="11"/>
+          <ac:picMkLst>
+            <pc:docMk/>
+            <pc:sldMk cId="34156375" sldId="257"/>
+            <ac:picMk id="17" creationId="{CD740380-890B-97D6-C814-E3D409E951CB}"/>
+          </ac:picMkLst>
+        </pc:picChg>
+        <pc:picChg chg="add mod">
+          <ac:chgData name="Björn Meder HMU Potsdam" userId="d258dbf6-ab6a-4282-851d-9abdcd54331d" providerId="ADAL" clId="{4DFD6B1A-A511-587B-86A6-0ACC1CABEBE3}" dt="2025-08-16T07:02:22.350" v="11"/>
+          <ac:picMkLst>
+            <pc:docMk/>
+            <pc:sldMk cId="34156375" sldId="257"/>
+            <ac:picMk id="19" creationId="{0EAB9893-86D6-10A2-1EC9-BFCF30CD28C1}"/>
+          </ac:picMkLst>
+        </pc:picChg>
+        <pc:picChg chg="add mod">
+          <ac:chgData name="Björn Meder HMU Potsdam" userId="d258dbf6-ab6a-4282-851d-9abdcd54331d" providerId="ADAL" clId="{4DFD6B1A-A511-587B-86A6-0ACC1CABEBE3}" dt="2025-08-16T07:02:33.109" v="13" actId="14100"/>
+          <ac:picMkLst>
+            <pc:docMk/>
+            <pc:sldMk cId="34156375" sldId="257"/>
+            <ac:picMk id="23" creationId="{D17B3F28-26F2-87A9-3224-CB6A21435721}"/>
+          </ac:picMkLst>
+        </pc:picChg>
+        <pc:picChg chg="add del mod">
+          <ac:chgData name="Björn Meder HMU Potsdam" userId="d258dbf6-ab6a-4282-851d-9abdcd54331d" providerId="ADAL" clId="{4DFD6B1A-A511-587B-86A6-0ACC1CABEBE3}" dt="2025-08-16T07:03:48.357" v="16" actId="478"/>
+          <ac:picMkLst>
+            <pc:docMk/>
+            <pc:sldMk cId="34156375" sldId="257"/>
+            <ac:picMk id="24" creationId="{DF7A8E7B-00F9-B07F-A9C9-A788166FD8CA}"/>
+          </ac:picMkLst>
+        </pc:picChg>
+        <pc:picChg chg="add del mod">
+          <ac:chgData name="Björn Meder HMU Potsdam" userId="d258dbf6-ab6a-4282-851d-9abdcd54331d" providerId="ADAL" clId="{4DFD6B1A-A511-587B-86A6-0ACC1CABEBE3}" dt="2025-08-16T07:03:48.357" v="16" actId="478"/>
+          <ac:picMkLst>
+            <pc:docMk/>
+            <pc:sldMk cId="34156375" sldId="257"/>
+            <ac:picMk id="25" creationId="{50E33874-2044-A564-A34A-45D691935634}"/>
+          </ac:picMkLst>
+        </pc:picChg>
+        <pc:picChg chg="add del mod">
+          <ac:chgData name="Björn Meder HMU Potsdam" userId="d258dbf6-ab6a-4282-851d-9abdcd54331d" providerId="ADAL" clId="{4DFD6B1A-A511-587B-86A6-0ACC1CABEBE3}" dt="2025-08-16T07:03:48.357" v="16" actId="478"/>
+          <ac:picMkLst>
+            <pc:docMk/>
+            <pc:sldMk cId="34156375" sldId="257"/>
+            <ac:picMk id="26" creationId="{9A9B8CF7-FED5-935A-7BB8-C06564C8A660}"/>
+          </ac:picMkLst>
+        </pc:picChg>
+        <pc:picChg chg="add del mod">
+          <ac:chgData name="Björn Meder HMU Potsdam" userId="d258dbf6-ab6a-4282-851d-9abdcd54331d" providerId="ADAL" clId="{4DFD6B1A-A511-587B-86A6-0ACC1CABEBE3}" dt="2025-08-16T07:03:48.357" v="16" actId="478"/>
+          <ac:picMkLst>
+            <pc:docMk/>
+            <pc:sldMk cId="34156375" sldId="257"/>
+            <ac:picMk id="27" creationId="{551515E1-907B-CF47-F766-5A57D944916D}"/>
+          </ac:picMkLst>
+        </pc:picChg>
+        <pc:picChg chg="mod topLvl">
+          <ac:chgData name="Björn Meder HMU Potsdam" userId="d258dbf6-ab6a-4282-851d-9abdcd54331d" providerId="ADAL" clId="{4DFD6B1A-A511-587B-86A6-0ACC1CABEBE3}" dt="2025-08-16T07:14:44.337" v="215" actId="465"/>
+          <ac:picMkLst>
+            <pc:docMk/>
+            <pc:sldMk cId="34156375" sldId="257"/>
+            <ac:picMk id="29" creationId="{52DFD066-56C8-F401-9824-E63A66FD8DE3}"/>
+          </ac:picMkLst>
+        </pc:picChg>
+        <pc:picChg chg="mod topLvl">
+          <ac:chgData name="Björn Meder HMU Potsdam" userId="d258dbf6-ab6a-4282-851d-9abdcd54331d" providerId="ADAL" clId="{4DFD6B1A-A511-587B-86A6-0ACC1CABEBE3}" dt="2025-08-16T07:14:40.669" v="214" actId="465"/>
+          <ac:picMkLst>
+            <pc:docMk/>
+            <pc:sldMk cId="34156375" sldId="257"/>
+            <ac:picMk id="30" creationId="{E05433B0-B7BA-7A98-207D-239BBB94A262}"/>
+          </ac:picMkLst>
+        </pc:picChg>
+        <pc:picChg chg="mod topLvl">
+          <ac:chgData name="Björn Meder HMU Potsdam" userId="d258dbf6-ab6a-4282-851d-9abdcd54331d" providerId="ADAL" clId="{4DFD6B1A-A511-587B-86A6-0ACC1CABEBE3}" dt="2025-08-16T07:14:37.907" v="213" actId="465"/>
+          <ac:picMkLst>
+            <pc:docMk/>
+            <pc:sldMk cId="34156375" sldId="257"/>
+            <ac:picMk id="31" creationId="{9BCA3DFD-A3F1-CF71-7602-76C4E6EA2C3E}"/>
+          </ac:picMkLst>
+        </pc:picChg>
+        <pc:picChg chg="mod topLvl">
+          <ac:chgData name="Björn Meder HMU Potsdam" userId="d258dbf6-ab6a-4282-851d-9abdcd54331d" providerId="ADAL" clId="{4DFD6B1A-A511-587B-86A6-0ACC1CABEBE3}" dt="2025-08-16T07:14:44.337" v="215" actId="465"/>
+          <ac:picMkLst>
+            <pc:docMk/>
+            <pc:sldMk cId="34156375" sldId="257"/>
+            <ac:picMk id="32" creationId="{83AFEAE7-44F2-8648-F279-9487F0178620}"/>
+          </ac:picMkLst>
+        </pc:picChg>
+        <pc:picChg chg="mod topLvl">
+          <ac:chgData name="Björn Meder HMU Potsdam" userId="d258dbf6-ab6a-4282-851d-9abdcd54331d" providerId="ADAL" clId="{4DFD6B1A-A511-587B-86A6-0ACC1CABEBE3}" dt="2025-08-16T07:14:44.337" v="215" actId="465"/>
+          <ac:picMkLst>
+            <pc:docMk/>
+            <pc:sldMk cId="34156375" sldId="257"/>
+            <ac:picMk id="33" creationId="{0546CB74-262E-BA4F-B904-F814BF6D7321}"/>
+          </ac:picMkLst>
+        </pc:picChg>
+        <pc:picChg chg="mod topLvl">
+          <ac:chgData name="Björn Meder HMU Potsdam" userId="d258dbf6-ab6a-4282-851d-9abdcd54331d" providerId="ADAL" clId="{4DFD6B1A-A511-587B-86A6-0ACC1CABEBE3}" dt="2025-08-16T07:14:40.669" v="214" actId="465"/>
+          <ac:picMkLst>
+            <pc:docMk/>
+            <pc:sldMk cId="34156375" sldId="257"/>
+            <ac:picMk id="34" creationId="{386DA79D-F596-D613-92F7-3C0158E99893}"/>
+          </ac:picMkLst>
+        </pc:picChg>
+        <pc:picChg chg="mod topLvl">
+          <ac:chgData name="Björn Meder HMU Potsdam" userId="d258dbf6-ab6a-4282-851d-9abdcd54331d" providerId="ADAL" clId="{4DFD6B1A-A511-587B-86A6-0ACC1CABEBE3}" dt="2025-08-16T07:14:40.669" v="214" actId="465"/>
+          <ac:picMkLst>
+            <pc:docMk/>
+            <pc:sldMk cId="34156375" sldId="257"/>
+            <ac:picMk id="35" creationId="{2E10C79D-1D6D-4A73-621F-8BA18273367D}"/>
+          </ac:picMkLst>
+        </pc:picChg>
+        <pc:picChg chg="mod topLvl">
+          <ac:chgData name="Björn Meder HMU Potsdam" userId="d258dbf6-ab6a-4282-851d-9abdcd54331d" providerId="ADAL" clId="{4DFD6B1A-A511-587B-86A6-0ACC1CABEBE3}" dt="2025-08-16T07:14:37.907" v="213" actId="465"/>
+          <ac:picMkLst>
+            <pc:docMk/>
+            <pc:sldMk cId="34156375" sldId="257"/>
+            <ac:picMk id="36" creationId="{E0B13C66-5342-D09E-7AAC-82520DC8C39D}"/>
+          </ac:picMkLst>
+        </pc:picChg>
+        <pc:picChg chg="mod topLvl">
+          <ac:chgData name="Björn Meder HMU Potsdam" userId="d258dbf6-ab6a-4282-851d-9abdcd54331d" providerId="ADAL" clId="{4DFD6B1A-A511-587B-86A6-0ACC1CABEBE3}" dt="2025-08-16T07:14:37.907" v="213" actId="465"/>
+          <ac:picMkLst>
+            <pc:docMk/>
+            <pc:sldMk cId="34156375" sldId="257"/>
+            <ac:picMk id="37" creationId="{AAB0F67F-0AF4-2945-014F-CD1A32645447}"/>
+          </ac:picMkLst>
+        </pc:picChg>
+        <pc:picChg chg="del mod topLvl">
+          <ac:chgData name="Björn Meder HMU Potsdam" userId="d258dbf6-ab6a-4282-851d-9abdcd54331d" providerId="ADAL" clId="{4DFD6B1A-A511-587B-86A6-0ACC1CABEBE3}" dt="2025-08-16T07:02:00.400" v="10" actId="478"/>
+          <ac:picMkLst>
+            <pc:docMk/>
+            <pc:sldMk cId="34156375" sldId="257"/>
+            <ac:picMk id="73" creationId="{72F34CD0-FCE4-F720-D4B1-92E171AE7CB7}"/>
+          </ac:picMkLst>
+        </pc:picChg>
+        <pc:picChg chg="del mod topLvl">
+          <ac:chgData name="Björn Meder HMU Potsdam" userId="d258dbf6-ab6a-4282-851d-9abdcd54331d" providerId="ADAL" clId="{4DFD6B1A-A511-587B-86A6-0ACC1CABEBE3}" dt="2025-08-16T07:02:00.400" v="10" actId="478"/>
+          <ac:picMkLst>
+            <pc:docMk/>
+            <pc:sldMk cId="34156375" sldId="257"/>
+            <ac:picMk id="74" creationId="{AB9CBE55-907A-5A47-5A69-A79F5093FBDB}"/>
+          </ac:picMkLst>
+        </pc:picChg>
+        <pc:picChg chg="del mod topLvl">
+          <ac:chgData name="Björn Meder HMU Potsdam" userId="d258dbf6-ab6a-4282-851d-9abdcd54331d" providerId="ADAL" clId="{4DFD6B1A-A511-587B-86A6-0ACC1CABEBE3}" dt="2025-08-16T07:02:00.400" v="10" actId="478"/>
+          <ac:picMkLst>
+            <pc:docMk/>
+            <pc:sldMk cId="34156375" sldId="257"/>
+            <ac:picMk id="75" creationId="{8D96A265-73C6-3DB5-0088-530A2E3851D2}"/>
+          </ac:picMkLst>
+        </pc:picChg>
+        <pc:picChg chg="del">
+          <ac:chgData name="Björn Meder HMU Potsdam" userId="d258dbf6-ab6a-4282-851d-9abdcd54331d" providerId="ADAL" clId="{4DFD6B1A-A511-587B-86A6-0ACC1CABEBE3}" dt="2025-08-16T07:01:36.082" v="1" actId="478"/>
+          <ac:picMkLst>
+            <pc:docMk/>
+            <pc:sldMk cId="34156375" sldId="257"/>
+            <ac:picMk id="76" creationId="{1FEA5B02-A90B-9816-552C-7B381CCE0C53}"/>
+          </ac:picMkLst>
+        </pc:picChg>
+      </pc:sldChg>
+    </pc:docChg>
+  </pc:docChgLst>
   <pc:docChgLst>
     <pc:chgData name="Björn Meder HMU Potsdam" userId="d258dbf6-ab6a-4282-851d-9abdcd54331d" providerId="ADAL" clId="{B6D57924-B848-2742-8D38-F6230294B7DC}"/>
     <pc:docChg chg="custSel addSld delSld modSld modMainMaster">
@@ -135,198 +528,6 @@
           <pc:docMk/>
           <pc:sldMk cId="1845256045" sldId="256"/>
         </pc:sldMkLst>
-        <pc:spChg chg="add del mod">
-          <ac:chgData name="Björn Meder HMU Potsdam" userId="d258dbf6-ab6a-4282-851d-9abdcd54331d" providerId="ADAL" clId="{B6D57924-B848-2742-8D38-F6230294B7DC}" dt="2025-07-31T12:14:34.081" v="4" actId="21"/>
-          <ac:spMkLst>
-            <pc:docMk/>
-            <pc:sldMk cId="1845256045" sldId="256"/>
-            <ac:spMk id="11" creationId="{58D96654-5168-C42B-A936-CA26ABF3F4CC}"/>
-          </ac:spMkLst>
-        </pc:spChg>
-        <pc:spChg chg="add del mod">
-          <ac:chgData name="Björn Meder HMU Potsdam" userId="d258dbf6-ab6a-4282-851d-9abdcd54331d" providerId="ADAL" clId="{B6D57924-B848-2742-8D38-F6230294B7DC}" dt="2025-07-31T12:14:34.081" v="4" actId="21"/>
-          <ac:spMkLst>
-            <pc:docMk/>
-            <pc:sldMk cId="1845256045" sldId="256"/>
-            <ac:spMk id="12" creationId="{B1E92F34-CCB0-CCC9-8A33-70E3C3357846}"/>
-          </ac:spMkLst>
-        </pc:spChg>
-        <pc:spChg chg="add del mod">
-          <ac:chgData name="Björn Meder HMU Potsdam" userId="d258dbf6-ab6a-4282-851d-9abdcd54331d" providerId="ADAL" clId="{B6D57924-B848-2742-8D38-F6230294B7DC}" dt="2025-07-31T12:14:34.081" v="4" actId="21"/>
-          <ac:spMkLst>
-            <pc:docMk/>
-            <pc:sldMk cId="1845256045" sldId="256"/>
-            <ac:spMk id="13" creationId="{67129030-4285-C68C-6232-7994AA617540}"/>
-          </ac:spMkLst>
-        </pc:spChg>
-        <pc:spChg chg="add del mod">
-          <ac:chgData name="Björn Meder HMU Potsdam" userId="d258dbf6-ab6a-4282-851d-9abdcd54331d" providerId="ADAL" clId="{B6D57924-B848-2742-8D38-F6230294B7DC}" dt="2025-07-31T12:14:34.081" v="4" actId="21"/>
-          <ac:spMkLst>
-            <pc:docMk/>
-            <pc:sldMk cId="1845256045" sldId="256"/>
-            <ac:spMk id="15" creationId="{3753DC2B-444C-8588-703E-F86C7285737A}"/>
-          </ac:spMkLst>
-        </pc:spChg>
-        <pc:spChg chg="add del mod">
-          <ac:chgData name="Björn Meder HMU Potsdam" userId="d258dbf6-ab6a-4282-851d-9abdcd54331d" providerId="ADAL" clId="{B6D57924-B848-2742-8D38-F6230294B7DC}" dt="2025-07-31T12:14:34.081" v="4" actId="21"/>
-          <ac:spMkLst>
-            <pc:docMk/>
-            <pc:sldMk cId="1845256045" sldId="256"/>
-            <ac:spMk id="16" creationId="{D4BE3873-3D29-6F4F-D44A-A4C1A803F73B}"/>
-          </ac:spMkLst>
-        </pc:spChg>
-        <pc:spChg chg="add del mod">
-          <ac:chgData name="Björn Meder HMU Potsdam" userId="d258dbf6-ab6a-4282-851d-9abdcd54331d" providerId="ADAL" clId="{B6D57924-B848-2742-8D38-F6230294B7DC}" dt="2025-07-31T12:14:34.081" v="4" actId="21"/>
-          <ac:spMkLst>
-            <pc:docMk/>
-            <pc:sldMk cId="1845256045" sldId="256"/>
-            <ac:spMk id="19" creationId="{92F3250F-6D9B-99B3-BEF4-69E850C54ABB}"/>
-          </ac:spMkLst>
-        </pc:spChg>
-        <pc:spChg chg="add del mod">
-          <ac:chgData name="Björn Meder HMU Potsdam" userId="d258dbf6-ab6a-4282-851d-9abdcd54331d" providerId="ADAL" clId="{B6D57924-B848-2742-8D38-F6230294B7DC}" dt="2025-07-31T12:14:34.081" v="4" actId="21"/>
-          <ac:spMkLst>
-            <pc:docMk/>
-            <pc:sldMk cId="1845256045" sldId="256"/>
-            <ac:spMk id="21" creationId="{4B2BACCD-B155-CDA5-D6F8-7D3A767FA652}"/>
-          </ac:spMkLst>
-        </pc:spChg>
-        <pc:spChg chg="del mod">
-          <ac:chgData name="Björn Meder HMU Potsdam" userId="d258dbf6-ab6a-4282-851d-9abdcd54331d" providerId="ADAL" clId="{B6D57924-B848-2742-8D38-F6230294B7DC}" dt="2025-07-31T12:14:34.081" v="4" actId="21"/>
-          <ac:spMkLst>
-            <pc:docMk/>
-            <pc:sldMk cId="1845256045" sldId="256"/>
-            <ac:spMk id="22" creationId="{23EE6291-2FC2-0F61-C5E5-7EABCD1194B7}"/>
-          </ac:spMkLst>
-        </pc:spChg>
-        <pc:spChg chg="add del mod">
-          <ac:chgData name="Björn Meder HMU Potsdam" userId="d258dbf6-ab6a-4282-851d-9abdcd54331d" providerId="ADAL" clId="{B6D57924-B848-2742-8D38-F6230294B7DC}" dt="2025-07-31T12:14:34.081" v="4" actId="21"/>
-          <ac:spMkLst>
-            <pc:docMk/>
-            <pc:sldMk cId="1845256045" sldId="256"/>
-            <ac:spMk id="25" creationId="{72671950-BDD0-77C0-22EB-03AE98715702}"/>
-          </ac:spMkLst>
-        </pc:spChg>
-        <pc:spChg chg="add del mod">
-          <ac:chgData name="Björn Meder HMU Potsdam" userId="d258dbf6-ab6a-4282-851d-9abdcd54331d" providerId="ADAL" clId="{B6D57924-B848-2742-8D38-F6230294B7DC}" dt="2025-07-31T12:14:34.081" v="4" actId="21"/>
-          <ac:spMkLst>
-            <pc:docMk/>
-            <pc:sldMk cId="1845256045" sldId="256"/>
-            <ac:spMk id="26" creationId="{89DC1350-4356-317D-B146-2CCCC7475328}"/>
-          </ac:spMkLst>
-        </pc:spChg>
-        <pc:spChg chg="mod">
-          <ac:chgData name="Björn Meder HMU Potsdam" userId="d258dbf6-ab6a-4282-851d-9abdcd54331d" providerId="ADAL" clId="{B6D57924-B848-2742-8D38-F6230294B7DC}" dt="2025-07-31T12:14:17.713" v="1"/>
-          <ac:spMkLst>
-            <pc:docMk/>
-            <pc:sldMk cId="1845256045" sldId="256"/>
-            <ac:spMk id="28" creationId="{3BAE6AF0-EE9C-F0C4-3629-DA832C0F9DF6}"/>
-          </ac:spMkLst>
-        </pc:spChg>
-        <pc:spChg chg="add del mod">
-          <ac:chgData name="Björn Meder HMU Potsdam" userId="d258dbf6-ab6a-4282-851d-9abdcd54331d" providerId="ADAL" clId="{B6D57924-B848-2742-8D38-F6230294B7DC}" dt="2025-07-31T12:14:50.992" v="7" actId="21"/>
-          <ac:spMkLst>
-            <pc:docMk/>
-            <pc:sldMk cId="1845256045" sldId="256"/>
-            <ac:spMk id="39" creationId="{158C1796-AC56-9273-ED68-23C4C8D86DCA}"/>
-          </ac:spMkLst>
-        </pc:spChg>
-        <pc:spChg chg="add del mod">
-          <ac:chgData name="Björn Meder HMU Potsdam" userId="d258dbf6-ab6a-4282-851d-9abdcd54331d" providerId="ADAL" clId="{B6D57924-B848-2742-8D38-F6230294B7DC}" dt="2025-07-31T12:14:50.992" v="7" actId="21"/>
-          <ac:spMkLst>
-            <pc:docMk/>
-            <pc:sldMk cId="1845256045" sldId="256"/>
-            <ac:spMk id="41" creationId="{2A3E5524-93A5-20E3-5F29-B300AC04F868}"/>
-          </ac:spMkLst>
-        </pc:spChg>
-        <pc:spChg chg="add del mod">
-          <ac:chgData name="Björn Meder HMU Potsdam" userId="d258dbf6-ab6a-4282-851d-9abdcd54331d" providerId="ADAL" clId="{B6D57924-B848-2742-8D38-F6230294B7DC}" dt="2025-07-31T12:14:50.992" v="7" actId="21"/>
-          <ac:spMkLst>
-            <pc:docMk/>
-            <pc:sldMk cId="1845256045" sldId="256"/>
-            <ac:spMk id="42" creationId="{1AA82B5A-56EE-4013-023E-60AB1A47540E}"/>
-          </ac:spMkLst>
-        </pc:spChg>
-        <pc:spChg chg="add del mod">
-          <ac:chgData name="Björn Meder HMU Potsdam" userId="d258dbf6-ab6a-4282-851d-9abdcd54331d" providerId="ADAL" clId="{B6D57924-B848-2742-8D38-F6230294B7DC}" dt="2025-07-31T12:14:50.992" v="7" actId="21"/>
-          <ac:spMkLst>
-            <pc:docMk/>
-            <pc:sldMk cId="1845256045" sldId="256"/>
-            <ac:spMk id="46" creationId="{87AB22BD-A2F9-4CA2-93B0-4AD1A54D8202}"/>
-          </ac:spMkLst>
-        </pc:spChg>
-        <pc:spChg chg="add del mod">
-          <ac:chgData name="Björn Meder HMU Potsdam" userId="d258dbf6-ab6a-4282-851d-9abdcd54331d" providerId="ADAL" clId="{B6D57924-B848-2742-8D38-F6230294B7DC}" dt="2025-07-31T12:14:50.992" v="7" actId="21"/>
-          <ac:spMkLst>
-            <pc:docMk/>
-            <pc:sldMk cId="1845256045" sldId="256"/>
-            <ac:spMk id="47" creationId="{D81785AE-AC69-EFB7-2726-D914F18542AF}"/>
-          </ac:spMkLst>
-        </pc:spChg>
-        <pc:spChg chg="add del mod">
-          <ac:chgData name="Björn Meder HMU Potsdam" userId="d258dbf6-ab6a-4282-851d-9abdcd54331d" providerId="ADAL" clId="{B6D57924-B848-2742-8D38-F6230294B7DC}" dt="2025-07-31T12:14:50.992" v="7" actId="21"/>
-          <ac:spMkLst>
-            <pc:docMk/>
-            <pc:sldMk cId="1845256045" sldId="256"/>
-            <ac:spMk id="49" creationId="{0B4D4534-9B72-6345-00E8-1C364824A8D9}"/>
-          </ac:spMkLst>
-        </pc:spChg>
-        <pc:spChg chg="add del mod">
-          <ac:chgData name="Björn Meder HMU Potsdam" userId="d258dbf6-ab6a-4282-851d-9abdcd54331d" providerId="ADAL" clId="{B6D57924-B848-2742-8D38-F6230294B7DC}" dt="2025-07-31T12:14:50.992" v="7" actId="21"/>
-          <ac:spMkLst>
-            <pc:docMk/>
-            <pc:sldMk cId="1845256045" sldId="256"/>
-            <ac:spMk id="50" creationId="{FBE04B86-F0A8-366D-9E62-FC617F66FBA7}"/>
-          </ac:spMkLst>
-        </pc:spChg>
-        <pc:spChg chg="add del mod">
-          <ac:chgData name="Björn Meder HMU Potsdam" userId="d258dbf6-ab6a-4282-851d-9abdcd54331d" providerId="ADAL" clId="{B6D57924-B848-2742-8D38-F6230294B7DC}" dt="2025-07-31T12:14:50.992" v="7" actId="21"/>
-          <ac:spMkLst>
-            <pc:docMk/>
-            <pc:sldMk cId="1845256045" sldId="256"/>
-            <ac:spMk id="52" creationId="{FB191E7F-0FF5-B060-B89F-F798D3A89CEE}"/>
-          </ac:spMkLst>
-        </pc:spChg>
-        <pc:spChg chg="add del mod">
-          <ac:chgData name="Björn Meder HMU Potsdam" userId="d258dbf6-ab6a-4282-851d-9abdcd54331d" providerId="ADAL" clId="{B6D57924-B848-2742-8D38-F6230294B7DC}" dt="2025-07-31T12:14:50.992" v="7" actId="21"/>
-          <ac:spMkLst>
-            <pc:docMk/>
-            <pc:sldMk cId="1845256045" sldId="256"/>
-            <ac:spMk id="54" creationId="{804FB074-3D23-EE53-3C22-2B83714B6073}"/>
-          </ac:spMkLst>
-        </pc:spChg>
-        <pc:spChg chg="add del mod">
-          <ac:chgData name="Björn Meder HMU Potsdam" userId="d258dbf6-ab6a-4282-851d-9abdcd54331d" providerId="ADAL" clId="{B6D57924-B848-2742-8D38-F6230294B7DC}" dt="2025-07-31T12:14:50.992" v="7" actId="21"/>
-          <ac:spMkLst>
-            <pc:docMk/>
-            <pc:sldMk cId="1845256045" sldId="256"/>
-            <ac:spMk id="55" creationId="{3247DBE0-C15C-5D58-8E5F-5780552BE6CC}"/>
-          </ac:spMkLst>
-        </pc:spChg>
-        <pc:spChg chg="del">
-          <ac:chgData name="Björn Meder HMU Potsdam" userId="d258dbf6-ab6a-4282-851d-9abdcd54331d" providerId="ADAL" clId="{B6D57924-B848-2742-8D38-F6230294B7DC}" dt="2025-07-31T12:14:08.752" v="0" actId="478"/>
-          <ac:spMkLst>
-            <pc:docMk/>
-            <pc:sldMk cId="1845256045" sldId="256"/>
-            <ac:spMk id="66" creationId="{1507D06C-F529-A716-3FA2-38C641CD6299}"/>
-          </ac:spMkLst>
-        </pc:spChg>
-        <pc:spChg chg="del">
-          <ac:chgData name="Björn Meder HMU Potsdam" userId="d258dbf6-ab6a-4282-851d-9abdcd54331d" providerId="ADAL" clId="{B6D57924-B848-2742-8D38-F6230294B7DC}" dt="2025-07-31T12:14:08.752" v="0" actId="478"/>
-          <ac:spMkLst>
-            <pc:docMk/>
-            <pc:sldMk cId="1845256045" sldId="256"/>
-            <ac:spMk id="67" creationId="{419202B5-E33E-1400-9DC3-EA93BFA2D60D}"/>
-          </ac:spMkLst>
-        </pc:spChg>
-        <pc:spChg chg="del">
-          <ac:chgData name="Björn Meder HMU Potsdam" userId="d258dbf6-ab6a-4282-851d-9abdcd54331d" providerId="ADAL" clId="{B6D57924-B848-2742-8D38-F6230294B7DC}" dt="2025-07-31T12:14:08.752" v="0" actId="478"/>
-          <ac:spMkLst>
-            <pc:docMk/>
-            <pc:sldMk cId="1845256045" sldId="256"/>
-            <ac:spMk id="68" creationId="{47878F50-984D-451B-BC66-75F24C7C4510}"/>
-          </ac:spMkLst>
-        </pc:spChg>
         <pc:spChg chg="mod">
           <ac:chgData name="Björn Meder HMU Potsdam" userId="d258dbf6-ab6a-4282-851d-9abdcd54331d" providerId="ADAL" clId="{B6D57924-B848-2742-8D38-F6230294B7DC}" dt="2025-07-31T12:15:09.225" v="13" actId="1036"/>
           <ac:spMkLst>
@@ -439,30 +640,6 @@
             <ac:spMk id="100" creationId="{69C215B1-3CF1-6167-D884-7C75549F646D}"/>
           </ac:spMkLst>
         </pc:spChg>
-        <pc:grpChg chg="del">
-          <ac:chgData name="Björn Meder HMU Potsdam" userId="d258dbf6-ab6a-4282-851d-9abdcd54331d" providerId="ADAL" clId="{B6D57924-B848-2742-8D38-F6230294B7DC}" dt="2025-07-31T12:14:08.752" v="0" actId="478"/>
-          <ac:grpSpMkLst>
-            <pc:docMk/>
-            <pc:sldMk cId="1845256045" sldId="256"/>
-            <ac:grpSpMk id="58" creationId="{AAEA2726-7F98-5339-2BA6-DF72C4BFC99E}"/>
-          </ac:grpSpMkLst>
-        </pc:grpChg>
-        <pc:grpChg chg="del">
-          <ac:chgData name="Björn Meder HMU Potsdam" userId="d258dbf6-ab6a-4282-851d-9abdcd54331d" providerId="ADAL" clId="{B6D57924-B848-2742-8D38-F6230294B7DC}" dt="2025-07-31T12:14:08.752" v="0" actId="478"/>
-          <ac:grpSpMkLst>
-            <pc:docMk/>
-            <pc:sldMk cId="1845256045" sldId="256"/>
-            <ac:grpSpMk id="63" creationId="{0AAB4D51-8856-A9D9-DF54-C0C9DD73BADB}"/>
-          </ac:grpSpMkLst>
-        </pc:grpChg>
-        <pc:picChg chg="del">
-          <ac:chgData name="Björn Meder HMU Potsdam" userId="d258dbf6-ab6a-4282-851d-9abdcd54331d" providerId="ADAL" clId="{B6D57924-B848-2742-8D38-F6230294B7DC}" dt="2025-07-31T12:14:08.752" v="0" actId="478"/>
-          <ac:picMkLst>
-            <pc:docMk/>
-            <pc:sldMk cId="1845256045" sldId="256"/>
-            <ac:picMk id="69" creationId="{2CCF4D79-03EE-E87E-26B8-7A995F0E3197}"/>
-          </ac:picMkLst>
-        </pc:picChg>
       </pc:sldChg>
       <pc:sldChg chg="addSp delSp modSp new del mod">
         <pc:chgData name="Björn Meder HMU Potsdam" userId="d258dbf6-ab6a-4282-851d-9abdcd54331d" providerId="ADAL" clId="{B6D57924-B848-2742-8D38-F6230294B7DC}" dt="2025-07-31T17:45:04.732" v="54" actId="2696"/>
@@ -470,110 +647,6 @@
           <pc:docMk/>
           <pc:sldMk cId="1595734359" sldId="257"/>
         </pc:sldMkLst>
-        <pc:spChg chg="del">
-          <ac:chgData name="Björn Meder HMU Potsdam" userId="d258dbf6-ab6a-4282-851d-9abdcd54331d" providerId="ADAL" clId="{B6D57924-B848-2742-8D38-F6230294B7DC}" dt="2025-07-31T17:43:59.651" v="49" actId="478"/>
-          <ac:spMkLst>
-            <pc:docMk/>
-            <pc:sldMk cId="1595734359" sldId="257"/>
-            <ac:spMk id="2" creationId="{A02BE137-75A4-2BAA-48DF-F5EFA5AC6917}"/>
-          </ac:spMkLst>
-        </pc:spChg>
-        <pc:spChg chg="del">
-          <ac:chgData name="Björn Meder HMU Potsdam" userId="d258dbf6-ab6a-4282-851d-9abdcd54331d" providerId="ADAL" clId="{B6D57924-B848-2742-8D38-F6230294B7DC}" dt="2025-07-31T17:43:59.651" v="49" actId="478"/>
-          <ac:spMkLst>
-            <pc:docMk/>
-            <pc:sldMk cId="1595734359" sldId="257"/>
-            <ac:spMk id="3" creationId="{6B7F1242-8F63-5AAB-9625-ECEC2B28FD96}"/>
-          </ac:spMkLst>
-        </pc:spChg>
-        <pc:spChg chg="del mod topLvl">
-          <ac:chgData name="Björn Meder HMU Potsdam" userId="d258dbf6-ab6a-4282-851d-9abdcd54331d" providerId="ADAL" clId="{B6D57924-B848-2742-8D38-F6230294B7DC}" dt="2025-07-31T17:44:52.236" v="53" actId="21"/>
-          <ac:spMkLst>
-            <pc:docMk/>
-            <pc:sldMk cId="1595734359" sldId="257"/>
-            <ac:spMk id="6" creationId="{F9B676ED-B4F1-36EB-D34A-A5340AB63164}"/>
-          </ac:spMkLst>
-        </pc:spChg>
-        <pc:spChg chg="del mod topLvl">
-          <ac:chgData name="Björn Meder HMU Potsdam" userId="d258dbf6-ab6a-4282-851d-9abdcd54331d" providerId="ADAL" clId="{B6D57924-B848-2742-8D38-F6230294B7DC}" dt="2025-07-31T17:44:52.236" v="53" actId="21"/>
-          <ac:spMkLst>
-            <pc:docMk/>
-            <pc:sldMk cId="1595734359" sldId="257"/>
-            <ac:spMk id="7" creationId="{DA20CEA6-5C95-3DD6-90F1-FAF6DDB509AA}"/>
-          </ac:spMkLst>
-        </pc:spChg>
-        <pc:spChg chg="del mod topLvl">
-          <ac:chgData name="Björn Meder HMU Potsdam" userId="d258dbf6-ab6a-4282-851d-9abdcd54331d" providerId="ADAL" clId="{B6D57924-B848-2742-8D38-F6230294B7DC}" dt="2025-07-31T17:44:52.236" v="53" actId="21"/>
-          <ac:spMkLst>
-            <pc:docMk/>
-            <pc:sldMk cId="1595734359" sldId="257"/>
-            <ac:spMk id="9" creationId="{7FDD09CE-C53C-6701-FC5F-D8FC51BAD06B}"/>
-          </ac:spMkLst>
-        </pc:spChg>
-        <pc:spChg chg="del mod topLvl">
-          <ac:chgData name="Björn Meder HMU Potsdam" userId="d258dbf6-ab6a-4282-851d-9abdcd54331d" providerId="ADAL" clId="{B6D57924-B848-2742-8D38-F6230294B7DC}" dt="2025-07-31T17:44:52.236" v="53" actId="21"/>
-          <ac:spMkLst>
-            <pc:docMk/>
-            <pc:sldMk cId="1595734359" sldId="257"/>
-            <ac:spMk id="10" creationId="{FB946922-B2D6-AAEF-121C-D352106CA485}"/>
-          </ac:spMkLst>
-        </pc:spChg>
-        <pc:spChg chg="del mod topLvl">
-          <ac:chgData name="Björn Meder HMU Potsdam" userId="d258dbf6-ab6a-4282-851d-9abdcd54331d" providerId="ADAL" clId="{B6D57924-B848-2742-8D38-F6230294B7DC}" dt="2025-07-31T17:44:52.236" v="53" actId="21"/>
-          <ac:spMkLst>
-            <pc:docMk/>
-            <pc:sldMk cId="1595734359" sldId="257"/>
-            <ac:spMk id="11" creationId="{D736C8E4-36D7-A947-B2EF-CB64CADE065D}"/>
-          </ac:spMkLst>
-        </pc:spChg>
-        <pc:spChg chg="del mod topLvl">
-          <ac:chgData name="Björn Meder HMU Potsdam" userId="d258dbf6-ab6a-4282-851d-9abdcd54331d" providerId="ADAL" clId="{B6D57924-B848-2742-8D38-F6230294B7DC}" dt="2025-07-31T17:44:52.236" v="53" actId="21"/>
-          <ac:spMkLst>
-            <pc:docMk/>
-            <pc:sldMk cId="1595734359" sldId="257"/>
-            <ac:spMk id="12" creationId="{8C06664A-E40B-EAD3-45F7-0EF38E8F1813}"/>
-          </ac:spMkLst>
-        </pc:spChg>
-        <pc:spChg chg="del mod topLvl">
-          <ac:chgData name="Björn Meder HMU Potsdam" userId="d258dbf6-ab6a-4282-851d-9abdcd54331d" providerId="ADAL" clId="{B6D57924-B848-2742-8D38-F6230294B7DC}" dt="2025-07-31T17:44:52.236" v="53" actId="21"/>
-          <ac:spMkLst>
-            <pc:docMk/>
-            <pc:sldMk cId="1595734359" sldId="257"/>
-            <ac:spMk id="13" creationId="{A41EF103-C1B2-C040-775A-B3EEB0DE2D22}"/>
-          </ac:spMkLst>
-        </pc:spChg>
-        <pc:spChg chg="del mod topLvl">
-          <ac:chgData name="Björn Meder HMU Potsdam" userId="d258dbf6-ab6a-4282-851d-9abdcd54331d" providerId="ADAL" clId="{B6D57924-B848-2742-8D38-F6230294B7DC}" dt="2025-07-31T17:44:52.236" v="53" actId="21"/>
-          <ac:spMkLst>
-            <pc:docMk/>
-            <pc:sldMk cId="1595734359" sldId="257"/>
-            <ac:spMk id="14" creationId="{CBEE0EBB-3CBC-CE08-079F-F4D32D535D0B}"/>
-          </ac:spMkLst>
-        </pc:spChg>
-        <pc:grpChg chg="add del mod">
-          <ac:chgData name="Björn Meder HMU Potsdam" userId="d258dbf6-ab6a-4282-851d-9abdcd54331d" providerId="ADAL" clId="{B6D57924-B848-2742-8D38-F6230294B7DC}" dt="2025-07-31T17:44:39.275" v="51" actId="165"/>
-          <ac:grpSpMkLst>
-            <pc:docMk/>
-            <pc:sldMk cId="1595734359" sldId="257"/>
-            <ac:grpSpMk id="4" creationId="{700E52F1-5FA6-882D-C6FF-1DA8EC81D714}"/>
-          </ac:grpSpMkLst>
-        </pc:grpChg>
-        <pc:grpChg chg="del topLvl">
-          <ac:chgData name="Björn Meder HMU Potsdam" userId="d258dbf6-ab6a-4282-851d-9abdcd54331d" providerId="ADAL" clId="{B6D57924-B848-2742-8D38-F6230294B7DC}" dt="2025-07-31T17:44:41.087" v="52" actId="165"/>
-          <ac:grpSpMkLst>
-            <pc:docMk/>
-            <pc:sldMk cId="1595734359" sldId="257"/>
-            <ac:grpSpMk id="5" creationId="{61EC9D8F-5A80-F3C0-F644-004ED33C5C33}"/>
-          </ac:grpSpMkLst>
-        </pc:grpChg>
-        <pc:picChg chg="del mod topLvl">
-          <ac:chgData name="Björn Meder HMU Potsdam" userId="d258dbf6-ab6a-4282-851d-9abdcd54331d" providerId="ADAL" clId="{B6D57924-B848-2742-8D38-F6230294B7DC}" dt="2025-07-31T17:44:52.236" v="53" actId="21"/>
-          <ac:picMkLst>
-            <pc:docMk/>
-            <pc:sldMk cId="1595734359" sldId="257"/>
-            <ac:picMk id="8" creationId="{817A741A-0A4C-2861-3B78-F1B336283F52}"/>
-          </ac:picMkLst>
-        </pc:picChg>
       </pc:sldChg>
       <pc:sldMasterChg chg="modSp modSldLayout">
         <pc:chgData name="Björn Meder HMU Potsdam" userId="d258dbf6-ab6a-4282-851d-9abdcd54331d" providerId="ADAL" clId="{B6D57924-B848-2742-8D38-F6230294B7DC}" dt="2025-07-31T12:14:45.714" v="5"/>
@@ -581,46 +654,6 @@
           <pc:docMk/>
           <pc:sldMasterMk cId="2618204342" sldId="2147483696"/>
         </pc:sldMasterMkLst>
-        <pc:spChg chg="mod">
-          <ac:chgData name="Björn Meder HMU Potsdam" userId="d258dbf6-ab6a-4282-851d-9abdcd54331d" providerId="ADAL" clId="{B6D57924-B848-2742-8D38-F6230294B7DC}" dt="2025-07-31T12:14:45.714" v="5"/>
-          <ac:spMkLst>
-            <pc:docMk/>
-            <pc:sldMasterMk cId="2618204342" sldId="2147483696"/>
-            <ac:spMk id="2" creationId="{00000000-0000-0000-0000-000000000000}"/>
-          </ac:spMkLst>
-        </pc:spChg>
-        <pc:spChg chg="mod">
-          <ac:chgData name="Björn Meder HMU Potsdam" userId="d258dbf6-ab6a-4282-851d-9abdcd54331d" providerId="ADAL" clId="{B6D57924-B848-2742-8D38-F6230294B7DC}" dt="2025-07-31T12:14:45.714" v="5"/>
-          <ac:spMkLst>
-            <pc:docMk/>
-            <pc:sldMasterMk cId="2618204342" sldId="2147483696"/>
-            <ac:spMk id="3" creationId="{00000000-0000-0000-0000-000000000000}"/>
-          </ac:spMkLst>
-        </pc:spChg>
-        <pc:spChg chg="mod">
-          <ac:chgData name="Björn Meder HMU Potsdam" userId="d258dbf6-ab6a-4282-851d-9abdcd54331d" providerId="ADAL" clId="{B6D57924-B848-2742-8D38-F6230294B7DC}" dt="2025-07-31T12:14:45.714" v="5"/>
-          <ac:spMkLst>
-            <pc:docMk/>
-            <pc:sldMasterMk cId="2618204342" sldId="2147483696"/>
-            <ac:spMk id="4" creationId="{00000000-0000-0000-0000-000000000000}"/>
-          </ac:spMkLst>
-        </pc:spChg>
-        <pc:spChg chg="mod">
-          <ac:chgData name="Björn Meder HMU Potsdam" userId="d258dbf6-ab6a-4282-851d-9abdcd54331d" providerId="ADAL" clId="{B6D57924-B848-2742-8D38-F6230294B7DC}" dt="2025-07-31T12:14:45.714" v="5"/>
-          <ac:spMkLst>
-            <pc:docMk/>
-            <pc:sldMasterMk cId="2618204342" sldId="2147483696"/>
-            <ac:spMk id="5" creationId="{00000000-0000-0000-0000-000000000000}"/>
-          </ac:spMkLst>
-        </pc:spChg>
-        <pc:spChg chg="mod">
-          <ac:chgData name="Björn Meder HMU Potsdam" userId="d258dbf6-ab6a-4282-851d-9abdcd54331d" providerId="ADAL" clId="{B6D57924-B848-2742-8D38-F6230294B7DC}" dt="2025-07-31T12:14:45.714" v="5"/>
-          <ac:spMkLst>
-            <pc:docMk/>
-            <pc:sldMasterMk cId="2618204342" sldId="2147483696"/>
-            <ac:spMk id="6" creationId="{00000000-0000-0000-0000-000000000000}"/>
-          </ac:spMkLst>
-        </pc:spChg>
         <pc:sldLayoutChg chg="modSp">
           <pc:chgData name="Björn Meder HMU Potsdam" userId="d258dbf6-ab6a-4282-851d-9abdcd54331d" providerId="ADAL" clId="{B6D57924-B848-2742-8D38-F6230294B7DC}" dt="2025-07-31T12:14:45.714" v="5"/>
           <pc:sldLayoutMkLst>
@@ -628,24 +661,6 @@
             <pc:sldMasterMk cId="2618204342" sldId="2147483696"/>
             <pc:sldLayoutMk cId="4028182537" sldId="2147483697"/>
           </pc:sldLayoutMkLst>
-          <pc:spChg chg="mod">
-            <ac:chgData name="Björn Meder HMU Potsdam" userId="d258dbf6-ab6a-4282-851d-9abdcd54331d" providerId="ADAL" clId="{B6D57924-B848-2742-8D38-F6230294B7DC}" dt="2025-07-31T12:14:45.714" v="5"/>
-            <ac:spMkLst>
-              <pc:docMk/>
-              <pc:sldMasterMk cId="2618204342" sldId="2147483696"/>
-              <pc:sldLayoutMk cId="4028182537" sldId="2147483697"/>
-              <ac:spMk id="2" creationId="{00000000-0000-0000-0000-000000000000}"/>
-            </ac:spMkLst>
-          </pc:spChg>
-          <pc:spChg chg="mod">
-            <ac:chgData name="Björn Meder HMU Potsdam" userId="d258dbf6-ab6a-4282-851d-9abdcd54331d" providerId="ADAL" clId="{B6D57924-B848-2742-8D38-F6230294B7DC}" dt="2025-07-31T12:14:45.714" v="5"/>
-            <ac:spMkLst>
-              <pc:docMk/>
-              <pc:sldMasterMk cId="2618204342" sldId="2147483696"/>
-              <pc:sldLayoutMk cId="4028182537" sldId="2147483697"/>
-              <ac:spMk id="3" creationId="{00000000-0000-0000-0000-000000000000}"/>
-            </ac:spMkLst>
-          </pc:spChg>
         </pc:sldLayoutChg>
         <pc:sldLayoutChg chg="modSp">
           <pc:chgData name="Björn Meder HMU Potsdam" userId="d258dbf6-ab6a-4282-851d-9abdcd54331d" providerId="ADAL" clId="{B6D57924-B848-2742-8D38-F6230294B7DC}" dt="2025-07-31T12:14:45.714" v="5"/>
@@ -654,24 +669,6 @@
             <pc:sldMasterMk cId="2618204342" sldId="2147483696"/>
             <pc:sldLayoutMk cId="94315151" sldId="2147483699"/>
           </pc:sldLayoutMkLst>
-          <pc:spChg chg="mod">
-            <ac:chgData name="Björn Meder HMU Potsdam" userId="d258dbf6-ab6a-4282-851d-9abdcd54331d" providerId="ADAL" clId="{B6D57924-B848-2742-8D38-F6230294B7DC}" dt="2025-07-31T12:14:45.714" v="5"/>
-            <ac:spMkLst>
-              <pc:docMk/>
-              <pc:sldMasterMk cId="2618204342" sldId="2147483696"/>
-              <pc:sldLayoutMk cId="94315151" sldId="2147483699"/>
-              <ac:spMk id="2" creationId="{00000000-0000-0000-0000-000000000000}"/>
-            </ac:spMkLst>
-          </pc:spChg>
-          <pc:spChg chg="mod">
-            <ac:chgData name="Björn Meder HMU Potsdam" userId="d258dbf6-ab6a-4282-851d-9abdcd54331d" providerId="ADAL" clId="{B6D57924-B848-2742-8D38-F6230294B7DC}" dt="2025-07-31T12:14:45.714" v="5"/>
-            <ac:spMkLst>
-              <pc:docMk/>
-              <pc:sldMasterMk cId="2618204342" sldId="2147483696"/>
-              <pc:sldLayoutMk cId="94315151" sldId="2147483699"/>
-              <ac:spMk id="3" creationId="{00000000-0000-0000-0000-000000000000}"/>
-            </ac:spMkLst>
-          </pc:spChg>
         </pc:sldLayoutChg>
         <pc:sldLayoutChg chg="modSp">
           <pc:chgData name="Björn Meder HMU Potsdam" userId="d258dbf6-ab6a-4282-851d-9abdcd54331d" providerId="ADAL" clId="{B6D57924-B848-2742-8D38-F6230294B7DC}" dt="2025-07-31T12:14:45.714" v="5"/>
@@ -680,24 +677,6 @@
             <pc:sldMasterMk cId="2618204342" sldId="2147483696"/>
             <pc:sldLayoutMk cId="603476742" sldId="2147483700"/>
           </pc:sldLayoutMkLst>
-          <pc:spChg chg="mod">
-            <ac:chgData name="Björn Meder HMU Potsdam" userId="d258dbf6-ab6a-4282-851d-9abdcd54331d" providerId="ADAL" clId="{B6D57924-B848-2742-8D38-F6230294B7DC}" dt="2025-07-31T12:14:45.714" v="5"/>
-            <ac:spMkLst>
-              <pc:docMk/>
-              <pc:sldMasterMk cId="2618204342" sldId="2147483696"/>
-              <pc:sldLayoutMk cId="603476742" sldId="2147483700"/>
-              <ac:spMk id="3" creationId="{00000000-0000-0000-0000-000000000000}"/>
-            </ac:spMkLst>
-          </pc:spChg>
-          <pc:spChg chg="mod">
-            <ac:chgData name="Björn Meder HMU Potsdam" userId="d258dbf6-ab6a-4282-851d-9abdcd54331d" providerId="ADAL" clId="{B6D57924-B848-2742-8D38-F6230294B7DC}" dt="2025-07-31T12:14:45.714" v="5"/>
-            <ac:spMkLst>
-              <pc:docMk/>
-              <pc:sldMasterMk cId="2618204342" sldId="2147483696"/>
-              <pc:sldLayoutMk cId="603476742" sldId="2147483700"/>
-              <ac:spMk id="4" creationId="{00000000-0000-0000-0000-000000000000}"/>
-            </ac:spMkLst>
-          </pc:spChg>
         </pc:sldLayoutChg>
         <pc:sldLayoutChg chg="modSp">
           <pc:chgData name="Björn Meder HMU Potsdam" userId="d258dbf6-ab6a-4282-851d-9abdcd54331d" providerId="ADAL" clId="{B6D57924-B848-2742-8D38-F6230294B7DC}" dt="2025-07-31T12:14:45.714" v="5"/>
@@ -706,51 +685,6 @@
             <pc:sldMasterMk cId="2618204342" sldId="2147483696"/>
             <pc:sldLayoutMk cId="745039881" sldId="2147483701"/>
           </pc:sldLayoutMkLst>
-          <pc:spChg chg="mod">
-            <ac:chgData name="Björn Meder HMU Potsdam" userId="d258dbf6-ab6a-4282-851d-9abdcd54331d" providerId="ADAL" clId="{B6D57924-B848-2742-8D38-F6230294B7DC}" dt="2025-07-31T12:14:45.714" v="5"/>
-            <ac:spMkLst>
-              <pc:docMk/>
-              <pc:sldMasterMk cId="2618204342" sldId="2147483696"/>
-              <pc:sldLayoutMk cId="745039881" sldId="2147483701"/>
-              <ac:spMk id="2" creationId="{00000000-0000-0000-0000-000000000000}"/>
-            </ac:spMkLst>
-          </pc:spChg>
-          <pc:spChg chg="mod">
-            <ac:chgData name="Björn Meder HMU Potsdam" userId="d258dbf6-ab6a-4282-851d-9abdcd54331d" providerId="ADAL" clId="{B6D57924-B848-2742-8D38-F6230294B7DC}" dt="2025-07-31T12:14:45.714" v="5"/>
-            <ac:spMkLst>
-              <pc:docMk/>
-              <pc:sldMasterMk cId="2618204342" sldId="2147483696"/>
-              <pc:sldLayoutMk cId="745039881" sldId="2147483701"/>
-              <ac:spMk id="3" creationId="{00000000-0000-0000-0000-000000000000}"/>
-            </ac:spMkLst>
-          </pc:spChg>
-          <pc:spChg chg="mod">
-            <ac:chgData name="Björn Meder HMU Potsdam" userId="d258dbf6-ab6a-4282-851d-9abdcd54331d" providerId="ADAL" clId="{B6D57924-B848-2742-8D38-F6230294B7DC}" dt="2025-07-31T12:14:45.714" v="5"/>
-            <ac:spMkLst>
-              <pc:docMk/>
-              <pc:sldMasterMk cId="2618204342" sldId="2147483696"/>
-              <pc:sldLayoutMk cId="745039881" sldId="2147483701"/>
-              <ac:spMk id="4" creationId="{00000000-0000-0000-0000-000000000000}"/>
-            </ac:spMkLst>
-          </pc:spChg>
-          <pc:spChg chg="mod">
-            <ac:chgData name="Björn Meder HMU Potsdam" userId="d258dbf6-ab6a-4282-851d-9abdcd54331d" providerId="ADAL" clId="{B6D57924-B848-2742-8D38-F6230294B7DC}" dt="2025-07-31T12:14:45.714" v="5"/>
-            <ac:spMkLst>
-              <pc:docMk/>
-              <pc:sldMasterMk cId="2618204342" sldId="2147483696"/>
-              <pc:sldLayoutMk cId="745039881" sldId="2147483701"/>
-              <ac:spMk id="5" creationId="{00000000-0000-0000-0000-000000000000}"/>
-            </ac:spMkLst>
-          </pc:spChg>
-          <pc:spChg chg="mod">
-            <ac:chgData name="Björn Meder HMU Potsdam" userId="d258dbf6-ab6a-4282-851d-9abdcd54331d" providerId="ADAL" clId="{B6D57924-B848-2742-8D38-F6230294B7DC}" dt="2025-07-31T12:14:45.714" v="5"/>
-            <ac:spMkLst>
-              <pc:docMk/>
-              <pc:sldMasterMk cId="2618204342" sldId="2147483696"/>
-              <pc:sldLayoutMk cId="745039881" sldId="2147483701"/>
-              <ac:spMk id="6" creationId="{00000000-0000-0000-0000-000000000000}"/>
-            </ac:spMkLst>
-          </pc:spChg>
         </pc:sldLayoutChg>
         <pc:sldLayoutChg chg="modSp">
           <pc:chgData name="Björn Meder HMU Potsdam" userId="d258dbf6-ab6a-4282-851d-9abdcd54331d" providerId="ADAL" clId="{B6D57924-B848-2742-8D38-F6230294B7DC}" dt="2025-07-31T12:14:45.714" v="5"/>
@@ -759,33 +693,6 @@
             <pc:sldMasterMk cId="2618204342" sldId="2147483696"/>
             <pc:sldLayoutMk cId="1001682325" sldId="2147483704"/>
           </pc:sldLayoutMkLst>
-          <pc:spChg chg="mod">
-            <ac:chgData name="Björn Meder HMU Potsdam" userId="d258dbf6-ab6a-4282-851d-9abdcd54331d" providerId="ADAL" clId="{B6D57924-B848-2742-8D38-F6230294B7DC}" dt="2025-07-31T12:14:45.714" v="5"/>
-            <ac:spMkLst>
-              <pc:docMk/>
-              <pc:sldMasterMk cId="2618204342" sldId="2147483696"/>
-              <pc:sldLayoutMk cId="1001682325" sldId="2147483704"/>
-              <ac:spMk id="2" creationId="{00000000-0000-0000-0000-000000000000}"/>
-            </ac:spMkLst>
-          </pc:spChg>
-          <pc:spChg chg="mod">
-            <ac:chgData name="Björn Meder HMU Potsdam" userId="d258dbf6-ab6a-4282-851d-9abdcd54331d" providerId="ADAL" clId="{B6D57924-B848-2742-8D38-F6230294B7DC}" dt="2025-07-31T12:14:45.714" v="5"/>
-            <ac:spMkLst>
-              <pc:docMk/>
-              <pc:sldMasterMk cId="2618204342" sldId="2147483696"/>
-              <pc:sldLayoutMk cId="1001682325" sldId="2147483704"/>
-              <ac:spMk id="3" creationId="{00000000-0000-0000-0000-000000000000}"/>
-            </ac:spMkLst>
-          </pc:spChg>
-          <pc:spChg chg="mod">
-            <ac:chgData name="Björn Meder HMU Potsdam" userId="d258dbf6-ab6a-4282-851d-9abdcd54331d" providerId="ADAL" clId="{B6D57924-B848-2742-8D38-F6230294B7DC}" dt="2025-07-31T12:14:45.714" v="5"/>
-            <ac:spMkLst>
-              <pc:docMk/>
-              <pc:sldMasterMk cId="2618204342" sldId="2147483696"/>
-              <pc:sldLayoutMk cId="1001682325" sldId="2147483704"/>
-              <ac:spMk id="4" creationId="{00000000-0000-0000-0000-000000000000}"/>
-            </ac:spMkLst>
-          </pc:spChg>
         </pc:sldLayoutChg>
         <pc:sldLayoutChg chg="modSp">
           <pc:chgData name="Björn Meder HMU Potsdam" userId="d258dbf6-ab6a-4282-851d-9abdcd54331d" providerId="ADAL" clId="{B6D57924-B848-2742-8D38-F6230294B7DC}" dt="2025-07-31T12:14:45.714" v="5"/>
@@ -794,33 +701,6 @@
             <pc:sldMasterMk cId="2618204342" sldId="2147483696"/>
             <pc:sldLayoutMk cId="2365256577" sldId="2147483705"/>
           </pc:sldLayoutMkLst>
-          <pc:spChg chg="mod">
-            <ac:chgData name="Björn Meder HMU Potsdam" userId="d258dbf6-ab6a-4282-851d-9abdcd54331d" providerId="ADAL" clId="{B6D57924-B848-2742-8D38-F6230294B7DC}" dt="2025-07-31T12:14:45.714" v="5"/>
-            <ac:spMkLst>
-              <pc:docMk/>
-              <pc:sldMasterMk cId="2618204342" sldId="2147483696"/>
-              <pc:sldLayoutMk cId="2365256577" sldId="2147483705"/>
-              <ac:spMk id="2" creationId="{00000000-0000-0000-0000-000000000000}"/>
-            </ac:spMkLst>
-          </pc:spChg>
-          <pc:spChg chg="mod">
-            <ac:chgData name="Björn Meder HMU Potsdam" userId="d258dbf6-ab6a-4282-851d-9abdcd54331d" providerId="ADAL" clId="{B6D57924-B848-2742-8D38-F6230294B7DC}" dt="2025-07-31T12:14:45.714" v="5"/>
-            <ac:spMkLst>
-              <pc:docMk/>
-              <pc:sldMasterMk cId="2618204342" sldId="2147483696"/>
-              <pc:sldLayoutMk cId="2365256577" sldId="2147483705"/>
-              <ac:spMk id="3" creationId="{00000000-0000-0000-0000-000000000000}"/>
-            </ac:spMkLst>
-          </pc:spChg>
-          <pc:spChg chg="mod">
-            <ac:chgData name="Björn Meder HMU Potsdam" userId="d258dbf6-ab6a-4282-851d-9abdcd54331d" providerId="ADAL" clId="{B6D57924-B848-2742-8D38-F6230294B7DC}" dt="2025-07-31T12:14:45.714" v="5"/>
-            <ac:spMkLst>
-              <pc:docMk/>
-              <pc:sldMasterMk cId="2618204342" sldId="2147483696"/>
-              <pc:sldLayoutMk cId="2365256577" sldId="2147483705"/>
-              <ac:spMk id="4" creationId="{00000000-0000-0000-0000-000000000000}"/>
-            </ac:spMkLst>
-          </pc:spChg>
         </pc:sldLayoutChg>
         <pc:sldLayoutChg chg="modSp">
           <pc:chgData name="Björn Meder HMU Potsdam" userId="d258dbf6-ab6a-4282-851d-9abdcd54331d" providerId="ADAL" clId="{B6D57924-B848-2742-8D38-F6230294B7DC}" dt="2025-07-31T12:14:45.714" v="5"/>
@@ -829,24 +709,6 @@
             <pc:sldMasterMk cId="2618204342" sldId="2147483696"/>
             <pc:sldLayoutMk cId="3918179759" sldId="2147483707"/>
           </pc:sldLayoutMkLst>
-          <pc:spChg chg="mod">
-            <ac:chgData name="Björn Meder HMU Potsdam" userId="d258dbf6-ab6a-4282-851d-9abdcd54331d" providerId="ADAL" clId="{B6D57924-B848-2742-8D38-F6230294B7DC}" dt="2025-07-31T12:14:45.714" v="5"/>
-            <ac:spMkLst>
-              <pc:docMk/>
-              <pc:sldMasterMk cId="2618204342" sldId="2147483696"/>
-              <pc:sldLayoutMk cId="3918179759" sldId="2147483707"/>
-              <ac:spMk id="2" creationId="{00000000-0000-0000-0000-000000000000}"/>
-            </ac:spMkLst>
-          </pc:spChg>
-          <pc:spChg chg="mod">
-            <ac:chgData name="Björn Meder HMU Potsdam" userId="d258dbf6-ab6a-4282-851d-9abdcd54331d" providerId="ADAL" clId="{B6D57924-B848-2742-8D38-F6230294B7DC}" dt="2025-07-31T12:14:45.714" v="5"/>
-            <ac:spMkLst>
-              <pc:docMk/>
-              <pc:sldMasterMk cId="2618204342" sldId="2147483696"/>
-              <pc:sldLayoutMk cId="3918179759" sldId="2147483707"/>
-              <ac:spMk id="3" creationId="{00000000-0000-0000-0000-000000000000}"/>
-            </ac:spMkLst>
-          </pc:spChg>
         </pc:sldLayoutChg>
       </pc:sldMasterChg>
       <pc:sldMasterChg chg="modSp modSldLayout">
@@ -855,46 +717,6 @@
           <pc:docMk/>
           <pc:sldMasterMk cId="4117015308" sldId="2147483708"/>
         </pc:sldMasterMkLst>
-        <pc:spChg chg="mod">
-          <ac:chgData name="Björn Meder HMU Potsdam" userId="d258dbf6-ab6a-4282-851d-9abdcd54331d" providerId="ADAL" clId="{B6D57924-B848-2742-8D38-F6230294B7DC}" dt="2025-07-31T12:14:56.840" v="8"/>
-          <ac:spMkLst>
-            <pc:docMk/>
-            <pc:sldMasterMk cId="4117015308" sldId="2147483708"/>
-            <ac:spMk id="2" creationId="{00000000-0000-0000-0000-000000000000}"/>
-          </ac:spMkLst>
-        </pc:spChg>
-        <pc:spChg chg="mod">
-          <ac:chgData name="Björn Meder HMU Potsdam" userId="d258dbf6-ab6a-4282-851d-9abdcd54331d" providerId="ADAL" clId="{B6D57924-B848-2742-8D38-F6230294B7DC}" dt="2025-07-31T12:14:56.840" v="8"/>
-          <ac:spMkLst>
-            <pc:docMk/>
-            <pc:sldMasterMk cId="4117015308" sldId="2147483708"/>
-            <ac:spMk id="3" creationId="{00000000-0000-0000-0000-000000000000}"/>
-          </ac:spMkLst>
-        </pc:spChg>
-        <pc:spChg chg="mod">
-          <ac:chgData name="Björn Meder HMU Potsdam" userId="d258dbf6-ab6a-4282-851d-9abdcd54331d" providerId="ADAL" clId="{B6D57924-B848-2742-8D38-F6230294B7DC}" dt="2025-07-31T12:14:56.840" v="8"/>
-          <ac:spMkLst>
-            <pc:docMk/>
-            <pc:sldMasterMk cId="4117015308" sldId="2147483708"/>
-            <ac:spMk id="4" creationId="{00000000-0000-0000-0000-000000000000}"/>
-          </ac:spMkLst>
-        </pc:spChg>
-        <pc:spChg chg="mod">
-          <ac:chgData name="Björn Meder HMU Potsdam" userId="d258dbf6-ab6a-4282-851d-9abdcd54331d" providerId="ADAL" clId="{B6D57924-B848-2742-8D38-F6230294B7DC}" dt="2025-07-31T12:14:56.840" v="8"/>
-          <ac:spMkLst>
-            <pc:docMk/>
-            <pc:sldMasterMk cId="4117015308" sldId="2147483708"/>
-            <ac:spMk id="5" creationId="{00000000-0000-0000-0000-000000000000}"/>
-          </ac:spMkLst>
-        </pc:spChg>
-        <pc:spChg chg="mod">
-          <ac:chgData name="Björn Meder HMU Potsdam" userId="d258dbf6-ab6a-4282-851d-9abdcd54331d" providerId="ADAL" clId="{B6D57924-B848-2742-8D38-F6230294B7DC}" dt="2025-07-31T12:14:56.840" v="8"/>
-          <ac:spMkLst>
-            <pc:docMk/>
-            <pc:sldMasterMk cId="4117015308" sldId="2147483708"/>
-            <ac:spMk id="6" creationId="{00000000-0000-0000-0000-000000000000}"/>
-          </ac:spMkLst>
-        </pc:spChg>
         <pc:sldLayoutChg chg="modSp">
           <pc:chgData name="Björn Meder HMU Potsdam" userId="d258dbf6-ab6a-4282-851d-9abdcd54331d" providerId="ADAL" clId="{B6D57924-B848-2742-8D38-F6230294B7DC}" dt="2025-07-31T12:14:56.840" v="8"/>
           <pc:sldLayoutMkLst>
@@ -902,24 +724,6 @@
             <pc:sldMasterMk cId="4117015308" sldId="2147483708"/>
             <pc:sldLayoutMk cId="1280892548" sldId="2147483709"/>
           </pc:sldLayoutMkLst>
-          <pc:spChg chg="mod">
-            <ac:chgData name="Björn Meder HMU Potsdam" userId="d258dbf6-ab6a-4282-851d-9abdcd54331d" providerId="ADAL" clId="{B6D57924-B848-2742-8D38-F6230294B7DC}" dt="2025-07-31T12:14:56.840" v="8"/>
-            <ac:spMkLst>
-              <pc:docMk/>
-              <pc:sldMasterMk cId="4117015308" sldId="2147483708"/>
-              <pc:sldLayoutMk cId="1280892548" sldId="2147483709"/>
-              <ac:spMk id="2" creationId="{00000000-0000-0000-0000-000000000000}"/>
-            </ac:spMkLst>
-          </pc:spChg>
-          <pc:spChg chg="mod">
-            <ac:chgData name="Björn Meder HMU Potsdam" userId="d258dbf6-ab6a-4282-851d-9abdcd54331d" providerId="ADAL" clId="{B6D57924-B848-2742-8D38-F6230294B7DC}" dt="2025-07-31T12:14:56.840" v="8"/>
-            <ac:spMkLst>
-              <pc:docMk/>
-              <pc:sldMasterMk cId="4117015308" sldId="2147483708"/>
-              <pc:sldLayoutMk cId="1280892548" sldId="2147483709"/>
-              <ac:spMk id="3" creationId="{00000000-0000-0000-0000-000000000000}"/>
-            </ac:spMkLst>
-          </pc:spChg>
         </pc:sldLayoutChg>
         <pc:sldLayoutChg chg="modSp">
           <pc:chgData name="Björn Meder HMU Potsdam" userId="d258dbf6-ab6a-4282-851d-9abdcd54331d" providerId="ADAL" clId="{B6D57924-B848-2742-8D38-F6230294B7DC}" dt="2025-07-31T12:14:56.840" v="8"/>
@@ -928,24 +732,6 @@
             <pc:sldMasterMk cId="4117015308" sldId="2147483708"/>
             <pc:sldLayoutMk cId="1884543042" sldId="2147483711"/>
           </pc:sldLayoutMkLst>
-          <pc:spChg chg="mod">
-            <ac:chgData name="Björn Meder HMU Potsdam" userId="d258dbf6-ab6a-4282-851d-9abdcd54331d" providerId="ADAL" clId="{B6D57924-B848-2742-8D38-F6230294B7DC}" dt="2025-07-31T12:14:56.840" v="8"/>
-            <ac:spMkLst>
-              <pc:docMk/>
-              <pc:sldMasterMk cId="4117015308" sldId="2147483708"/>
-              <pc:sldLayoutMk cId="1884543042" sldId="2147483711"/>
-              <ac:spMk id="2" creationId="{00000000-0000-0000-0000-000000000000}"/>
-            </ac:spMkLst>
-          </pc:spChg>
-          <pc:spChg chg="mod">
-            <ac:chgData name="Björn Meder HMU Potsdam" userId="d258dbf6-ab6a-4282-851d-9abdcd54331d" providerId="ADAL" clId="{B6D57924-B848-2742-8D38-F6230294B7DC}" dt="2025-07-31T12:14:56.840" v="8"/>
-            <ac:spMkLst>
-              <pc:docMk/>
-              <pc:sldMasterMk cId="4117015308" sldId="2147483708"/>
-              <pc:sldLayoutMk cId="1884543042" sldId="2147483711"/>
-              <ac:spMk id="3" creationId="{00000000-0000-0000-0000-000000000000}"/>
-            </ac:spMkLst>
-          </pc:spChg>
         </pc:sldLayoutChg>
         <pc:sldLayoutChg chg="modSp">
           <pc:chgData name="Björn Meder HMU Potsdam" userId="d258dbf6-ab6a-4282-851d-9abdcd54331d" providerId="ADAL" clId="{B6D57924-B848-2742-8D38-F6230294B7DC}" dt="2025-07-31T12:14:56.840" v="8"/>
@@ -954,24 +740,6 @@
             <pc:sldMasterMk cId="4117015308" sldId="2147483708"/>
             <pc:sldLayoutMk cId="2899403362" sldId="2147483712"/>
           </pc:sldLayoutMkLst>
-          <pc:spChg chg="mod">
-            <ac:chgData name="Björn Meder HMU Potsdam" userId="d258dbf6-ab6a-4282-851d-9abdcd54331d" providerId="ADAL" clId="{B6D57924-B848-2742-8D38-F6230294B7DC}" dt="2025-07-31T12:14:56.840" v="8"/>
-            <ac:spMkLst>
-              <pc:docMk/>
-              <pc:sldMasterMk cId="4117015308" sldId="2147483708"/>
-              <pc:sldLayoutMk cId="2899403362" sldId="2147483712"/>
-              <ac:spMk id="3" creationId="{00000000-0000-0000-0000-000000000000}"/>
-            </ac:spMkLst>
-          </pc:spChg>
-          <pc:spChg chg="mod">
-            <ac:chgData name="Björn Meder HMU Potsdam" userId="d258dbf6-ab6a-4282-851d-9abdcd54331d" providerId="ADAL" clId="{B6D57924-B848-2742-8D38-F6230294B7DC}" dt="2025-07-31T12:14:56.840" v="8"/>
-            <ac:spMkLst>
-              <pc:docMk/>
-              <pc:sldMasterMk cId="4117015308" sldId="2147483708"/>
-              <pc:sldLayoutMk cId="2899403362" sldId="2147483712"/>
-              <ac:spMk id="4" creationId="{00000000-0000-0000-0000-000000000000}"/>
-            </ac:spMkLst>
-          </pc:spChg>
         </pc:sldLayoutChg>
         <pc:sldLayoutChg chg="modSp">
           <pc:chgData name="Björn Meder HMU Potsdam" userId="d258dbf6-ab6a-4282-851d-9abdcd54331d" providerId="ADAL" clId="{B6D57924-B848-2742-8D38-F6230294B7DC}" dt="2025-07-31T12:14:56.840" v="8"/>
@@ -980,51 +748,6 @@
             <pc:sldMasterMk cId="4117015308" sldId="2147483708"/>
             <pc:sldLayoutMk cId="3191287041" sldId="2147483713"/>
           </pc:sldLayoutMkLst>
-          <pc:spChg chg="mod">
-            <ac:chgData name="Björn Meder HMU Potsdam" userId="d258dbf6-ab6a-4282-851d-9abdcd54331d" providerId="ADAL" clId="{B6D57924-B848-2742-8D38-F6230294B7DC}" dt="2025-07-31T12:14:56.840" v="8"/>
-            <ac:spMkLst>
-              <pc:docMk/>
-              <pc:sldMasterMk cId="4117015308" sldId="2147483708"/>
-              <pc:sldLayoutMk cId="3191287041" sldId="2147483713"/>
-              <ac:spMk id="2" creationId="{00000000-0000-0000-0000-000000000000}"/>
-            </ac:spMkLst>
-          </pc:spChg>
-          <pc:spChg chg="mod">
-            <ac:chgData name="Björn Meder HMU Potsdam" userId="d258dbf6-ab6a-4282-851d-9abdcd54331d" providerId="ADAL" clId="{B6D57924-B848-2742-8D38-F6230294B7DC}" dt="2025-07-31T12:14:56.840" v="8"/>
-            <ac:spMkLst>
-              <pc:docMk/>
-              <pc:sldMasterMk cId="4117015308" sldId="2147483708"/>
-              <pc:sldLayoutMk cId="3191287041" sldId="2147483713"/>
-              <ac:spMk id="3" creationId="{00000000-0000-0000-0000-000000000000}"/>
-            </ac:spMkLst>
-          </pc:spChg>
-          <pc:spChg chg="mod">
-            <ac:chgData name="Björn Meder HMU Potsdam" userId="d258dbf6-ab6a-4282-851d-9abdcd54331d" providerId="ADAL" clId="{B6D57924-B848-2742-8D38-F6230294B7DC}" dt="2025-07-31T12:14:56.840" v="8"/>
-            <ac:spMkLst>
-              <pc:docMk/>
-              <pc:sldMasterMk cId="4117015308" sldId="2147483708"/>
-              <pc:sldLayoutMk cId="3191287041" sldId="2147483713"/>
-              <ac:spMk id="4" creationId="{00000000-0000-0000-0000-000000000000}"/>
-            </ac:spMkLst>
-          </pc:spChg>
-          <pc:spChg chg="mod">
-            <ac:chgData name="Björn Meder HMU Potsdam" userId="d258dbf6-ab6a-4282-851d-9abdcd54331d" providerId="ADAL" clId="{B6D57924-B848-2742-8D38-F6230294B7DC}" dt="2025-07-31T12:14:56.840" v="8"/>
-            <ac:spMkLst>
-              <pc:docMk/>
-              <pc:sldMasterMk cId="4117015308" sldId="2147483708"/>
-              <pc:sldLayoutMk cId="3191287041" sldId="2147483713"/>
-              <ac:spMk id="5" creationId="{00000000-0000-0000-0000-000000000000}"/>
-            </ac:spMkLst>
-          </pc:spChg>
-          <pc:spChg chg="mod">
-            <ac:chgData name="Björn Meder HMU Potsdam" userId="d258dbf6-ab6a-4282-851d-9abdcd54331d" providerId="ADAL" clId="{B6D57924-B848-2742-8D38-F6230294B7DC}" dt="2025-07-31T12:14:56.840" v="8"/>
-            <ac:spMkLst>
-              <pc:docMk/>
-              <pc:sldMasterMk cId="4117015308" sldId="2147483708"/>
-              <pc:sldLayoutMk cId="3191287041" sldId="2147483713"/>
-              <ac:spMk id="6" creationId="{00000000-0000-0000-0000-000000000000}"/>
-            </ac:spMkLst>
-          </pc:spChg>
         </pc:sldLayoutChg>
         <pc:sldLayoutChg chg="modSp">
           <pc:chgData name="Björn Meder HMU Potsdam" userId="d258dbf6-ab6a-4282-851d-9abdcd54331d" providerId="ADAL" clId="{B6D57924-B848-2742-8D38-F6230294B7DC}" dt="2025-07-31T12:14:56.840" v="8"/>
@@ -1033,33 +756,6 @@
             <pc:sldMasterMk cId="4117015308" sldId="2147483708"/>
             <pc:sldLayoutMk cId="2492687080" sldId="2147483716"/>
           </pc:sldLayoutMkLst>
-          <pc:spChg chg="mod">
-            <ac:chgData name="Björn Meder HMU Potsdam" userId="d258dbf6-ab6a-4282-851d-9abdcd54331d" providerId="ADAL" clId="{B6D57924-B848-2742-8D38-F6230294B7DC}" dt="2025-07-31T12:14:56.840" v="8"/>
-            <ac:spMkLst>
-              <pc:docMk/>
-              <pc:sldMasterMk cId="4117015308" sldId="2147483708"/>
-              <pc:sldLayoutMk cId="2492687080" sldId="2147483716"/>
-              <ac:spMk id="2" creationId="{00000000-0000-0000-0000-000000000000}"/>
-            </ac:spMkLst>
-          </pc:spChg>
-          <pc:spChg chg="mod">
-            <ac:chgData name="Björn Meder HMU Potsdam" userId="d258dbf6-ab6a-4282-851d-9abdcd54331d" providerId="ADAL" clId="{B6D57924-B848-2742-8D38-F6230294B7DC}" dt="2025-07-31T12:14:56.840" v="8"/>
-            <ac:spMkLst>
-              <pc:docMk/>
-              <pc:sldMasterMk cId="4117015308" sldId="2147483708"/>
-              <pc:sldLayoutMk cId="2492687080" sldId="2147483716"/>
-              <ac:spMk id="3" creationId="{00000000-0000-0000-0000-000000000000}"/>
-            </ac:spMkLst>
-          </pc:spChg>
-          <pc:spChg chg="mod">
-            <ac:chgData name="Björn Meder HMU Potsdam" userId="d258dbf6-ab6a-4282-851d-9abdcd54331d" providerId="ADAL" clId="{B6D57924-B848-2742-8D38-F6230294B7DC}" dt="2025-07-31T12:14:56.840" v="8"/>
-            <ac:spMkLst>
-              <pc:docMk/>
-              <pc:sldMasterMk cId="4117015308" sldId="2147483708"/>
-              <pc:sldLayoutMk cId="2492687080" sldId="2147483716"/>
-              <ac:spMk id="4" creationId="{00000000-0000-0000-0000-000000000000}"/>
-            </ac:spMkLst>
-          </pc:spChg>
         </pc:sldLayoutChg>
         <pc:sldLayoutChg chg="modSp">
           <pc:chgData name="Björn Meder HMU Potsdam" userId="d258dbf6-ab6a-4282-851d-9abdcd54331d" providerId="ADAL" clId="{B6D57924-B848-2742-8D38-F6230294B7DC}" dt="2025-07-31T12:14:56.840" v="8"/>
@@ -1068,33 +764,6 @@
             <pc:sldMasterMk cId="4117015308" sldId="2147483708"/>
             <pc:sldLayoutMk cId="319162707" sldId="2147483717"/>
           </pc:sldLayoutMkLst>
-          <pc:spChg chg="mod">
-            <ac:chgData name="Björn Meder HMU Potsdam" userId="d258dbf6-ab6a-4282-851d-9abdcd54331d" providerId="ADAL" clId="{B6D57924-B848-2742-8D38-F6230294B7DC}" dt="2025-07-31T12:14:56.840" v="8"/>
-            <ac:spMkLst>
-              <pc:docMk/>
-              <pc:sldMasterMk cId="4117015308" sldId="2147483708"/>
-              <pc:sldLayoutMk cId="319162707" sldId="2147483717"/>
-              <ac:spMk id="2" creationId="{00000000-0000-0000-0000-000000000000}"/>
-            </ac:spMkLst>
-          </pc:spChg>
-          <pc:spChg chg="mod">
-            <ac:chgData name="Björn Meder HMU Potsdam" userId="d258dbf6-ab6a-4282-851d-9abdcd54331d" providerId="ADAL" clId="{B6D57924-B848-2742-8D38-F6230294B7DC}" dt="2025-07-31T12:14:56.840" v="8"/>
-            <ac:spMkLst>
-              <pc:docMk/>
-              <pc:sldMasterMk cId="4117015308" sldId="2147483708"/>
-              <pc:sldLayoutMk cId="319162707" sldId="2147483717"/>
-              <ac:spMk id="3" creationId="{00000000-0000-0000-0000-000000000000}"/>
-            </ac:spMkLst>
-          </pc:spChg>
-          <pc:spChg chg="mod">
-            <ac:chgData name="Björn Meder HMU Potsdam" userId="d258dbf6-ab6a-4282-851d-9abdcd54331d" providerId="ADAL" clId="{B6D57924-B848-2742-8D38-F6230294B7DC}" dt="2025-07-31T12:14:56.840" v="8"/>
-            <ac:spMkLst>
-              <pc:docMk/>
-              <pc:sldMasterMk cId="4117015308" sldId="2147483708"/>
-              <pc:sldLayoutMk cId="319162707" sldId="2147483717"/>
-              <ac:spMk id="4" creationId="{00000000-0000-0000-0000-000000000000}"/>
-            </ac:spMkLst>
-          </pc:spChg>
         </pc:sldLayoutChg>
         <pc:sldLayoutChg chg="modSp">
           <pc:chgData name="Björn Meder HMU Potsdam" userId="d258dbf6-ab6a-4282-851d-9abdcd54331d" providerId="ADAL" clId="{B6D57924-B848-2742-8D38-F6230294B7DC}" dt="2025-07-31T12:14:56.840" v="8"/>
@@ -1103,24 +772,6 @@
             <pc:sldMasterMk cId="4117015308" sldId="2147483708"/>
             <pc:sldLayoutMk cId="3894819517" sldId="2147483719"/>
           </pc:sldLayoutMkLst>
-          <pc:spChg chg="mod">
-            <ac:chgData name="Björn Meder HMU Potsdam" userId="d258dbf6-ab6a-4282-851d-9abdcd54331d" providerId="ADAL" clId="{B6D57924-B848-2742-8D38-F6230294B7DC}" dt="2025-07-31T12:14:56.840" v="8"/>
-            <ac:spMkLst>
-              <pc:docMk/>
-              <pc:sldMasterMk cId="4117015308" sldId="2147483708"/>
-              <pc:sldLayoutMk cId="3894819517" sldId="2147483719"/>
-              <ac:spMk id="2" creationId="{00000000-0000-0000-0000-000000000000}"/>
-            </ac:spMkLst>
-          </pc:spChg>
-          <pc:spChg chg="mod">
-            <ac:chgData name="Björn Meder HMU Potsdam" userId="d258dbf6-ab6a-4282-851d-9abdcd54331d" providerId="ADAL" clId="{B6D57924-B848-2742-8D38-F6230294B7DC}" dt="2025-07-31T12:14:56.840" v="8"/>
-            <ac:spMkLst>
-              <pc:docMk/>
-              <pc:sldMasterMk cId="4117015308" sldId="2147483708"/>
-              <pc:sldLayoutMk cId="3894819517" sldId="2147483719"/>
-              <ac:spMk id="3" creationId="{00000000-0000-0000-0000-000000000000}"/>
-            </ac:spMkLst>
-          </pc:spChg>
         </pc:sldLayoutChg>
       </pc:sldMasterChg>
     </pc:docChg>
@@ -1259,7 +910,7 @@
           <a:p>
             <a:fld id="{0A85FBF7-6189-C04A-8896-44241FF05286}" type="datetimeFigureOut">
               <a:rPr lang="en-US" smtClean="0"/>
-              <a:t>7/31/25</a:t>
+              <a:t>8/16/25</a:t>
             </a:fld>
             <a:endParaRPr lang="en-US"/>
           </a:p>
@@ -1429,7 +1080,7 @@
           <a:p>
             <a:fld id="{0A85FBF7-6189-C04A-8896-44241FF05286}" type="datetimeFigureOut">
               <a:rPr lang="en-US" smtClean="0"/>
-              <a:t>7/31/25</a:t>
+              <a:t>8/16/25</a:t>
             </a:fld>
             <a:endParaRPr lang="en-US"/>
           </a:p>
@@ -1609,7 +1260,7 @@
           <a:p>
             <a:fld id="{0A85FBF7-6189-C04A-8896-44241FF05286}" type="datetimeFigureOut">
               <a:rPr lang="en-US" smtClean="0"/>
-              <a:t>7/31/25</a:t>
+              <a:t>8/16/25</a:t>
             </a:fld>
             <a:endParaRPr lang="en-US"/>
           </a:p>
@@ -1779,7 +1430,7 @@
           <a:p>
             <a:fld id="{0A85FBF7-6189-C04A-8896-44241FF05286}" type="datetimeFigureOut">
               <a:rPr lang="en-US" smtClean="0"/>
-              <a:t>7/31/25</a:t>
+              <a:t>8/16/25</a:t>
             </a:fld>
             <a:endParaRPr lang="en-US"/>
           </a:p>
@@ -2025,7 +1676,7 @@
           <a:p>
             <a:fld id="{0A85FBF7-6189-C04A-8896-44241FF05286}" type="datetimeFigureOut">
               <a:rPr lang="en-US" smtClean="0"/>
-              <a:t>7/31/25</a:t>
+              <a:t>8/16/25</a:t>
             </a:fld>
             <a:endParaRPr lang="en-US"/>
           </a:p>
@@ -2257,7 +1908,7 @@
           <a:p>
             <a:fld id="{0A85FBF7-6189-C04A-8896-44241FF05286}" type="datetimeFigureOut">
               <a:rPr lang="en-US" smtClean="0"/>
-              <a:t>7/31/25</a:t>
+              <a:t>8/16/25</a:t>
             </a:fld>
             <a:endParaRPr lang="en-US"/>
           </a:p>
@@ -2624,7 +2275,7 @@
           <a:p>
             <a:fld id="{0A85FBF7-6189-C04A-8896-44241FF05286}" type="datetimeFigureOut">
               <a:rPr lang="en-US" smtClean="0"/>
-              <a:t>7/31/25</a:t>
+              <a:t>8/16/25</a:t>
             </a:fld>
             <a:endParaRPr lang="en-US"/>
           </a:p>
@@ -2742,7 +2393,7 @@
           <a:p>
             <a:fld id="{0A85FBF7-6189-C04A-8896-44241FF05286}" type="datetimeFigureOut">
               <a:rPr lang="en-US" smtClean="0"/>
-              <a:t>7/31/25</a:t>
+              <a:t>8/16/25</a:t>
             </a:fld>
             <a:endParaRPr lang="en-US"/>
           </a:p>
@@ -2837,7 +2488,7 @@
           <a:p>
             <a:fld id="{0A85FBF7-6189-C04A-8896-44241FF05286}" type="datetimeFigureOut">
               <a:rPr lang="en-US" smtClean="0"/>
-              <a:t>7/31/25</a:t>
+              <a:t>8/16/25</a:t>
             </a:fld>
             <a:endParaRPr lang="en-US"/>
           </a:p>
@@ -3114,7 +2765,7 @@
           <a:p>
             <a:fld id="{0A85FBF7-6189-C04A-8896-44241FF05286}" type="datetimeFigureOut">
               <a:rPr lang="en-US" smtClean="0"/>
-              <a:t>7/31/25</a:t>
+              <a:t>8/16/25</a:t>
             </a:fld>
             <a:endParaRPr lang="en-US"/>
           </a:p>
@@ -3371,7 +3022,7 @@
           <a:p>
             <a:fld id="{0A85FBF7-6189-C04A-8896-44241FF05286}" type="datetimeFigureOut">
               <a:rPr lang="en-US" smtClean="0"/>
-              <a:t>7/31/25</a:t>
+              <a:t>8/16/25</a:t>
             </a:fld>
             <a:endParaRPr lang="en-US"/>
           </a:p>
@@ -3584,7 +3235,7 @@
           <a:p>
             <a:fld id="{0A85FBF7-6189-C04A-8896-44241FF05286}" type="datetimeFigureOut">
               <a:rPr lang="en-US" smtClean="0"/>
-              <a:t>7/31/25</a:t>
+              <a:t>8/16/25</a:t>
             </a:fld>
             <a:endParaRPr lang="en-US"/>
           </a:p>
@@ -3973,6 +3624,1855 @@
 </file>
 
 <file path=ppt/slides/slide1.xml><?xml version="1.0" encoding="utf-8"?>
+<p:sld xmlns:a="http://schemas.openxmlformats.org/drawingml/2006/main" xmlns:r="http://schemas.openxmlformats.org/officeDocument/2006/relationships" xmlns:p="http://schemas.openxmlformats.org/presentationml/2006/main">
+  <p:cSld>
+    <p:spTree>
+      <p:nvGrpSpPr>
+        <p:cNvPr id="1" name="">
+          <a:extLst>
+            <a:ext uri="{FF2B5EF4-FFF2-40B4-BE49-F238E27FC236}">
+              <a16:creationId xmlns:a16="http://schemas.microsoft.com/office/drawing/2014/main" id="{E7D639A1-19A3-6D2C-5193-3ECE62E3204B}"/>
+            </a:ext>
+          </a:extLst>
+        </p:cNvPr>
+        <p:cNvGrpSpPr/>
+        <p:nvPr/>
+      </p:nvGrpSpPr>
+      <p:grpSpPr>
+        <a:xfrm>
+          <a:off x="0" y="0"/>
+          <a:ext cx="0" cy="0"/>
+          <a:chOff x="0" y="0"/>
+          <a:chExt cx="0" cy="0"/>
+        </a:xfrm>
+      </p:grpSpPr>
+      <p:grpSp>
+        <p:nvGrpSpPr>
+          <p:cNvPr id="77" name="Group 76">
+            <a:extLst>
+              <a:ext uri="{FF2B5EF4-FFF2-40B4-BE49-F238E27FC236}">
+                <a16:creationId xmlns:a16="http://schemas.microsoft.com/office/drawing/2014/main" id="{36459198-76B8-D3CA-9FCE-F5629DE94F10}"/>
+              </a:ext>
+            </a:extLst>
+          </p:cNvPr>
+          <p:cNvGrpSpPr>
+            <a:grpSpLocks noChangeAspect="1"/>
+          </p:cNvGrpSpPr>
+          <p:nvPr/>
+        </p:nvGrpSpPr>
+        <p:grpSpPr>
+          <a:xfrm>
+            <a:off x="0" y="439773"/>
+            <a:ext cx="6058691" cy="3815861"/>
+            <a:chOff x="231563" y="2575404"/>
+            <a:chExt cx="4962849" cy="3125682"/>
+          </a:xfrm>
+        </p:grpSpPr>
+        <p:pic>
+          <p:nvPicPr>
+            <p:cNvPr id="78" name="Picture 77">
+              <a:extLst>
+                <a:ext uri="{FF2B5EF4-FFF2-40B4-BE49-F238E27FC236}">
+                  <a16:creationId xmlns:a16="http://schemas.microsoft.com/office/drawing/2014/main" id="{F1F804AA-E7C7-4FCC-6B06-572AE11F75B2}"/>
+                </a:ext>
+              </a:extLst>
+            </p:cNvPr>
+            <p:cNvPicPr>
+              <a:picLocks noChangeAspect="1"/>
+            </p:cNvPicPr>
+            <p:nvPr/>
+          </p:nvPicPr>
+          <p:blipFill>
+            <a:blip r:embed="rId2"/>
+            <a:srcRect l="6664" t="21611" r="5353" b="22976"/>
+            <a:stretch>
+              <a:fillRect/>
+            </a:stretch>
+          </p:blipFill>
+          <p:spPr>
+            <a:xfrm>
+              <a:off x="231563" y="2575404"/>
+              <a:ext cx="4962849" cy="3125682"/>
+            </a:xfrm>
+            <a:prstGeom prst="rect">
+              <a:avLst/>
+            </a:prstGeom>
+          </p:spPr>
+        </p:pic>
+        <p:pic>
+          <p:nvPicPr>
+            <p:cNvPr id="79" name="Image" descr="Image">
+              <a:extLst>
+                <a:ext uri="{FF2B5EF4-FFF2-40B4-BE49-F238E27FC236}">
+                  <a16:creationId xmlns:a16="http://schemas.microsoft.com/office/drawing/2014/main" id="{0AC04362-A952-D7F8-4AB6-8366130A03F1}"/>
+                </a:ext>
+              </a:extLst>
+            </p:cNvPr>
+            <p:cNvPicPr>
+              <a:picLocks noChangeAspect="1"/>
+            </p:cNvPicPr>
+            <p:nvPr/>
+          </p:nvPicPr>
+          <p:blipFill>
+            <a:blip r:embed="rId3"/>
+            <a:stretch>
+              <a:fillRect/>
+            </a:stretch>
+          </p:blipFill>
+          <p:spPr>
+            <a:xfrm>
+              <a:off x="1427664" y="2994339"/>
+              <a:ext cx="2499461" cy="1728000"/>
+            </a:xfrm>
+            <a:prstGeom prst="rect">
+              <a:avLst/>
+            </a:prstGeom>
+            <a:ln w="12700" cap="flat">
+              <a:noFill/>
+              <a:miter lim="400000"/>
+            </a:ln>
+            <a:effectLst/>
+          </p:spPr>
+        </p:pic>
+      </p:grpSp>
+      <p:sp>
+        <p:nvSpPr>
+          <p:cNvPr id="80" name="TextBox 79">
+            <a:extLst>
+              <a:ext uri="{FF2B5EF4-FFF2-40B4-BE49-F238E27FC236}">
+                <a16:creationId xmlns:a16="http://schemas.microsoft.com/office/drawing/2014/main" id="{66D5D2D8-0186-ECD1-9EC5-73B8BEE98C7E}"/>
+              </a:ext>
+            </a:extLst>
+          </p:cNvPr>
+          <p:cNvSpPr txBox="1"/>
+          <p:nvPr/>
+        </p:nvSpPr>
+        <p:spPr>
+          <a:xfrm>
+            <a:off x="2508719" y="-8041"/>
+            <a:ext cx="857799" cy="492443"/>
+          </a:xfrm>
+          <a:prstGeom prst="rect">
+            <a:avLst/>
+          </a:prstGeom>
+          <a:noFill/>
+        </p:spPr>
+        <p:txBody>
+          <a:bodyPr wrap="none" rtlCol="0">
+            <a:spAutoFit/>
+          </a:bodyPr>
+          <a:lstStyle/>
+          <a:p>
+            <a:pPr algn="l"/>
+            <a:r>
+              <a:rPr lang="en-US" sz="2600" dirty="0">
+                <a:latin typeface="Helvetica Neue Light" panose="02000403000000020004" pitchFamily="2" charset="0"/>
+                <a:ea typeface="Helvetica Neue Light" panose="02000403000000020004" pitchFamily="2" charset="0"/>
+                <a:cs typeface="Helvetica Neue" panose="02000503000000020004" pitchFamily="2" charset="0"/>
+              </a:rPr>
+              <a:t>Task</a:t>
+            </a:r>
+          </a:p>
+        </p:txBody>
+      </p:sp>
+      <p:sp>
+        <p:nvSpPr>
+          <p:cNvPr id="81" name="TextBox 80">
+            <a:extLst>
+              <a:ext uri="{FF2B5EF4-FFF2-40B4-BE49-F238E27FC236}">
+                <a16:creationId xmlns:a16="http://schemas.microsoft.com/office/drawing/2014/main" id="{C125EBF5-6832-456B-2CDF-E8692B33E80F}"/>
+              </a:ext>
+            </a:extLst>
+          </p:cNvPr>
+          <p:cNvSpPr txBox="1"/>
+          <p:nvPr/>
+        </p:nvSpPr>
+        <p:spPr>
+          <a:xfrm>
+            <a:off x="13182730" y="-8041"/>
+            <a:ext cx="2131096" cy="492443"/>
+          </a:xfrm>
+          <a:prstGeom prst="rect">
+            <a:avLst/>
+          </a:prstGeom>
+          <a:noFill/>
+        </p:spPr>
+        <p:txBody>
+          <a:bodyPr wrap="none" rtlCol="0">
+            <a:spAutoFit/>
+          </a:bodyPr>
+          <a:lstStyle/>
+          <a:p>
+            <a:pPr algn="l"/>
+            <a:r>
+              <a:rPr lang="en-US" sz="2600" dirty="0">
+                <a:latin typeface="Helvetica Neue Light" panose="02000403000000020004" pitchFamily="2" charset="0"/>
+                <a:ea typeface="Helvetica Neue Light" panose="02000403000000020004" pitchFamily="2" charset="0"/>
+                <a:cs typeface="Helvetica Neue" panose="02000503000000020004" pitchFamily="2" charset="0"/>
+              </a:rPr>
+              <a:t>Environments</a:t>
+            </a:r>
+          </a:p>
+        </p:txBody>
+      </p:sp>
+      <p:sp>
+        <p:nvSpPr>
+          <p:cNvPr id="82" name="TextBox 81">
+            <a:extLst>
+              <a:ext uri="{FF2B5EF4-FFF2-40B4-BE49-F238E27FC236}">
+                <a16:creationId xmlns:a16="http://schemas.microsoft.com/office/drawing/2014/main" id="{C742D483-3BB8-F19F-AD95-DC15E06CB777}"/>
+              </a:ext>
+            </a:extLst>
+          </p:cNvPr>
+          <p:cNvSpPr txBox="1"/>
+          <p:nvPr/>
+        </p:nvSpPr>
+        <p:spPr>
+          <a:xfrm>
+            <a:off x="8018304" y="-8041"/>
+            <a:ext cx="1722716" cy="492443"/>
+          </a:xfrm>
+          <a:prstGeom prst="rect">
+            <a:avLst/>
+          </a:prstGeom>
+          <a:noFill/>
+        </p:spPr>
+        <p:txBody>
+          <a:bodyPr wrap="none" rtlCol="0">
+            <a:spAutoFit/>
+          </a:bodyPr>
+          <a:lstStyle/>
+          <a:p>
+            <a:pPr algn="l"/>
+            <a:r>
+              <a:rPr lang="en-US" sz="2600" dirty="0">
+                <a:latin typeface="Helvetica Neue Light" panose="02000403000000020004" pitchFamily="2" charset="0"/>
+                <a:ea typeface="Helvetica Neue Light" panose="02000403000000020004" pitchFamily="2" charset="0"/>
+                <a:cs typeface="Helvetica Neue" panose="02000503000000020004" pitchFamily="2" charset="0"/>
+              </a:rPr>
+              <a:t>Procedure</a:t>
+            </a:r>
+          </a:p>
+        </p:txBody>
+      </p:sp>
+      <p:sp>
+        <p:nvSpPr>
+          <p:cNvPr id="83" name="Rectangle 82">
+            <a:extLst>
+              <a:ext uri="{FF2B5EF4-FFF2-40B4-BE49-F238E27FC236}">
+                <a16:creationId xmlns:a16="http://schemas.microsoft.com/office/drawing/2014/main" id="{4AF95C4E-75FA-69B7-645A-12A8B27CADAC}"/>
+              </a:ext>
+            </a:extLst>
+          </p:cNvPr>
+          <p:cNvSpPr>
+            <a:spLocks noChangeAspect="1"/>
+          </p:cNvSpPr>
+          <p:nvPr/>
+        </p:nvSpPr>
+        <p:spPr>
+          <a:xfrm>
+            <a:off x="7469743" y="628800"/>
+            <a:ext cx="1224000" cy="1224000"/>
+          </a:xfrm>
+          <a:prstGeom prst="rect">
+            <a:avLst/>
+          </a:prstGeom>
+          <a:solidFill>
+            <a:schemeClr val="bg1"/>
+          </a:solidFill>
+        </p:spPr>
+        <p:style>
+          <a:lnRef idx="2">
+            <a:schemeClr val="accent1">
+              <a:shade val="15000"/>
+            </a:schemeClr>
+          </a:lnRef>
+          <a:fillRef idx="1">
+            <a:schemeClr val="accent1"/>
+          </a:fillRef>
+          <a:effectRef idx="0">
+            <a:schemeClr val="accent1"/>
+          </a:effectRef>
+          <a:fontRef idx="minor">
+            <a:schemeClr val="lt1"/>
+          </a:fontRef>
+        </p:style>
+        <p:txBody>
+          <a:bodyPr rtlCol="0" anchor="ctr"/>
+          <a:lstStyle/>
+          <a:p>
+            <a:pPr algn="ctr"/>
+            <a:endParaRPr lang="en-US" dirty="0"/>
+          </a:p>
+        </p:txBody>
+      </p:sp>
+      <p:pic>
+        <p:nvPicPr>
+          <p:cNvPr id="84" name="Image" descr="Image">
+            <a:extLst>
+              <a:ext uri="{FF2B5EF4-FFF2-40B4-BE49-F238E27FC236}">
+                <a16:creationId xmlns:a16="http://schemas.microsoft.com/office/drawing/2014/main" id="{1DD9E925-C374-1C73-FEC5-7FDFAE27F0F5}"/>
+              </a:ext>
+            </a:extLst>
+          </p:cNvPr>
+          <p:cNvPicPr>
+            <a:picLocks noChangeAspect="1"/>
+          </p:cNvPicPr>
+          <p:nvPr/>
+        </p:nvPicPr>
+        <p:blipFill>
+          <a:blip r:embed="rId3"/>
+          <a:srcRect l="1194" t="1330" r="32651" b="1508"/>
+          <a:stretch>
+            <a:fillRect/>
+          </a:stretch>
+        </p:blipFill>
+        <p:spPr>
+          <a:xfrm>
+            <a:off x="7490577" y="655443"/>
+            <a:ext cx="1188000" cy="1188000"/>
+          </a:xfrm>
+          <a:prstGeom prst="rect">
+            <a:avLst/>
+          </a:prstGeom>
+          <a:ln w="12700" cap="flat">
+            <a:noFill/>
+            <a:miter lim="400000"/>
+          </a:ln>
+          <a:effectLst/>
+        </p:spPr>
+      </p:pic>
+      <p:sp>
+        <p:nvSpPr>
+          <p:cNvPr id="85" name="Rectangle 84">
+            <a:extLst>
+              <a:ext uri="{FF2B5EF4-FFF2-40B4-BE49-F238E27FC236}">
+                <a16:creationId xmlns:a16="http://schemas.microsoft.com/office/drawing/2014/main" id="{C1960B97-28BF-1A04-BA65-95D4D2C8CD53}"/>
+              </a:ext>
+            </a:extLst>
+          </p:cNvPr>
+          <p:cNvSpPr>
+            <a:spLocks noChangeAspect="1"/>
+          </p:cNvSpPr>
+          <p:nvPr/>
+        </p:nvSpPr>
+        <p:spPr>
+          <a:xfrm>
+            <a:off x="7929446" y="1019166"/>
+            <a:ext cx="1224000" cy="1224000"/>
+          </a:xfrm>
+          <a:prstGeom prst="rect">
+            <a:avLst/>
+          </a:prstGeom>
+          <a:solidFill>
+            <a:schemeClr val="bg1"/>
+          </a:solidFill>
+        </p:spPr>
+        <p:style>
+          <a:lnRef idx="2">
+            <a:schemeClr val="accent1">
+              <a:shade val="15000"/>
+            </a:schemeClr>
+          </a:lnRef>
+          <a:fillRef idx="1">
+            <a:schemeClr val="accent1"/>
+          </a:fillRef>
+          <a:effectRef idx="0">
+            <a:schemeClr val="accent1"/>
+          </a:effectRef>
+          <a:fontRef idx="minor">
+            <a:schemeClr val="lt1"/>
+          </a:fontRef>
+        </p:style>
+        <p:txBody>
+          <a:bodyPr rtlCol="0" anchor="ctr"/>
+          <a:lstStyle/>
+          <a:p>
+            <a:pPr algn="ctr"/>
+            <a:endParaRPr lang="en-US" dirty="0"/>
+          </a:p>
+        </p:txBody>
+      </p:sp>
+      <p:sp>
+        <p:nvSpPr>
+          <p:cNvPr id="86" name="Rectangle 85">
+            <a:extLst>
+              <a:ext uri="{FF2B5EF4-FFF2-40B4-BE49-F238E27FC236}">
+                <a16:creationId xmlns:a16="http://schemas.microsoft.com/office/drawing/2014/main" id="{C227A0CD-4A06-DF50-F244-0A6B2ED3E7CF}"/>
+              </a:ext>
+            </a:extLst>
+          </p:cNvPr>
+          <p:cNvSpPr>
+            <a:spLocks noChangeAspect="1"/>
+          </p:cNvSpPr>
+          <p:nvPr/>
+        </p:nvSpPr>
+        <p:spPr>
+          <a:xfrm>
+            <a:off x="8202941" y="1296288"/>
+            <a:ext cx="1224000" cy="1224000"/>
+          </a:xfrm>
+          <a:prstGeom prst="rect">
+            <a:avLst/>
+          </a:prstGeom>
+          <a:solidFill>
+            <a:schemeClr val="bg1"/>
+          </a:solidFill>
+        </p:spPr>
+        <p:style>
+          <a:lnRef idx="2">
+            <a:schemeClr val="accent1">
+              <a:shade val="15000"/>
+            </a:schemeClr>
+          </a:lnRef>
+          <a:fillRef idx="1">
+            <a:schemeClr val="accent1"/>
+          </a:fillRef>
+          <a:effectRef idx="0">
+            <a:schemeClr val="accent1"/>
+          </a:effectRef>
+          <a:fontRef idx="minor">
+            <a:schemeClr val="lt1"/>
+          </a:fontRef>
+        </p:style>
+        <p:txBody>
+          <a:bodyPr rtlCol="0" anchor="ctr"/>
+          <a:lstStyle/>
+          <a:p>
+            <a:pPr algn="ctr"/>
+            <a:endParaRPr lang="en-US" dirty="0"/>
+          </a:p>
+        </p:txBody>
+      </p:sp>
+      <p:sp>
+        <p:nvSpPr>
+          <p:cNvPr id="87" name="Rectangle 86">
+            <a:extLst>
+              <a:ext uri="{FF2B5EF4-FFF2-40B4-BE49-F238E27FC236}">
+                <a16:creationId xmlns:a16="http://schemas.microsoft.com/office/drawing/2014/main" id="{776649FF-65A7-9588-1976-192CDE45CB20}"/>
+              </a:ext>
+            </a:extLst>
+          </p:cNvPr>
+          <p:cNvSpPr>
+            <a:spLocks noChangeAspect="1"/>
+          </p:cNvSpPr>
+          <p:nvPr/>
+        </p:nvSpPr>
+        <p:spPr>
+          <a:xfrm>
+            <a:off x="8476436" y="1573410"/>
+            <a:ext cx="1224000" cy="1224000"/>
+          </a:xfrm>
+          <a:prstGeom prst="rect">
+            <a:avLst/>
+          </a:prstGeom>
+          <a:solidFill>
+            <a:schemeClr val="bg1"/>
+          </a:solidFill>
+        </p:spPr>
+        <p:style>
+          <a:lnRef idx="2">
+            <a:schemeClr val="accent1">
+              <a:shade val="15000"/>
+            </a:schemeClr>
+          </a:lnRef>
+          <a:fillRef idx="1">
+            <a:schemeClr val="accent1"/>
+          </a:fillRef>
+          <a:effectRef idx="0">
+            <a:schemeClr val="accent1"/>
+          </a:effectRef>
+          <a:fontRef idx="minor">
+            <a:schemeClr val="lt1"/>
+          </a:fontRef>
+        </p:style>
+        <p:txBody>
+          <a:bodyPr rtlCol="0" anchor="ctr"/>
+          <a:lstStyle/>
+          <a:p>
+            <a:pPr algn="ctr"/>
+            <a:endParaRPr lang="en-US" dirty="0"/>
+          </a:p>
+        </p:txBody>
+      </p:sp>
+      <p:sp>
+        <p:nvSpPr>
+          <p:cNvPr id="88" name="Rectangle 87">
+            <a:extLst>
+              <a:ext uri="{FF2B5EF4-FFF2-40B4-BE49-F238E27FC236}">
+                <a16:creationId xmlns:a16="http://schemas.microsoft.com/office/drawing/2014/main" id="{713ED1F4-2010-32D6-E938-E0D71D3F830B}"/>
+              </a:ext>
+            </a:extLst>
+          </p:cNvPr>
+          <p:cNvSpPr>
+            <a:spLocks noChangeAspect="1"/>
+          </p:cNvSpPr>
+          <p:nvPr/>
+        </p:nvSpPr>
+        <p:spPr>
+          <a:xfrm>
+            <a:off x="8749931" y="1850532"/>
+            <a:ext cx="1224000" cy="1224000"/>
+          </a:xfrm>
+          <a:prstGeom prst="rect">
+            <a:avLst/>
+          </a:prstGeom>
+          <a:solidFill>
+            <a:schemeClr val="bg1"/>
+          </a:solidFill>
+        </p:spPr>
+        <p:style>
+          <a:lnRef idx="2">
+            <a:schemeClr val="accent1">
+              <a:shade val="15000"/>
+            </a:schemeClr>
+          </a:lnRef>
+          <a:fillRef idx="1">
+            <a:schemeClr val="accent1"/>
+          </a:fillRef>
+          <a:effectRef idx="0">
+            <a:schemeClr val="accent1"/>
+          </a:effectRef>
+          <a:fontRef idx="minor">
+            <a:schemeClr val="lt1"/>
+          </a:fontRef>
+        </p:style>
+        <p:txBody>
+          <a:bodyPr rtlCol="0" anchor="ctr"/>
+          <a:lstStyle/>
+          <a:p>
+            <a:pPr algn="ctr"/>
+            <a:endParaRPr lang="en-US" dirty="0"/>
+          </a:p>
+        </p:txBody>
+      </p:sp>
+      <p:sp>
+        <p:nvSpPr>
+          <p:cNvPr id="89" name="Rectangle 88">
+            <a:extLst>
+              <a:ext uri="{FF2B5EF4-FFF2-40B4-BE49-F238E27FC236}">
+                <a16:creationId xmlns:a16="http://schemas.microsoft.com/office/drawing/2014/main" id="{9F3DC06C-FAF3-E4D7-537E-1506A017F0A0}"/>
+              </a:ext>
+            </a:extLst>
+          </p:cNvPr>
+          <p:cNvSpPr>
+            <a:spLocks noChangeAspect="1"/>
+          </p:cNvSpPr>
+          <p:nvPr/>
+        </p:nvSpPr>
+        <p:spPr>
+          <a:xfrm>
+            <a:off x="9023426" y="2127654"/>
+            <a:ext cx="1224000" cy="1224000"/>
+          </a:xfrm>
+          <a:prstGeom prst="rect">
+            <a:avLst/>
+          </a:prstGeom>
+          <a:solidFill>
+            <a:schemeClr val="bg1"/>
+          </a:solidFill>
+        </p:spPr>
+        <p:style>
+          <a:lnRef idx="2">
+            <a:schemeClr val="accent1">
+              <a:shade val="15000"/>
+            </a:schemeClr>
+          </a:lnRef>
+          <a:fillRef idx="1">
+            <a:schemeClr val="accent1"/>
+          </a:fillRef>
+          <a:effectRef idx="0">
+            <a:schemeClr val="accent1"/>
+          </a:effectRef>
+          <a:fontRef idx="minor">
+            <a:schemeClr val="lt1"/>
+          </a:fontRef>
+        </p:style>
+        <p:txBody>
+          <a:bodyPr rtlCol="0" anchor="ctr"/>
+          <a:lstStyle/>
+          <a:p>
+            <a:pPr algn="ctr"/>
+            <a:endParaRPr lang="en-US" dirty="0"/>
+          </a:p>
+        </p:txBody>
+      </p:sp>
+      <p:sp>
+        <p:nvSpPr>
+          <p:cNvPr id="90" name="Rectangle 89">
+            <a:extLst>
+              <a:ext uri="{FF2B5EF4-FFF2-40B4-BE49-F238E27FC236}">
+                <a16:creationId xmlns:a16="http://schemas.microsoft.com/office/drawing/2014/main" id="{F483518A-A1EE-FE16-E97F-DED529FA1394}"/>
+              </a:ext>
+            </a:extLst>
+          </p:cNvPr>
+          <p:cNvSpPr>
+            <a:spLocks noChangeAspect="1"/>
+          </p:cNvSpPr>
+          <p:nvPr/>
+        </p:nvSpPr>
+        <p:spPr>
+          <a:xfrm>
+            <a:off x="9296921" y="2404776"/>
+            <a:ext cx="1224000" cy="1224000"/>
+          </a:xfrm>
+          <a:prstGeom prst="rect">
+            <a:avLst/>
+          </a:prstGeom>
+          <a:solidFill>
+            <a:schemeClr val="bg1"/>
+          </a:solidFill>
+        </p:spPr>
+        <p:style>
+          <a:lnRef idx="2">
+            <a:schemeClr val="accent1">
+              <a:shade val="15000"/>
+            </a:schemeClr>
+          </a:lnRef>
+          <a:fillRef idx="1">
+            <a:schemeClr val="accent1"/>
+          </a:fillRef>
+          <a:effectRef idx="0">
+            <a:schemeClr val="accent1"/>
+          </a:effectRef>
+          <a:fontRef idx="minor">
+            <a:schemeClr val="lt1"/>
+          </a:fontRef>
+        </p:style>
+        <p:txBody>
+          <a:bodyPr rtlCol="0" anchor="ctr"/>
+          <a:lstStyle/>
+          <a:p>
+            <a:pPr algn="ctr"/>
+            <a:endParaRPr lang="en-US" dirty="0"/>
+          </a:p>
+        </p:txBody>
+      </p:sp>
+      <p:sp>
+        <p:nvSpPr>
+          <p:cNvPr id="91" name="Rectangle 90">
+            <a:extLst>
+              <a:ext uri="{FF2B5EF4-FFF2-40B4-BE49-F238E27FC236}">
+                <a16:creationId xmlns:a16="http://schemas.microsoft.com/office/drawing/2014/main" id="{1176E01C-3CDC-DB8D-AB3D-8BF5904D1941}"/>
+              </a:ext>
+            </a:extLst>
+          </p:cNvPr>
+          <p:cNvSpPr>
+            <a:spLocks noChangeAspect="1"/>
+          </p:cNvSpPr>
+          <p:nvPr/>
+        </p:nvSpPr>
+        <p:spPr>
+          <a:xfrm>
+            <a:off x="9570416" y="2681898"/>
+            <a:ext cx="1224000" cy="1224000"/>
+          </a:xfrm>
+          <a:prstGeom prst="rect">
+            <a:avLst/>
+          </a:prstGeom>
+          <a:solidFill>
+            <a:schemeClr val="bg1"/>
+          </a:solidFill>
+        </p:spPr>
+        <p:style>
+          <a:lnRef idx="2">
+            <a:schemeClr val="accent1">
+              <a:shade val="15000"/>
+            </a:schemeClr>
+          </a:lnRef>
+          <a:fillRef idx="1">
+            <a:schemeClr val="accent1"/>
+          </a:fillRef>
+          <a:effectRef idx="0">
+            <a:schemeClr val="accent1"/>
+          </a:effectRef>
+          <a:fontRef idx="minor">
+            <a:schemeClr val="lt1"/>
+          </a:fontRef>
+        </p:style>
+        <p:txBody>
+          <a:bodyPr rtlCol="0" anchor="ctr"/>
+          <a:lstStyle/>
+          <a:p>
+            <a:pPr algn="ctr"/>
+            <a:endParaRPr lang="en-US" dirty="0"/>
+          </a:p>
+        </p:txBody>
+      </p:sp>
+      <p:sp>
+        <p:nvSpPr>
+          <p:cNvPr id="92" name="TextBox 91">
+            <a:extLst>
+              <a:ext uri="{FF2B5EF4-FFF2-40B4-BE49-F238E27FC236}">
+                <a16:creationId xmlns:a16="http://schemas.microsoft.com/office/drawing/2014/main" id="{3E24AE1A-6FD8-435F-CF2F-E0D1552D29A1}"/>
+              </a:ext>
+            </a:extLst>
+          </p:cNvPr>
+          <p:cNvSpPr txBox="1"/>
+          <p:nvPr/>
+        </p:nvSpPr>
+        <p:spPr>
+          <a:xfrm>
+            <a:off x="6423782" y="713773"/>
+            <a:ext cx="891206" cy="646331"/>
+          </a:xfrm>
+          <a:prstGeom prst="rect">
+            <a:avLst/>
+          </a:prstGeom>
+          <a:noFill/>
+        </p:spPr>
+        <p:txBody>
+          <a:bodyPr wrap="none" rtlCol="0">
+            <a:spAutoFit/>
+          </a:bodyPr>
+          <a:lstStyle/>
+          <a:p>
+            <a:pPr algn="l"/>
+            <a:r>
+              <a:rPr lang="en-US" dirty="0">
+                <a:latin typeface="Helvetica Neue Light" panose="02000403000000020004" pitchFamily="2" charset="0"/>
+                <a:ea typeface="Helvetica Neue Light" panose="02000403000000020004" pitchFamily="2" charset="0"/>
+                <a:cs typeface="Helvetica Neue" panose="02000503000000020004" pitchFamily="2" charset="0"/>
+              </a:rPr>
+              <a:t>Tutorial</a:t>
+            </a:r>
+          </a:p>
+          <a:p>
+            <a:pPr algn="l"/>
+            <a:r>
+              <a:rPr lang="en-US" dirty="0">
+                <a:latin typeface="Helvetica Neue Light" panose="02000403000000020004" pitchFamily="2" charset="0"/>
+                <a:ea typeface="Helvetica Neue Light" panose="02000403000000020004" pitchFamily="2" charset="0"/>
+                <a:cs typeface="Helvetica Neue" panose="02000503000000020004" pitchFamily="2" charset="0"/>
+              </a:rPr>
+              <a:t>round</a:t>
+            </a:r>
+          </a:p>
+        </p:txBody>
+      </p:sp>
+      <p:sp>
+        <p:nvSpPr>
+          <p:cNvPr id="93" name="TextBox 92">
+            <a:extLst>
+              <a:ext uri="{FF2B5EF4-FFF2-40B4-BE49-F238E27FC236}">
+                <a16:creationId xmlns:a16="http://schemas.microsoft.com/office/drawing/2014/main" id="{B5BB5E33-EBC4-BE83-BA81-9BF77F7756F4}"/>
+              </a:ext>
+            </a:extLst>
+          </p:cNvPr>
+          <p:cNvSpPr txBox="1"/>
+          <p:nvPr/>
+        </p:nvSpPr>
+        <p:spPr>
+          <a:xfrm>
+            <a:off x="6423782" y="1772136"/>
+            <a:ext cx="1147464" cy="646331"/>
+          </a:xfrm>
+          <a:prstGeom prst="rect">
+            <a:avLst/>
+          </a:prstGeom>
+          <a:noFill/>
+        </p:spPr>
+        <p:txBody>
+          <a:bodyPr wrap="square" rtlCol="0">
+            <a:spAutoFit/>
+          </a:bodyPr>
+          <a:lstStyle/>
+          <a:p>
+            <a:pPr algn="l"/>
+            <a:r>
+              <a:rPr lang="en-US" dirty="0">
+                <a:latin typeface="Helvetica Neue Light" panose="02000403000000020004" pitchFamily="2" charset="0"/>
+                <a:ea typeface="Helvetica Neue Light" panose="02000403000000020004" pitchFamily="2" charset="0"/>
+                <a:cs typeface="Helvetica Neue" panose="02000503000000020004" pitchFamily="2" charset="0"/>
+              </a:rPr>
+              <a:t>8 rounds of search</a:t>
+            </a:r>
+          </a:p>
+        </p:txBody>
+      </p:sp>
+      <p:cxnSp>
+        <p:nvCxnSpPr>
+          <p:cNvPr id="94" name="Straight Arrow Connector 93">
+            <a:extLst>
+              <a:ext uri="{FF2B5EF4-FFF2-40B4-BE49-F238E27FC236}">
+                <a16:creationId xmlns:a16="http://schemas.microsoft.com/office/drawing/2014/main" id="{EE583D75-5A3F-4F00-170A-0D1CE9FC0573}"/>
+              </a:ext>
+            </a:extLst>
+          </p:cNvPr>
+          <p:cNvCxnSpPr>
+            <a:cxnSpLocks/>
+          </p:cNvCxnSpPr>
+          <p:nvPr/>
+        </p:nvCxnSpPr>
+        <p:spPr>
+          <a:xfrm>
+            <a:off x="9557902" y="628800"/>
+            <a:ext cx="2416777" cy="2777280"/>
+          </a:xfrm>
+          <a:prstGeom prst="straightConnector1">
+            <a:avLst/>
+          </a:prstGeom>
+          <a:ln w="34925">
+            <a:solidFill>
+              <a:schemeClr val="tx1"/>
+            </a:solidFill>
+            <a:tailEnd type="triangle" w="lg" len="lg"/>
+          </a:ln>
+        </p:spPr>
+        <p:style>
+          <a:lnRef idx="2">
+            <a:schemeClr val="accent1"/>
+          </a:lnRef>
+          <a:fillRef idx="0">
+            <a:schemeClr val="accent1"/>
+          </a:fillRef>
+          <a:effectRef idx="1">
+            <a:schemeClr val="accent1"/>
+          </a:effectRef>
+          <a:fontRef idx="minor">
+            <a:schemeClr val="tx1"/>
+          </a:fontRef>
+        </p:style>
+      </p:cxnSp>
+      <p:sp>
+        <p:nvSpPr>
+          <p:cNvPr id="95" name="TextBox 94">
+            <a:extLst>
+              <a:ext uri="{FF2B5EF4-FFF2-40B4-BE49-F238E27FC236}">
+                <a16:creationId xmlns:a16="http://schemas.microsoft.com/office/drawing/2014/main" id="{B352BF44-E0FB-FFA5-6917-E9F3F12458A8}"/>
+              </a:ext>
+            </a:extLst>
+          </p:cNvPr>
+          <p:cNvSpPr txBox="1"/>
+          <p:nvPr/>
+        </p:nvSpPr>
+        <p:spPr>
+          <a:xfrm rot="2940000">
+            <a:off x="10253457" y="1580231"/>
+            <a:ext cx="1310029" cy="400110"/>
+          </a:xfrm>
+          <a:prstGeom prst="rect">
+            <a:avLst/>
+          </a:prstGeom>
+          <a:noFill/>
+        </p:spPr>
+        <p:txBody>
+          <a:bodyPr wrap="square" rtlCol="0">
+            <a:spAutoFit/>
+          </a:bodyPr>
+          <a:lstStyle/>
+          <a:p>
+            <a:pPr algn="ctr"/>
+            <a:r>
+              <a:rPr lang="en-US" sz="2000" dirty="0">
+                <a:latin typeface="Helvetica Neue Light" panose="02000403000000020004" pitchFamily="2" charset="0"/>
+                <a:ea typeface="Helvetica Neue Light" panose="02000403000000020004" pitchFamily="2" charset="0"/>
+                <a:cs typeface="Helvetica Neue" panose="02000503000000020004" pitchFamily="2" charset="0"/>
+              </a:rPr>
+              <a:t>Time</a:t>
+            </a:r>
+          </a:p>
+        </p:txBody>
+      </p:sp>
+      <p:sp>
+        <p:nvSpPr>
+          <p:cNvPr id="96" name="TextBox 95">
+            <a:extLst>
+              <a:ext uri="{FF2B5EF4-FFF2-40B4-BE49-F238E27FC236}">
+                <a16:creationId xmlns:a16="http://schemas.microsoft.com/office/drawing/2014/main" id="{4D8DB33C-C41A-C9AF-DCD5-0B38DE49F470}"/>
+              </a:ext>
+            </a:extLst>
+          </p:cNvPr>
+          <p:cNvSpPr txBox="1"/>
+          <p:nvPr/>
+        </p:nvSpPr>
+        <p:spPr>
+          <a:xfrm>
+            <a:off x="6423782" y="2600339"/>
+            <a:ext cx="1764776" cy="646331"/>
+          </a:xfrm>
+          <a:prstGeom prst="rect">
+            <a:avLst/>
+          </a:prstGeom>
+          <a:noFill/>
+        </p:spPr>
+        <p:txBody>
+          <a:bodyPr wrap="square" rtlCol="0">
+            <a:spAutoFit/>
+          </a:bodyPr>
+          <a:lstStyle/>
+          <a:p>
+            <a:pPr algn="l"/>
+            <a:r>
+              <a:rPr lang="en-US" dirty="0">
+                <a:latin typeface="Helvetica Neue Light" panose="02000403000000020004" pitchFamily="2" charset="0"/>
+                <a:ea typeface="Helvetica Neue Light" panose="02000403000000020004" pitchFamily="2" charset="0"/>
+                <a:cs typeface="Helvetica Neue" panose="02000503000000020004" pitchFamily="2" charset="0"/>
+              </a:rPr>
+              <a:t>25 clicks in each round</a:t>
+            </a:r>
+          </a:p>
+        </p:txBody>
+      </p:sp>
+      <p:grpSp>
+        <p:nvGrpSpPr>
+          <p:cNvPr id="97" name="Group 96">
+            <a:extLst>
+              <a:ext uri="{FF2B5EF4-FFF2-40B4-BE49-F238E27FC236}">
+                <a16:creationId xmlns:a16="http://schemas.microsoft.com/office/drawing/2014/main" id="{4F165C9E-8617-AFD8-4A21-3F9FBC2CCE8D}"/>
+              </a:ext>
+            </a:extLst>
+          </p:cNvPr>
+          <p:cNvGrpSpPr/>
+          <p:nvPr/>
+        </p:nvGrpSpPr>
+        <p:grpSpPr>
+          <a:xfrm>
+            <a:off x="9941459" y="3031634"/>
+            <a:ext cx="1224000" cy="1224000"/>
+            <a:chOff x="15216601" y="25659727"/>
+            <a:chExt cx="1224000" cy="1224000"/>
+          </a:xfrm>
+        </p:grpSpPr>
+        <p:sp>
+          <p:nvSpPr>
+            <p:cNvPr id="98" name="Rectangle 97">
+              <a:extLst>
+                <a:ext uri="{FF2B5EF4-FFF2-40B4-BE49-F238E27FC236}">
+                  <a16:creationId xmlns:a16="http://schemas.microsoft.com/office/drawing/2014/main" id="{09915252-220B-E7E3-6502-BB7A868C3FA1}"/>
+                </a:ext>
+              </a:extLst>
+            </p:cNvPr>
+            <p:cNvSpPr>
+              <a:spLocks noChangeAspect="1"/>
+            </p:cNvSpPr>
+            <p:nvPr/>
+          </p:nvSpPr>
+          <p:spPr>
+            <a:xfrm>
+              <a:off x="15216601" y="25659727"/>
+              <a:ext cx="1224000" cy="1224000"/>
+            </a:xfrm>
+            <a:prstGeom prst="rect">
+              <a:avLst/>
+            </a:prstGeom>
+            <a:solidFill>
+              <a:schemeClr val="bg1"/>
+            </a:solidFill>
+          </p:spPr>
+          <p:style>
+            <a:lnRef idx="2">
+              <a:schemeClr val="accent1">
+                <a:shade val="15000"/>
+              </a:schemeClr>
+            </a:lnRef>
+            <a:fillRef idx="1">
+              <a:schemeClr val="accent1"/>
+            </a:fillRef>
+            <a:effectRef idx="0">
+              <a:schemeClr val="accent1"/>
+            </a:effectRef>
+            <a:fontRef idx="minor">
+              <a:schemeClr val="lt1"/>
+            </a:fontRef>
+          </p:style>
+          <p:txBody>
+            <a:bodyPr rtlCol="0" anchor="ctr"/>
+            <a:lstStyle/>
+            <a:p>
+              <a:pPr algn="ctr"/>
+              <a:endParaRPr lang="en-US" dirty="0"/>
+            </a:p>
+          </p:txBody>
+        </p:sp>
+        <p:pic>
+          <p:nvPicPr>
+            <p:cNvPr id="99" name="Picture 98">
+              <a:extLst>
+                <a:ext uri="{FF2B5EF4-FFF2-40B4-BE49-F238E27FC236}">
+                  <a16:creationId xmlns:a16="http://schemas.microsoft.com/office/drawing/2014/main" id="{F18CF5DF-C8D5-E8C0-47A2-7B403E6A78F4}"/>
+                </a:ext>
+              </a:extLst>
+            </p:cNvPr>
+            <p:cNvPicPr>
+              <a:picLocks noChangeAspect="1"/>
+            </p:cNvPicPr>
+            <p:nvPr/>
+          </p:nvPicPr>
+          <p:blipFill>
+            <a:blip r:embed="rId4"/>
+            <a:srcRect l="738"/>
+            <a:stretch>
+              <a:fillRect/>
+            </a:stretch>
+          </p:blipFill>
+          <p:spPr>
+            <a:xfrm>
+              <a:off x="15241862" y="25687196"/>
+              <a:ext cx="1188000" cy="1188000"/>
+            </a:xfrm>
+            <a:prstGeom prst="rect">
+              <a:avLst/>
+            </a:prstGeom>
+          </p:spPr>
+        </p:pic>
+      </p:grpSp>
+      <p:sp>
+        <p:nvSpPr>
+          <p:cNvPr id="100" name="TextBox 99">
+            <a:extLst>
+              <a:ext uri="{FF2B5EF4-FFF2-40B4-BE49-F238E27FC236}">
+                <a16:creationId xmlns:a16="http://schemas.microsoft.com/office/drawing/2014/main" id="{99FB87C8-70F5-A168-2F03-1FB715C6666F}"/>
+              </a:ext>
+            </a:extLst>
+          </p:cNvPr>
+          <p:cNvSpPr txBox="1"/>
+          <p:nvPr/>
+        </p:nvSpPr>
+        <p:spPr>
+          <a:xfrm>
+            <a:off x="6423782" y="3351654"/>
+            <a:ext cx="1995684" cy="923330"/>
+          </a:xfrm>
+          <a:prstGeom prst="rect">
+            <a:avLst/>
+          </a:prstGeom>
+          <a:noFill/>
+        </p:spPr>
+        <p:txBody>
+          <a:bodyPr wrap="square" rtlCol="0">
+            <a:spAutoFit/>
+          </a:bodyPr>
+          <a:lstStyle/>
+          <a:p>
+            <a:pPr algn="l"/>
+            <a:r>
+              <a:rPr lang="en-US" dirty="0">
+                <a:latin typeface="Helvetica Neue Light" panose="02000403000000020004" pitchFamily="2" charset="0"/>
+                <a:ea typeface="Helvetica Neue Light" panose="02000403000000020004" pitchFamily="2" charset="0"/>
+                <a:cs typeface="Helvetica Neue" panose="02000503000000020004" pitchFamily="2" charset="0"/>
+              </a:rPr>
+              <a:t>”Bonus round” with reward predictions</a:t>
+            </a:r>
+          </a:p>
+        </p:txBody>
+      </p:sp>
+      <p:pic>
+        <p:nvPicPr>
+          <p:cNvPr id="29" name="Picture 28">
+            <a:extLst>
+              <a:ext uri="{FF2B5EF4-FFF2-40B4-BE49-F238E27FC236}">
+                <a16:creationId xmlns:a16="http://schemas.microsoft.com/office/drawing/2014/main" id="{52DFD066-56C8-F401-9824-E63A66FD8DE3}"/>
+              </a:ext>
+            </a:extLst>
+          </p:cNvPr>
+          <p:cNvPicPr>
+            <a:picLocks noChangeAspect="1"/>
+          </p:cNvPicPr>
+          <p:nvPr/>
+        </p:nvPicPr>
+        <p:blipFill>
+          <a:blip r:embed="rId5"/>
+          <a:stretch>
+            <a:fillRect/>
+          </a:stretch>
+        </p:blipFill>
+        <p:spPr>
+          <a:xfrm>
+            <a:off x="14894836" y="3204369"/>
+            <a:ext cx="1036408" cy="1036407"/>
+          </a:xfrm>
+          <a:prstGeom prst="rect">
+            <a:avLst/>
+          </a:prstGeom>
+        </p:spPr>
+      </p:pic>
+      <p:pic>
+        <p:nvPicPr>
+          <p:cNvPr id="30" name="Picture 29">
+            <a:extLst>
+              <a:ext uri="{FF2B5EF4-FFF2-40B4-BE49-F238E27FC236}">
+                <a16:creationId xmlns:a16="http://schemas.microsoft.com/office/drawing/2014/main" id="{E05433B0-B7BA-7A98-207D-239BBB94A262}"/>
+              </a:ext>
+            </a:extLst>
+          </p:cNvPr>
+          <p:cNvPicPr>
+            <a:picLocks noChangeAspect="1"/>
+          </p:cNvPicPr>
+          <p:nvPr/>
+        </p:nvPicPr>
+        <p:blipFill>
+          <a:blip r:embed="rId6"/>
+          <a:stretch>
+            <a:fillRect/>
+          </a:stretch>
+        </p:blipFill>
+        <p:spPr>
+          <a:xfrm>
+            <a:off x="13643256" y="3204369"/>
+            <a:ext cx="1036408" cy="1036407"/>
+          </a:xfrm>
+          <a:prstGeom prst="rect">
+            <a:avLst/>
+          </a:prstGeom>
+        </p:spPr>
+      </p:pic>
+      <p:pic>
+        <p:nvPicPr>
+          <p:cNvPr id="31" name="Picture 30">
+            <a:extLst>
+              <a:ext uri="{FF2B5EF4-FFF2-40B4-BE49-F238E27FC236}">
+                <a16:creationId xmlns:a16="http://schemas.microsoft.com/office/drawing/2014/main" id="{9BCA3DFD-A3F1-CF71-7602-76C4E6EA2C3E}"/>
+              </a:ext>
+            </a:extLst>
+          </p:cNvPr>
+          <p:cNvPicPr>
+            <a:picLocks noChangeAspect="1"/>
+          </p:cNvPicPr>
+          <p:nvPr/>
+        </p:nvPicPr>
+        <p:blipFill>
+          <a:blip r:embed="rId7"/>
+          <a:stretch>
+            <a:fillRect/>
+          </a:stretch>
+        </p:blipFill>
+        <p:spPr>
+          <a:xfrm>
+            <a:off x="12391676" y="3204369"/>
+            <a:ext cx="1036408" cy="1036407"/>
+          </a:xfrm>
+          <a:prstGeom prst="rect">
+            <a:avLst/>
+          </a:prstGeom>
+        </p:spPr>
+      </p:pic>
+      <p:pic>
+        <p:nvPicPr>
+          <p:cNvPr id="32" name="Picture 31">
+            <a:extLst>
+              <a:ext uri="{FF2B5EF4-FFF2-40B4-BE49-F238E27FC236}">
+                <a16:creationId xmlns:a16="http://schemas.microsoft.com/office/drawing/2014/main" id="{83AFEAE7-44F2-8648-F279-9487F0178620}"/>
+              </a:ext>
+            </a:extLst>
+          </p:cNvPr>
+          <p:cNvPicPr>
+            <a:picLocks noChangeAspect="1"/>
+          </p:cNvPicPr>
+          <p:nvPr/>
+        </p:nvPicPr>
+        <p:blipFill>
+          <a:blip r:embed="rId8"/>
+          <a:stretch>
+            <a:fillRect/>
+          </a:stretch>
+        </p:blipFill>
+        <p:spPr>
+          <a:xfrm>
+            <a:off x="14894836" y="640776"/>
+            <a:ext cx="1036408" cy="1036407"/>
+          </a:xfrm>
+          <a:prstGeom prst="rect">
+            <a:avLst/>
+          </a:prstGeom>
+        </p:spPr>
+      </p:pic>
+      <p:pic>
+        <p:nvPicPr>
+          <p:cNvPr id="33" name="Picture 32">
+            <a:extLst>
+              <a:ext uri="{FF2B5EF4-FFF2-40B4-BE49-F238E27FC236}">
+                <a16:creationId xmlns:a16="http://schemas.microsoft.com/office/drawing/2014/main" id="{0546CB74-262E-BA4F-B904-F814BF6D7321}"/>
+              </a:ext>
+            </a:extLst>
+          </p:cNvPr>
+          <p:cNvPicPr>
+            <a:picLocks noChangeAspect="1"/>
+          </p:cNvPicPr>
+          <p:nvPr/>
+        </p:nvPicPr>
+        <p:blipFill>
+          <a:blip r:embed="rId9"/>
+          <a:stretch>
+            <a:fillRect/>
+          </a:stretch>
+        </p:blipFill>
+        <p:spPr>
+          <a:xfrm>
+            <a:off x="14894836" y="1922572"/>
+            <a:ext cx="1036408" cy="1036407"/>
+          </a:xfrm>
+          <a:prstGeom prst="rect">
+            <a:avLst/>
+          </a:prstGeom>
+        </p:spPr>
+      </p:pic>
+      <p:pic>
+        <p:nvPicPr>
+          <p:cNvPr id="34" name="Picture 33">
+            <a:extLst>
+              <a:ext uri="{FF2B5EF4-FFF2-40B4-BE49-F238E27FC236}">
+                <a16:creationId xmlns:a16="http://schemas.microsoft.com/office/drawing/2014/main" id="{386DA79D-F596-D613-92F7-3C0158E99893}"/>
+              </a:ext>
+            </a:extLst>
+          </p:cNvPr>
+          <p:cNvPicPr>
+            <a:picLocks noChangeAspect="1"/>
+          </p:cNvPicPr>
+          <p:nvPr/>
+        </p:nvPicPr>
+        <p:blipFill>
+          <a:blip r:embed="rId10"/>
+          <a:stretch>
+            <a:fillRect/>
+          </a:stretch>
+        </p:blipFill>
+        <p:spPr>
+          <a:xfrm>
+            <a:off x="13643256" y="1922572"/>
+            <a:ext cx="1036408" cy="1036407"/>
+          </a:xfrm>
+          <a:prstGeom prst="rect">
+            <a:avLst/>
+          </a:prstGeom>
+        </p:spPr>
+      </p:pic>
+      <p:pic>
+        <p:nvPicPr>
+          <p:cNvPr id="35" name="Picture 34">
+            <a:extLst>
+              <a:ext uri="{FF2B5EF4-FFF2-40B4-BE49-F238E27FC236}">
+                <a16:creationId xmlns:a16="http://schemas.microsoft.com/office/drawing/2014/main" id="{2E10C79D-1D6D-4A73-621F-8BA18273367D}"/>
+              </a:ext>
+            </a:extLst>
+          </p:cNvPr>
+          <p:cNvPicPr>
+            <a:picLocks noChangeAspect="1"/>
+          </p:cNvPicPr>
+          <p:nvPr/>
+        </p:nvPicPr>
+        <p:blipFill>
+          <a:blip r:embed="rId11"/>
+          <a:stretch>
+            <a:fillRect/>
+          </a:stretch>
+        </p:blipFill>
+        <p:spPr>
+          <a:xfrm>
+            <a:off x="13643256" y="640776"/>
+            <a:ext cx="1036408" cy="1036407"/>
+          </a:xfrm>
+          <a:prstGeom prst="rect">
+            <a:avLst/>
+          </a:prstGeom>
+        </p:spPr>
+      </p:pic>
+      <p:pic>
+        <p:nvPicPr>
+          <p:cNvPr id="36" name="Picture 35">
+            <a:extLst>
+              <a:ext uri="{FF2B5EF4-FFF2-40B4-BE49-F238E27FC236}">
+                <a16:creationId xmlns:a16="http://schemas.microsoft.com/office/drawing/2014/main" id="{E0B13C66-5342-D09E-7AAC-82520DC8C39D}"/>
+              </a:ext>
+            </a:extLst>
+          </p:cNvPr>
+          <p:cNvPicPr>
+            <a:picLocks noChangeAspect="1"/>
+          </p:cNvPicPr>
+          <p:nvPr/>
+        </p:nvPicPr>
+        <p:blipFill>
+          <a:blip r:embed="rId12"/>
+          <a:stretch>
+            <a:fillRect/>
+          </a:stretch>
+        </p:blipFill>
+        <p:spPr>
+          <a:xfrm>
+            <a:off x="12391676" y="1922572"/>
+            <a:ext cx="1036408" cy="1036407"/>
+          </a:xfrm>
+          <a:prstGeom prst="rect">
+            <a:avLst/>
+          </a:prstGeom>
+        </p:spPr>
+      </p:pic>
+      <p:pic>
+        <p:nvPicPr>
+          <p:cNvPr id="37" name="Picture 36">
+            <a:extLst>
+              <a:ext uri="{FF2B5EF4-FFF2-40B4-BE49-F238E27FC236}">
+                <a16:creationId xmlns:a16="http://schemas.microsoft.com/office/drawing/2014/main" id="{AAB0F67F-0AF4-2945-014F-CD1A32645447}"/>
+              </a:ext>
+            </a:extLst>
+          </p:cNvPr>
+          <p:cNvPicPr>
+            <a:picLocks noChangeAspect="1"/>
+          </p:cNvPicPr>
+          <p:nvPr/>
+        </p:nvPicPr>
+        <p:blipFill>
+          <a:blip r:embed="rId13"/>
+          <a:stretch>
+            <a:fillRect/>
+          </a:stretch>
+        </p:blipFill>
+        <p:spPr>
+          <a:xfrm>
+            <a:off x="12391676" y="640776"/>
+            <a:ext cx="1036408" cy="1036407"/>
+          </a:xfrm>
+          <a:prstGeom prst="rect">
+            <a:avLst/>
+          </a:prstGeom>
+        </p:spPr>
+      </p:pic>
+      <p:sp>
+        <p:nvSpPr>
+          <p:cNvPr id="38" name="TextBox 37">
+            <a:extLst>
+              <a:ext uri="{FF2B5EF4-FFF2-40B4-BE49-F238E27FC236}">
+                <a16:creationId xmlns:a16="http://schemas.microsoft.com/office/drawing/2014/main" id="{448CD114-3C19-C02E-BA6B-DD5CD0D288FC}"/>
+              </a:ext>
+            </a:extLst>
+          </p:cNvPr>
+          <p:cNvSpPr txBox="1"/>
+          <p:nvPr/>
+        </p:nvSpPr>
+        <p:spPr>
+          <a:xfrm>
+            <a:off x="2761202" y="1012162"/>
+            <a:ext cx="216000" cy="216000"/>
+          </a:xfrm>
+          <a:prstGeom prst="rect">
+            <a:avLst/>
+          </a:prstGeom>
+          <a:solidFill>
+            <a:srgbClr val="FDD7A1"/>
+          </a:solidFill>
+        </p:spPr>
+        <p:txBody>
+          <a:bodyPr wrap="none" rtlCol="0" anchor="ctr">
+            <a:spAutoFit/>
+          </a:bodyPr>
+          <a:lstStyle/>
+          <a:p>
+            <a:pPr algn="ctr"/>
+            <a:r>
+              <a:rPr lang="en-US" sz="1200" dirty="0"/>
+              <a:t>12</a:t>
+            </a:r>
+          </a:p>
+        </p:txBody>
+      </p:sp>
+      <p:sp>
+        <p:nvSpPr>
+          <p:cNvPr id="39" name="TextBox 38">
+            <a:extLst>
+              <a:ext uri="{FF2B5EF4-FFF2-40B4-BE49-F238E27FC236}">
+                <a16:creationId xmlns:a16="http://schemas.microsoft.com/office/drawing/2014/main" id="{70AEBB63-8371-464C-88DF-09CD8F6461BB}"/>
+              </a:ext>
+            </a:extLst>
+          </p:cNvPr>
+          <p:cNvSpPr txBox="1"/>
+          <p:nvPr/>
+        </p:nvSpPr>
+        <p:spPr>
+          <a:xfrm>
+            <a:off x="2772354" y="1523602"/>
+            <a:ext cx="216000" cy="216000"/>
+          </a:xfrm>
+          <a:prstGeom prst="rect">
+            <a:avLst/>
+          </a:prstGeom>
+          <a:solidFill>
+            <a:srgbClr val="FEE2BC"/>
+          </a:solidFill>
+        </p:spPr>
+        <p:txBody>
+          <a:bodyPr wrap="none" rtlCol="0" anchor="ctr">
+            <a:spAutoFit/>
+          </a:bodyPr>
+          <a:lstStyle/>
+          <a:p>
+            <a:pPr algn="ctr"/>
+            <a:r>
+              <a:rPr lang="en-US" sz="1200" dirty="0"/>
+              <a:t>8</a:t>
+            </a:r>
+          </a:p>
+        </p:txBody>
+      </p:sp>
+      <p:sp>
+        <p:nvSpPr>
+          <p:cNvPr id="40" name="TextBox 39">
+            <a:extLst>
+              <a:ext uri="{FF2B5EF4-FFF2-40B4-BE49-F238E27FC236}">
+                <a16:creationId xmlns:a16="http://schemas.microsoft.com/office/drawing/2014/main" id="{A9ADF8AA-678C-83A0-EAC3-BD2B4D45577A}"/>
+              </a:ext>
+            </a:extLst>
+          </p:cNvPr>
+          <p:cNvSpPr txBox="1"/>
+          <p:nvPr/>
+        </p:nvSpPr>
+        <p:spPr>
+          <a:xfrm>
+            <a:off x="2269254" y="1523602"/>
+            <a:ext cx="216000" cy="180000"/>
+          </a:xfrm>
+          <a:prstGeom prst="rect">
+            <a:avLst/>
+          </a:prstGeom>
+          <a:solidFill>
+            <a:srgbClr val="FEE9C9"/>
+          </a:solidFill>
+        </p:spPr>
+        <p:txBody>
+          <a:bodyPr wrap="none" rtlCol="0" anchor="ctr">
+            <a:spAutoFit/>
+          </a:bodyPr>
+          <a:lstStyle/>
+          <a:p>
+            <a:pPr algn="ctr"/>
+            <a:r>
+              <a:rPr lang="en-US" sz="1200" dirty="0"/>
+              <a:t>6</a:t>
+            </a:r>
+          </a:p>
+        </p:txBody>
+      </p:sp>
+      <p:sp>
+        <p:nvSpPr>
+          <p:cNvPr id="41" name="TextBox 40">
+            <a:extLst>
+              <a:ext uri="{FF2B5EF4-FFF2-40B4-BE49-F238E27FC236}">
+                <a16:creationId xmlns:a16="http://schemas.microsoft.com/office/drawing/2014/main" id="{61D13226-896A-A190-5957-A0CBFA31C357}"/>
+              </a:ext>
+            </a:extLst>
+          </p:cNvPr>
+          <p:cNvSpPr txBox="1"/>
+          <p:nvPr/>
+        </p:nvSpPr>
+        <p:spPr>
+          <a:xfrm>
+            <a:off x="2534050" y="1785862"/>
+            <a:ext cx="216000" cy="180000"/>
+          </a:xfrm>
+          <a:prstGeom prst="rect">
+            <a:avLst/>
+          </a:prstGeom>
+          <a:solidFill>
+            <a:srgbClr val="FEE0B6"/>
+          </a:solidFill>
+        </p:spPr>
+        <p:txBody>
+          <a:bodyPr wrap="none" rtlCol="0" anchor="ctr">
+            <a:noAutofit/>
+          </a:bodyPr>
+          <a:lstStyle/>
+          <a:p>
+            <a:pPr algn="ctr"/>
+            <a:r>
+              <a:rPr lang="en-US" sz="1200" dirty="0"/>
+              <a:t>9</a:t>
+            </a:r>
+          </a:p>
+        </p:txBody>
+      </p:sp>
+      <p:sp>
+        <p:nvSpPr>
+          <p:cNvPr id="42" name="TextBox 41">
+            <a:extLst>
+              <a:ext uri="{FF2B5EF4-FFF2-40B4-BE49-F238E27FC236}">
+                <a16:creationId xmlns:a16="http://schemas.microsoft.com/office/drawing/2014/main" id="{760CF696-3888-E86C-81FD-F695DFE89A32}"/>
+              </a:ext>
+            </a:extLst>
+          </p:cNvPr>
+          <p:cNvSpPr txBox="1"/>
+          <p:nvPr/>
+        </p:nvSpPr>
+        <p:spPr>
+          <a:xfrm>
+            <a:off x="1774256" y="1785862"/>
+            <a:ext cx="216000" cy="180000"/>
+          </a:xfrm>
+          <a:prstGeom prst="rect">
+            <a:avLst/>
+          </a:prstGeom>
+          <a:solidFill>
+            <a:srgbClr val="FDD7A1"/>
+          </a:solidFill>
+        </p:spPr>
+        <p:txBody>
+          <a:bodyPr wrap="none" rtlCol="0" anchor="ctr">
+            <a:noAutofit/>
+          </a:bodyPr>
+          <a:lstStyle/>
+          <a:p>
+            <a:pPr algn="ctr"/>
+            <a:r>
+              <a:rPr lang="en-US" sz="1200" dirty="0"/>
+              <a:t>12</a:t>
+            </a:r>
+          </a:p>
+        </p:txBody>
+      </p:sp>
+      <p:sp>
+        <p:nvSpPr>
+          <p:cNvPr id="43" name="TextBox 42">
+            <a:extLst>
+              <a:ext uri="{FF2B5EF4-FFF2-40B4-BE49-F238E27FC236}">
+                <a16:creationId xmlns:a16="http://schemas.microsoft.com/office/drawing/2014/main" id="{DDA2092D-2AD1-1ABE-62A0-837A0E74BDFA}"/>
+              </a:ext>
+            </a:extLst>
+          </p:cNvPr>
+          <p:cNvSpPr txBox="1"/>
+          <p:nvPr/>
+        </p:nvSpPr>
+        <p:spPr>
+          <a:xfrm>
+            <a:off x="1779783" y="2282785"/>
+            <a:ext cx="216000" cy="180000"/>
+          </a:xfrm>
+          <a:prstGeom prst="rect">
+            <a:avLst/>
+          </a:prstGeom>
+          <a:solidFill>
+            <a:srgbClr val="EC5F43"/>
+          </a:solidFill>
+        </p:spPr>
+        <p:txBody>
+          <a:bodyPr wrap="none" rtlCol="0" anchor="ctr">
+            <a:noAutofit/>
+          </a:bodyPr>
+          <a:lstStyle/>
+          <a:p>
+            <a:pPr algn="ctr"/>
+            <a:r>
+              <a:rPr lang="en-US" sz="1200" dirty="0"/>
+              <a:t>32</a:t>
+            </a:r>
+          </a:p>
+        </p:txBody>
+      </p:sp>
+      <p:sp>
+        <p:nvSpPr>
+          <p:cNvPr id="44" name="TextBox 43">
+            <a:extLst>
+              <a:ext uri="{FF2B5EF4-FFF2-40B4-BE49-F238E27FC236}">
+                <a16:creationId xmlns:a16="http://schemas.microsoft.com/office/drawing/2014/main" id="{F323E07B-5A06-F267-8220-0390F1D57091}"/>
+              </a:ext>
+            </a:extLst>
+          </p:cNvPr>
+          <p:cNvSpPr txBox="1"/>
+          <p:nvPr/>
+        </p:nvSpPr>
+        <p:spPr>
+          <a:xfrm>
+            <a:off x="2764774" y="2282785"/>
+            <a:ext cx="216000" cy="180000"/>
+          </a:xfrm>
+          <a:prstGeom prst="rect">
+            <a:avLst/>
+          </a:prstGeom>
+          <a:solidFill>
+            <a:srgbClr val="FC9460"/>
+          </a:solidFill>
+        </p:spPr>
+        <p:txBody>
+          <a:bodyPr wrap="none" rtlCol="0" anchor="ctr">
+            <a:noAutofit/>
+          </a:bodyPr>
+          <a:lstStyle/>
+          <a:p>
+            <a:pPr algn="ctr"/>
+            <a:r>
+              <a:rPr lang="en-US" sz="1200" dirty="0"/>
+              <a:t>24</a:t>
+            </a:r>
+          </a:p>
+        </p:txBody>
+      </p:sp>
+      <p:sp>
+        <p:nvSpPr>
+          <p:cNvPr id="45" name="TextBox 44">
+            <a:extLst>
+              <a:ext uri="{FF2B5EF4-FFF2-40B4-BE49-F238E27FC236}">
+                <a16:creationId xmlns:a16="http://schemas.microsoft.com/office/drawing/2014/main" id="{98F2BC21-1865-99FF-0648-5627C4C27389}"/>
+              </a:ext>
+            </a:extLst>
+          </p:cNvPr>
+          <p:cNvSpPr txBox="1"/>
+          <p:nvPr/>
+        </p:nvSpPr>
+        <p:spPr>
+          <a:xfrm>
+            <a:off x="1537502" y="2537016"/>
+            <a:ext cx="216000" cy="180000"/>
+          </a:xfrm>
+          <a:prstGeom prst="rect">
+            <a:avLst/>
+          </a:prstGeom>
+          <a:solidFill>
+            <a:srgbClr val="C91D13"/>
+          </a:solidFill>
+        </p:spPr>
+        <p:txBody>
+          <a:bodyPr wrap="none" rtlCol="0" anchor="ctr">
+            <a:noAutofit/>
+          </a:bodyPr>
+          <a:lstStyle/>
+          <a:p>
+            <a:pPr algn="ctr"/>
+            <a:r>
+              <a:rPr lang="en-US" sz="1200" dirty="0"/>
+              <a:t>40</a:t>
+            </a:r>
+          </a:p>
+        </p:txBody>
+      </p:sp>
+      <p:sp>
+        <p:nvSpPr>
+          <p:cNvPr id="46" name="TextBox 45">
+            <a:extLst>
+              <a:ext uri="{FF2B5EF4-FFF2-40B4-BE49-F238E27FC236}">
+                <a16:creationId xmlns:a16="http://schemas.microsoft.com/office/drawing/2014/main" id="{9F58EAA9-DAFB-098A-5368-C11F71E605C2}"/>
+              </a:ext>
+            </a:extLst>
+          </p:cNvPr>
+          <p:cNvSpPr txBox="1"/>
+          <p:nvPr/>
+        </p:nvSpPr>
+        <p:spPr>
+          <a:xfrm>
+            <a:off x="1776673" y="2537016"/>
+            <a:ext cx="216000" cy="180000"/>
+          </a:xfrm>
+          <a:prstGeom prst="rect">
+            <a:avLst/>
+          </a:prstGeom>
+          <a:solidFill>
+            <a:srgbClr val="BD0E08"/>
+          </a:solidFill>
+        </p:spPr>
+        <p:txBody>
+          <a:bodyPr wrap="none" rtlCol="0" anchor="ctr">
+            <a:noAutofit/>
+          </a:bodyPr>
+          <a:lstStyle/>
+          <a:p>
+            <a:pPr algn="ctr"/>
+            <a:r>
+              <a:rPr lang="en-US" sz="1200" dirty="0"/>
+              <a:t>42</a:t>
+            </a:r>
+          </a:p>
+        </p:txBody>
+      </p:sp>
+      <p:sp>
+        <p:nvSpPr>
+          <p:cNvPr id="47" name="TextBox 46">
+            <a:extLst>
+              <a:ext uri="{FF2B5EF4-FFF2-40B4-BE49-F238E27FC236}">
+                <a16:creationId xmlns:a16="http://schemas.microsoft.com/office/drawing/2014/main" id="{7C3862DE-1F5F-3CB4-07A4-A2A0AC47CD6A}"/>
+              </a:ext>
+            </a:extLst>
+          </p:cNvPr>
+          <p:cNvSpPr txBox="1"/>
+          <p:nvPr/>
+        </p:nvSpPr>
+        <p:spPr>
+          <a:xfrm>
+            <a:off x="2277197" y="2537016"/>
+            <a:ext cx="216000" cy="180000"/>
+          </a:xfrm>
+          <a:prstGeom prst="rect">
+            <a:avLst/>
+          </a:prstGeom>
+          <a:solidFill>
+            <a:srgbClr val="E2442F"/>
+          </a:solidFill>
+        </p:spPr>
+        <p:txBody>
+          <a:bodyPr wrap="none" rtlCol="0" anchor="ctr">
+            <a:noAutofit/>
+          </a:bodyPr>
+          <a:lstStyle/>
+          <a:p>
+            <a:pPr algn="ctr"/>
+            <a:r>
+              <a:rPr lang="en-US" sz="1200" dirty="0"/>
+              <a:t>35</a:t>
+            </a:r>
+          </a:p>
+        </p:txBody>
+      </p:sp>
+      <p:sp>
+        <p:nvSpPr>
+          <p:cNvPr id="48" name="TextBox 47">
+            <a:extLst>
+              <a:ext uri="{FF2B5EF4-FFF2-40B4-BE49-F238E27FC236}">
+                <a16:creationId xmlns:a16="http://schemas.microsoft.com/office/drawing/2014/main" id="{CF59F1C9-120F-B885-8620-D6B2621134D8}"/>
+              </a:ext>
+            </a:extLst>
+          </p:cNvPr>
+          <p:cNvSpPr txBox="1"/>
+          <p:nvPr/>
+        </p:nvSpPr>
+        <p:spPr>
+          <a:xfrm>
+            <a:off x="2772354" y="2537016"/>
+            <a:ext cx="216000" cy="180000"/>
+          </a:xfrm>
+          <a:prstGeom prst="rect">
+            <a:avLst/>
+          </a:prstGeom>
+          <a:solidFill>
+            <a:srgbClr val="F5724E"/>
+          </a:solidFill>
+        </p:spPr>
+        <p:txBody>
+          <a:bodyPr wrap="none" rtlCol="0" anchor="ctr">
+            <a:noAutofit/>
+          </a:bodyPr>
+          <a:lstStyle/>
+          <a:p>
+            <a:pPr algn="ctr"/>
+            <a:r>
+              <a:rPr lang="en-US" sz="1200" dirty="0"/>
+              <a:t>29</a:t>
+            </a:r>
+          </a:p>
+        </p:txBody>
+      </p:sp>
+      <p:sp>
+        <p:nvSpPr>
+          <p:cNvPr id="49" name="TextBox 48">
+            <a:extLst>
+              <a:ext uri="{FF2B5EF4-FFF2-40B4-BE49-F238E27FC236}">
+                <a16:creationId xmlns:a16="http://schemas.microsoft.com/office/drawing/2014/main" id="{9B8966E5-28BF-258F-CA2E-93BA17BD83D8}"/>
+              </a:ext>
+            </a:extLst>
+          </p:cNvPr>
+          <p:cNvSpPr txBox="1"/>
+          <p:nvPr/>
+        </p:nvSpPr>
+        <p:spPr>
+          <a:xfrm>
+            <a:off x="1545121" y="2797410"/>
+            <a:ext cx="216000" cy="180000"/>
+          </a:xfrm>
+          <a:prstGeom prst="rect">
+            <a:avLst/>
+          </a:prstGeom>
+          <a:solidFill>
+            <a:srgbClr val="BD0E08"/>
+          </a:solidFill>
+        </p:spPr>
+        <p:txBody>
+          <a:bodyPr wrap="none" rtlCol="0" anchor="ctr">
+            <a:noAutofit/>
+          </a:bodyPr>
+          <a:lstStyle/>
+          <a:p>
+            <a:pPr algn="ctr"/>
+            <a:r>
+              <a:rPr lang="en-US" sz="1200" dirty="0"/>
+              <a:t>42</a:t>
+            </a:r>
+          </a:p>
+        </p:txBody>
+      </p:sp>
+      <p:sp>
+        <p:nvSpPr>
+          <p:cNvPr id="50" name="TextBox 49">
+            <a:extLst>
+              <a:ext uri="{FF2B5EF4-FFF2-40B4-BE49-F238E27FC236}">
+                <a16:creationId xmlns:a16="http://schemas.microsoft.com/office/drawing/2014/main" id="{76AA6E67-C047-6B9E-034C-90BA401825AA}"/>
+              </a:ext>
+            </a:extLst>
+          </p:cNvPr>
+          <p:cNvSpPr txBox="1"/>
+          <p:nvPr/>
+        </p:nvSpPr>
+        <p:spPr>
+          <a:xfrm>
+            <a:off x="1785488" y="2797410"/>
+            <a:ext cx="216000" cy="180000"/>
+          </a:xfrm>
+          <a:prstGeom prst="rect">
+            <a:avLst/>
+          </a:prstGeom>
+          <a:solidFill>
+            <a:srgbClr val="AC0000"/>
+          </a:solidFill>
+        </p:spPr>
+        <p:txBody>
+          <a:bodyPr wrap="none" rtlCol="0" anchor="ctr">
+            <a:noAutofit/>
+          </a:bodyPr>
+          <a:lstStyle/>
+          <a:p>
+            <a:pPr algn="ctr"/>
+            <a:r>
+              <a:rPr lang="en-US" sz="1200" dirty="0"/>
+              <a:t>45</a:t>
+            </a:r>
+          </a:p>
+        </p:txBody>
+      </p:sp>
+      <p:sp>
+        <p:nvSpPr>
+          <p:cNvPr id="51" name="TextBox 50">
+            <a:extLst>
+              <a:ext uri="{FF2B5EF4-FFF2-40B4-BE49-F238E27FC236}">
+                <a16:creationId xmlns:a16="http://schemas.microsoft.com/office/drawing/2014/main" id="{B14A9CC0-2D13-27CF-CD9C-437FE6EBD294}"/>
+              </a:ext>
+            </a:extLst>
+          </p:cNvPr>
+          <p:cNvSpPr txBox="1"/>
+          <p:nvPr/>
+        </p:nvSpPr>
+        <p:spPr>
+          <a:xfrm>
+            <a:off x="2037427" y="2797410"/>
+            <a:ext cx="216000" cy="180000"/>
+          </a:xfrm>
+          <a:prstGeom prst="rect">
+            <a:avLst/>
+          </a:prstGeom>
+          <a:solidFill>
+            <a:srgbClr val="B20100"/>
+          </a:solidFill>
+        </p:spPr>
+        <p:txBody>
+          <a:bodyPr wrap="none" rtlCol="0" anchor="ctr">
+            <a:noAutofit/>
+          </a:bodyPr>
+          <a:lstStyle/>
+          <a:p>
+            <a:pPr algn="ctr"/>
+            <a:r>
+              <a:rPr lang="en-US" sz="1200" dirty="0"/>
+              <a:t>44</a:t>
+            </a:r>
+          </a:p>
+        </p:txBody>
+      </p:sp>
+    </p:spTree>
+    <p:extLst>
+      <p:ext uri="{BB962C8B-B14F-4D97-AF65-F5344CB8AC3E}">
+        <p14:creationId xmlns:p14="http://schemas.microsoft.com/office/powerpoint/2010/main" val="34156375"/>
+      </p:ext>
+    </p:extLst>
+  </p:cSld>
+  <p:clrMapOvr>
+    <a:masterClrMapping/>
+  </p:clrMapOvr>
+</p:sld>
+</file>
+
+<file path=ppt/slides/slide2.xml><?xml version="1.0" encoding="utf-8"?>
 <p:sld xmlns:a="http://schemas.openxmlformats.org/drawingml/2006/main" xmlns:r="http://schemas.openxmlformats.org/officeDocument/2006/relationships" xmlns:p="http://schemas.openxmlformats.org/presentationml/2006/main">
   <p:cSld>
     <p:spTree>

</xml_diff>